<commit_message>
Update Powerpoint Presentation for Gate 5
</commit_message>
<xml_diff>
--- a/Documents/PowerPoints/Senior Design Project - Gate 5 1.0.pptx
+++ b/Documents/PowerPoints/Senior Design Project - Gate 5 1.0.pptx
@@ -5,20 +5,23 @@
     <p:sldMasterId id="2147483663" r:id="rId1"/>
   </p:sldMasterIdLst>
   <p:notesMasterIdLst>
-    <p:notesMasterId r:id="rId10"/>
+    <p:notesMasterId r:id="rId13"/>
   </p:notesMasterIdLst>
   <p:handoutMasterIdLst>
-    <p:handoutMasterId r:id="rId11"/>
+    <p:handoutMasterId r:id="rId14"/>
   </p:handoutMasterIdLst>
   <p:sldIdLst>
     <p:sldId id="258" r:id="rId2"/>
     <p:sldId id="266" r:id="rId3"/>
     <p:sldId id="263" r:id="rId4"/>
-    <p:sldId id="267" r:id="rId5"/>
-    <p:sldId id="268" r:id="rId6"/>
-    <p:sldId id="269" r:id="rId7"/>
-    <p:sldId id="270" r:id="rId8"/>
-    <p:sldId id="271" r:id="rId9"/>
+    <p:sldId id="272" r:id="rId5"/>
+    <p:sldId id="273" r:id="rId6"/>
+    <p:sldId id="274" r:id="rId7"/>
+    <p:sldId id="267" r:id="rId8"/>
+    <p:sldId id="268" r:id="rId9"/>
+    <p:sldId id="269" r:id="rId10"/>
+    <p:sldId id="270" r:id="rId11"/>
+    <p:sldId id="271" r:id="rId12"/>
   </p:sldIdLst>
   <p:sldSz cx="9144000" cy="6858000" type="screen4x3"/>
   <p:notesSz cx="6858000" cy="9144000"/>
@@ -213,7 +216,7 @@
                 <a:latin typeface="Arial" pitchFamily="34" charset="0"/>
               </a:rPr>
               <a:pPr/>
-              <a:t>9/3/2012</a:t>
+              <a:t>9/7/2012</a:t>
             </a:fld>
             <a:endParaRPr lang="en-US" dirty="0">
               <a:latin typeface="Arial" pitchFamily="34" charset="0"/>
@@ -396,7 +399,7 @@
             <a:fld id="{FC1312E8-DAE4-4DB4-9959-6EFE043C5908}" type="datetimeFigureOut">
               <a:rPr lang="en-US" smtClean="0"/>
               <a:pPr/>
-              <a:t>9/3/2012</a:t>
+              <a:t>9/7/2012</a:t>
             </a:fld>
             <a:endParaRPr lang="en-US" dirty="0"/>
           </a:p>
@@ -671,6 +674,91 @@
 </p:notesMaster>
 </file>
 
+<file path=ppt/notesSlides/notesSlide1.xml><?xml version="1.0" encoding="utf-8"?>
+<p:notes xmlns:a="http://schemas.openxmlformats.org/drawingml/2006/main" xmlns:r="http://schemas.openxmlformats.org/officeDocument/2006/relationships" xmlns:p="http://schemas.openxmlformats.org/presentationml/2006/main">
+  <p:cSld>
+    <p:spTree>
+      <p:nvGrpSpPr>
+        <p:cNvPr id="1" name=""/>
+        <p:cNvGrpSpPr/>
+        <p:nvPr/>
+      </p:nvGrpSpPr>
+      <p:grpSpPr>
+        <a:xfrm>
+          <a:off x="0" y="0"/>
+          <a:ext cx="0" cy="0"/>
+          <a:chOff x="0" y="0"/>
+          <a:chExt cx="0" cy="0"/>
+        </a:xfrm>
+      </p:grpSpPr>
+      <p:sp>
+        <p:nvSpPr>
+          <p:cNvPr id="2" name="Slide Image Placeholder 1"/>
+          <p:cNvSpPr>
+            <a:spLocks noGrp="1" noRot="1" noChangeAspect="1"/>
+          </p:cNvSpPr>
+          <p:nvPr>
+            <p:ph type="sldImg"/>
+          </p:nvPr>
+        </p:nvSpPr>
+        <p:spPr/>
+      </p:sp>
+      <p:sp>
+        <p:nvSpPr>
+          <p:cNvPr id="3" name="Notes Placeholder 2"/>
+          <p:cNvSpPr>
+            <a:spLocks noGrp="1"/>
+          </p:cNvSpPr>
+          <p:nvPr>
+            <p:ph type="body" idx="1"/>
+          </p:nvPr>
+        </p:nvSpPr>
+        <p:spPr/>
+        <p:txBody>
+          <a:bodyPr/>
+          <a:lstStyle/>
+          <a:p>
+            <a:endParaRPr lang="en-US"/>
+          </a:p>
+        </p:txBody>
+      </p:sp>
+      <p:sp>
+        <p:nvSpPr>
+          <p:cNvPr id="4" name="Slide Number Placeholder 3"/>
+          <p:cNvSpPr>
+            <a:spLocks noGrp="1"/>
+          </p:cNvSpPr>
+          <p:nvPr>
+            <p:ph type="sldNum" sz="quarter" idx="10"/>
+          </p:nvPr>
+        </p:nvSpPr>
+        <p:spPr/>
+        <p:txBody>
+          <a:bodyPr/>
+          <a:lstStyle/>
+          <a:p>
+            <a:fld id="{B0D02AC4-1C81-4AB4-8D73-92191CCF549E}" type="slidenum">
+              <a:rPr lang="en-US" smtClean="0"/>
+              <a:pPr/>
+              <a:t>2</a:t>
+            </a:fld>
+            <a:endParaRPr lang="en-US" dirty="0"/>
+          </a:p>
+        </p:txBody>
+      </p:sp>
+    </p:spTree>
+    <p:extLst>
+      <p:ext uri="{BB962C8B-B14F-4D97-AF65-F5344CB8AC3E}">
+        <p14:creationId xmlns:p14="http://schemas.microsoft.com/office/powerpoint/2010/main" val="3077312580"/>
+      </p:ext>
+    </p:extLst>
+  </p:cSld>
+  <p:clrMapOvr>
+    <a:masterClrMapping/>
+  </p:clrMapOvr>
+</p:notes>
+</file>
+
 <file path=ppt/slideLayouts/slideLayout1.xml><?xml version="1.0" encoding="utf-8"?>
 <p:sldLayout xmlns:a="http://schemas.openxmlformats.org/drawingml/2006/main" xmlns:r="http://schemas.openxmlformats.org/officeDocument/2006/relationships" xmlns:p="http://schemas.openxmlformats.org/presentationml/2006/main" type="obj" preserve="1">
   <p:cSld name="Title and Content">
@@ -786,7 +874,7 @@
             <a:fld id="{373724D0-DD0F-42EF-84DE-838DB5D26951}" type="datetime1">
               <a:rPr lang="en-US" smtClean="0"/>
               <a:pPr/>
-              <a:t>9/3/2012</a:t>
+              <a:t>9/7/2012</a:t>
             </a:fld>
             <a:endParaRPr lang="en-US" dirty="0"/>
           </a:p>
@@ -1030,7 +1118,7 @@
             <a:fld id="{7E42FB2E-ABA8-41CA-9C7C-28F5EB525474}" type="datetime1">
               <a:rPr lang="en-US" smtClean="0"/>
               <a:pPr/>
-              <a:t>9/3/2012</a:t>
+              <a:t>9/7/2012</a:t>
             </a:fld>
             <a:endParaRPr lang="en-US" dirty="0"/>
           </a:p>
@@ -1302,7 +1390,7 @@
             <a:fld id="{7E42FB2E-ABA8-41CA-9C7C-28F5EB525474}" type="datetime1">
               <a:rPr lang="en-US" smtClean="0"/>
               <a:pPr/>
-              <a:t>9/3/2012</a:t>
+              <a:t>9/7/2012</a:t>
             </a:fld>
             <a:endParaRPr lang="en-US" dirty="0"/>
           </a:p>
@@ -1342,6 +1430,13 @@
   <p:clrMapOvr>
     <a:masterClrMapping/>
   </p:clrMapOvr>
+  <p:timing>
+    <p:tnLst>
+      <p:par>
+        <p:cTn id="1" dur="indefinite" restart="never" nodeType="tmRoot"/>
+      </p:par>
+    </p:tnLst>
+  </p:timing>
   <p:hf hdr="0" ftr="0"/>
 </p:sldLayout>
 </file>
@@ -1708,7 +1803,7 @@
             <a:fld id="{7E42FB2E-ABA8-41CA-9C7C-28F5EB525474}" type="datetime1">
               <a:rPr lang="en-US" smtClean="0"/>
               <a:pPr/>
-              <a:t>9/3/2012</a:t>
+              <a:t>9/7/2012</a:t>
             </a:fld>
             <a:endParaRPr lang="en-US" dirty="0"/>
           </a:p>
@@ -1810,7 +1905,7 @@
             <a:fld id="{1620389F-DE1D-44C7-B37E-89BCC2F680BE}" type="datetime1">
               <a:rPr lang="en-US" smtClean="0"/>
               <a:pPr/>
-              <a:t>9/3/2012</a:t>
+              <a:t>9/7/2012</a:t>
             </a:fld>
             <a:endParaRPr lang="en-US"/>
           </a:p>
@@ -1898,7 +1993,7 @@
             <a:fld id="{7E42FB2E-ABA8-41CA-9C7C-28F5EB525474}" type="datetime1">
               <a:rPr lang="en-US" smtClean="0"/>
               <a:pPr/>
-              <a:t>9/3/2012</a:t>
+              <a:t>9/7/2012</a:t>
             </a:fld>
             <a:endParaRPr lang="en-US" dirty="0"/>
           </a:p>
@@ -2519,7 +2614,7 @@
             <a:fld id="{7E42FB2E-ABA8-41CA-9C7C-28F5EB525474}" type="datetime1">
               <a:rPr lang="en-US" smtClean="0"/>
               <a:pPr/>
-              <a:t>9/3/2012</a:t>
+              <a:t>9/7/2012</a:t>
             </a:fld>
             <a:endParaRPr lang="en-US" dirty="0"/>
           </a:p>
@@ -2964,11 +3059,11 @@
             </a:br>
             <a:r>
               <a:rPr lang="en-US" dirty="0" smtClean="0"/>
-              <a:t>Situational Awareness: Moving Map</a:t>
+              <a:t>Situational Awareness</a:t>
             </a:r>
             <a:r>
               <a:rPr lang="en-US" dirty="0" smtClean="0"/>
-              <a:t/>
+              <a:t>: Moving Map</a:t>
             </a:r>
             <a:br>
               <a:rPr lang="en-US" dirty="0" smtClean="0"/>
@@ -2986,14 +3081,14 @@
       </p:sp>
       <p:pic>
         <p:nvPicPr>
-          <p:cNvPr id="1026" name="Picture 2" descr="C:\Program Files (x86)\Microsoft Office\MEDIA\CAGCAT10\j0233070.wmf"/>
+          <p:cNvPr id="1030" name="Picture 6" descr="https://encrypted-tbn3.google.com/images?q=tbn:ANd9GcRH57f9pQOCzycQ8iRB3gZv6eJcM90t8aNxCQFyGKhCc8nWKqiuAw"/>
           <p:cNvPicPr>
             <a:picLocks noChangeAspect="1" noChangeArrowheads="1"/>
           </p:cNvPicPr>
           <p:nvPr/>
         </p:nvPicPr>
         <p:blipFill>
-          <a:blip r:embed="rId2" cstate="print">
+          <a:blip r:embed="rId2">
             <a:extLst>
               <a:ext uri="{28A0092B-C50C-407E-A947-70E740481C1C}">
                 <a14:useLocalDpi xmlns:a14="http://schemas.microsoft.com/office/drawing/2010/main" val="0"/>
@@ -3007,8 +3102,8 @@
         </p:blipFill>
         <p:spPr bwMode="auto">
           <a:xfrm>
-            <a:off x="4999754" y="3729657"/>
-            <a:ext cx="3885761" cy="1947829"/>
+            <a:off x="467683" y="914401"/>
+            <a:ext cx="914400" cy="914400"/>
           </a:xfrm>
           <a:prstGeom prst="rect">
             <a:avLst/>
@@ -3025,41 +3120,11 @@
           </a:extLst>
         </p:spPr>
       </p:pic>
-      <p:sp>
-        <p:nvSpPr>
-          <p:cNvPr id="2" name="TextBox 1"/>
-          <p:cNvSpPr txBox="1"/>
-          <p:nvPr/>
-        </p:nvSpPr>
-        <p:spPr>
-          <a:xfrm>
-            <a:off x="6519986" y="5683293"/>
-            <a:ext cx="845296" cy="369332"/>
-          </a:xfrm>
-          <a:prstGeom prst="rect">
-            <a:avLst/>
-          </a:prstGeom>
-          <a:noFill/>
-        </p:spPr>
-        <p:txBody>
-          <a:bodyPr wrap="none" rtlCol="0">
-            <a:spAutoFit/>
-          </a:bodyPr>
-          <a:lstStyle/>
-          <a:p>
-            <a:r>
-              <a:rPr lang="en-US" dirty="0" smtClean="0"/>
-              <a:t>Picture</a:t>
-            </a:r>
-            <a:endParaRPr lang="en-US" dirty="0"/>
-          </a:p>
-        </p:txBody>
-      </p:sp>
       <p:pic>
         <p:nvPicPr>
-          <p:cNvPr id="1030" name="Picture 6" descr="https://encrypted-tbn3.google.com/images?q=tbn:ANd9GcRH57f9pQOCzycQ8iRB3gZv6eJcM90t8aNxCQFyGKhCc8nWKqiuAw"/>
+          <p:cNvPr id="3" name="Picture 2"/>
           <p:cNvPicPr>
-            <a:picLocks noChangeAspect="1" noChangeArrowheads="1"/>
+            <a:picLocks noChangeAspect="1"/>
           </p:cNvPicPr>
           <p:nvPr/>
         </p:nvPicPr>
@@ -3071,29 +3136,18 @@
               </a:ext>
             </a:extLst>
           </a:blip>
-          <a:srcRect/>
           <a:stretch>
             <a:fillRect/>
           </a:stretch>
         </p:blipFill>
-        <p:spPr bwMode="auto">
+        <p:spPr>
           <a:xfrm>
-            <a:off x="7365282" y="2436131"/>
-            <a:ext cx="1283843" cy="1283843"/>
+            <a:off x="4483199" y="2392431"/>
+            <a:ext cx="4387816" cy="3290862"/>
           </a:xfrm>
           <a:prstGeom prst="rect">
             <a:avLst/>
           </a:prstGeom>
-          <a:noFill/>
-          <a:extLst>
-            <a:ext uri="{909E8E84-426E-40DD-AFC4-6F175D3DCCD1}">
-              <a14:hiddenFill xmlns:a14="http://schemas.microsoft.com/office/drawing/2010/main">
-                <a:solidFill>
-                  <a:srgbClr val="FFFFFF"/>
-                </a:solidFill>
-              </a14:hiddenFill>
-            </a:ext>
-          </a:extLst>
         </p:spPr>
       </p:pic>
     </p:spTree>
@@ -3104,6 +3158,358 @@
   <p:transition>
     <p:fade/>
   </p:transition>
+  <p:timing>
+    <p:tnLst>
+      <p:par>
+        <p:cTn id="1" dur="indefinite" restart="never" nodeType="tmRoot"/>
+      </p:par>
+    </p:tnLst>
+  </p:timing>
+</p:sld>
+</file>
+
+<file path=ppt/slides/slide10.xml><?xml version="1.0" encoding="utf-8"?>
+<p:sld xmlns:a="http://schemas.openxmlformats.org/drawingml/2006/main" xmlns:r="http://schemas.openxmlformats.org/officeDocument/2006/relationships" xmlns:p="http://schemas.openxmlformats.org/presentationml/2006/main">
+  <p:cSld>
+    <p:spTree>
+      <p:nvGrpSpPr>
+        <p:cNvPr id="1" name=""/>
+        <p:cNvGrpSpPr/>
+        <p:nvPr/>
+      </p:nvGrpSpPr>
+      <p:grpSpPr>
+        <a:xfrm>
+          <a:off x="0" y="0"/>
+          <a:ext cx="0" cy="0"/>
+          <a:chOff x="0" y="0"/>
+          <a:chExt cx="0" cy="0"/>
+        </a:xfrm>
+      </p:grpSpPr>
+      <p:sp>
+        <p:nvSpPr>
+          <p:cNvPr id="2" name="Title 1"/>
+          <p:cNvSpPr>
+            <a:spLocks noGrp="1"/>
+          </p:cNvSpPr>
+          <p:nvPr>
+            <p:ph type="title"/>
+          </p:nvPr>
+        </p:nvSpPr>
+        <p:spPr>
+          <a:xfrm>
+            <a:off x="749745" y="2751836"/>
+            <a:ext cx="7772400" cy="1362075"/>
+          </a:xfrm>
+        </p:spPr>
+        <p:txBody>
+          <a:bodyPr/>
+          <a:lstStyle/>
+          <a:p>
+            <a:r>
+              <a:rPr lang="en-US" dirty="0" smtClean="0"/>
+              <a:t>Backup Slides</a:t>
+            </a:r>
+            <a:endParaRPr lang="en-US" dirty="0"/>
+          </a:p>
+        </p:txBody>
+      </p:sp>
+      <p:sp>
+        <p:nvSpPr>
+          <p:cNvPr id="3" name="Text Placeholder 2"/>
+          <p:cNvSpPr>
+            <a:spLocks noGrp="1"/>
+          </p:cNvSpPr>
+          <p:nvPr>
+            <p:ph type="body" idx="1"/>
+          </p:nvPr>
+        </p:nvSpPr>
+        <p:spPr/>
+        <p:txBody>
+          <a:bodyPr>
+            <a:normAutofit/>
+          </a:bodyPr>
+          <a:lstStyle/>
+          <a:p>
+            <a:r>
+              <a:rPr lang="en-US" sz="1800" dirty="0" smtClean="0"/>
+              <a:t>Include extra slides if discussion goes ‘deeper</a:t>
+            </a:r>
+            <a:r>
+              <a:rPr lang="en-US" sz="1800" dirty="0"/>
+              <a:t>’ and all slides from after </a:t>
+            </a:r>
+            <a:r>
+              <a:rPr lang="en-US" sz="1800" dirty="0" smtClean="0"/>
+              <a:t>meeting</a:t>
+            </a:r>
+            <a:endParaRPr lang="en-US" sz="1800" dirty="0"/>
+          </a:p>
+        </p:txBody>
+      </p:sp>
+      <p:sp>
+        <p:nvSpPr>
+          <p:cNvPr id="4" name="Date Placeholder 3"/>
+          <p:cNvSpPr>
+            <a:spLocks noGrp="1"/>
+          </p:cNvSpPr>
+          <p:nvPr>
+            <p:ph type="dt" sz="half" idx="10"/>
+          </p:nvPr>
+        </p:nvSpPr>
+        <p:spPr/>
+        <p:txBody>
+          <a:bodyPr/>
+          <a:lstStyle/>
+          <a:p>
+            <a:fld id="{7E42FB2E-ABA8-41CA-9C7C-28F5EB525474}" type="datetime1">
+              <a:rPr lang="en-US" smtClean="0"/>
+              <a:pPr/>
+              <a:t>9/7/2012</a:t>
+            </a:fld>
+            <a:endParaRPr lang="en-US" dirty="0"/>
+          </a:p>
+        </p:txBody>
+      </p:sp>
+      <p:sp>
+        <p:nvSpPr>
+          <p:cNvPr id="5" name="Slide Number Placeholder 4"/>
+          <p:cNvSpPr>
+            <a:spLocks noGrp="1"/>
+          </p:cNvSpPr>
+          <p:nvPr>
+            <p:ph type="sldNum" sz="quarter" idx="12"/>
+          </p:nvPr>
+        </p:nvSpPr>
+        <p:spPr/>
+        <p:txBody>
+          <a:bodyPr/>
+          <a:lstStyle/>
+          <a:p>
+            <a:fld id="{8D57DBB9-07C6-49AB-BFD5-E737C7E241F6}" type="slidenum">
+              <a:rPr lang="en-US" smtClean="0"/>
+              <a:pPr/>
+              <a:t>10</a:t>
+            </a:fld>
+            <a:endParaRPr lang="en-US" dirty="0"/>
+          </a:p>
+        </p:txBody>
+      </p:sp>
+    </p:spTree>
+    <p:extLst>
+      <p:ext uri="{BB962C8B-B14F-4D97-AF65-F5344CB8AC3E}">
+        <p14:creationId xmlns:p14="http://schemas.microsoft.com/office/powerpoint/2010/main" val="2713489721"/>
+      </p:ext>
+    </p:extLst>
+  </p:cSld>
+  <p:clrMapOvr>
+    <a:masterClrMapping/>
+  </p:clrMapOvr>
+  <p:timing>
+    <p:tnLst>
+      <p:par>
+        <p:cTn id="1" dur="indefinite" restart="never" nodeType="tmRoot"/>
+      </p:par>
+    </p:tnLst>
+  </p:timing>
+</p:sld>
+</file>
+
+<file path=ppt/slides/slide11.xml><?xml version="1.0" encoding="utf-8"?>
+<p:sld xmlns:a="http://schemas.openxmlformats.org/drawingml/2006/main" xmlns:r="http://schemas.openxmlformats.org/officeDocument/2006/relationships" xmlns:p="http://schemas.openxmlformats.org/presentationml/2006/main">
+  <p:cSld>
+    <p:spTree>
+      <p:nvGrpSpPr>
+        <p:cNvPr id="1" name=""/>
+        <p:cNvGrpSpPr/>
+        <p:nvPr/>
+      </p:nvGrpSpPr>
+      <p:grpSpPr>
+        <a:xfrm>
+          <a:off x="0" y="0"/>
+          <a:ext cx="0" cy="0"/>
+          <a:chOff x="0" y="0"/>
+          <a:chExt cx="0" cy="0"/>
+        </a:xfrm>
+      </p:grpSpPr>
+      <p:sp>
+        <p:nvSpPr>
+          <p:cNvPr id="6" name="Title 5"/>
+          <p:cNvSpPr>
+            <a:spLocks noGrp="1"/>
+          </p:cNvSpPr>
+          <p:nvPr>
+            <p:ph type="title"/>
+          </p:nvPr>
+        </p:nvSpPr>
+        <p:spPr/>
+        <p:txBody>
+          <a:bodyPr>
+            <a:normAutofit fontScale="90000"/>
+          </a:bodyPr>
+          <a:lstStyle/>
+          <a:p>
+            <a:r>
+              <a:rPr lang="en-US" dirty="0" smtClean="0"/>
+              <a:t>Lessons Learned</a:t>
+            </a:r>
+            <a:endParaRPr lang="en-US" dirty="0"/>
+          </a:p>
+        </p:txBody>
+      </p:sp>
+      <p:sp>
+        <p:nvSpPr>
+          <p:cNvPr id="7" name="Content Placeholder 6"/>
+          <p:cNvSpPr>
+            <a:spLocks noGrp="1"/>
+          </p:cNvSpPr>
+          <p:nvPr>
+            <p:ph sz="half" idx="1"/>
+          </p:nvPr>
+        </p:nvSpPr>
+        <p:spPr/>
+        <p:txBody>
+          <a:bodyPr>
+            <a:normAutofit/>
+          </a:bodyPr>
+          <a:lstStyle/>
+          <a:p>
+            <a:pPr marL="0" indent="0">
+              <a:buNone/>
+            </a:pPr>
+            <a:r>
+              <a:rPr lang="en-US" sz="2400" b="1" dirty="0" smtClean="0"/>
+              <a:t>Positive Items</a:t>
+            </a:r>
+          </a:p>
+          <a:p>
+            <a:r>
+              <a:rPr lang="en-US" sz="1800" dirty="0" smtClean="0"/>
+              <a:t>Color code MS project </a:t>
+            </a:r>
+            <a:r>
+              <a:rPr lang="en-US" sz="1800" dirty="0" err="1"/>
+              <a:t>G</a:t>
+            </a:r>
+            <a:r>
+              <a:rPr lang="en-US" sz="1800" dirty="0" err="1" smtClean="0"/>
+              <a:t>annt</a:t>
+            </a:r>
+            <a:r>
+              <a:rPr lang="en-US" sz="1800" dirty="0" smtClean="0"/>
+              <a:t> to identify each resource</a:t>
+            </a:r>
+          </a:p>
+          <a:p>
+            <a:r>
+              <a:rPr lang="en-US" sz="1800" dirty="0" smtClean="0"/>
+              <a:t>Etc.</a:t>
+            </a:r>
+          </a:p>
+        </p:txBody>
+      </p:sp>
+      <p:sp>
+        <p:nvSpPr>
+          <p:cNvPr id="8" name="Content Placeholder 7"/>
+          <p:cNvSpPr>
+            <a:spLocks noGrp="1"/>
+          </p:cNvSpPr>
+          <p:nvPr>
+            <p:ph sz="half" idx="2"/>
+          </p:nvPr>
+        </p:nvSpPr>
+        <p:spPr/>
+        <p:txBody>
+          <a:bodyPr/>
+          <a:lstStyle/>
+          <a:p>
+            <a:pPr marL="0" indent="0">
+              <a:buNone/>
+            </a:pPr>
+            <a:r>
+              <a:rPr lang="en-US" sz="2400" b="1" dirty="0" smtClean="0"/>
+              <a:t>Improvements or Changes</a:t>
+            </a:r>
+          </a:p>
+          <a:p>
+            <a:r>
+              <a:rPr lang="en-US" sz="1800" dirty="0" smtClean="0"/>
+              <a:t>Example: Do not pull all </a:t>
+            </a:r>
+            <a:r>
+              <a:rPr lang="en-US" sz="1800" dirty="0" err="1" smtClean="0"/>
+              <a:t>nighter</a:t>
+            </a:r>
+            <a:r>
+              <a:rPr lang="en-US" sz="1800" dirty="0" smtClean="0"/>
+              <a:t> before meetings</a:t>
+            </a:r>
+          </a:p>
+          <a:p>
+            <a:r>
+              <a:rPr lang="en-US" sz="1800" dirty="0" smtClean="0"/>
+              <a:t>Etc.</a:t>
+            </a:r>
+          </a:p>
+        </p:txBody>
+      </p:sp>
+      <p:sp>
+        <p:nvSpPr>
+          <p:cNvPr id="4" name="Date Placeholder 3"/>
+          <p:cNvSpPr>
+            <a:spLocks noGrp="1"/>
+          </p:cNvSpPr>
+          <p:nvPr>
+            <p:ph type="dt" sz="half" idx="10"/>
+          </p:nvPr>
+        </p:nvSpPr>
+        <p:spPr/>
+        <p:txBody>
+          <a:bodyPr/>
+          <a:lstStyle/>
+          <a:p>
+            <a:fld id="{7E42FB2E-ABA8-41CA-9C7C-28F5EB525474}" type="datetime1">
+              <a:rPr lang="en-US" smtClean="0"/>
+              <a:pPr/>
+              <a:t>9/7/2012</a:t>
+            </a:fld>
+            <a:endParaRPr lang="en-US" dirty="0"/>
+          </a:p>
+        </p:txBody>
+      </p:sp>
+      <p:sp>
+        <p:nvSpPr>
+          <p:cNvPr id="5" name="Slide Number Placeholder 4"/>
+          <p:cNvSpPr>
+            <a:spLocks noGrp="1"/>
+          </p:cNvSpPr>
+          <p:nvPr>
+            <p:ph type="sldNum" sz="quarter" idx="12"/>
+          </p:nvPr>
+        </p:nvSpPr>
+        <p:spPr/>
+        <p:txBody>
+          <a:bodyPr/>
+          <a:lstStyle/>
+          <a:p>
+            <a:fld id="{8D57DBB9-07C6-49AB-BFD5-E737C7E241F6}" type="slidenum">
+              <a:rPr lang="en-US" smtClean="0"/>
+              <a:pPr/>
+              <a:t>11</a:t>
+            </a:fld>
+            <a:endParaRPr lang="en-US" dirty="0"/>
+          </a:p>
+        </p:txBody>
+      </p:sp>
+    </p:spTree>
+    <p:extLst>
+      <p:ext uri="{BB962C8B-B14F-4D97-AF65-F5344CB8AC3E}">
+        <p14:creationId xmlns:p14="http://schemas.microsoft.com/office/powerpoint/2010/main" val="3481864823"/>
+      </p:ext>
+    </p:extLst>
+  </p:cSld>
+  <p:clrMapOvr>
+    <a:masterClrMapping/>
+  </p:clrMapOvr>
   <p:timing>
     <p:tnLst>
       <p:par>
@@ -3169,7 +3575,7 @@
         <p:spPr/>
         <p:txBody>
           <a:bodyPr>
-            <a:normAutofit fontScale="92500" lnSpcReduction="20000"/>
+            <a:normAutofit fontScale="85000" lnSpcReduction="20000"/>
           </a:bodyPr>
           <a:lstStyle/>
           <a:p>
@@ -3182,8 +3588,9 @@
             </a:r>
             <a:r>
               <a:rPr lang="en-US" sz="1600" dirty="0" smtClean="0"/>
-              <a:t>What’s the problem this project will address? What technology will be utilized. Etc.</a:t>
-            </a:r>
+              <a:t>There are no current Raytheon non-web based mapping applications on an Android device. </a:t>
+            </a:r>
+            <a:endParaRPr lang="en-US" sz="1600" dirty="0" smtClean="0"/>
           </a:p>
           <a:p>
             <a:pPr marL="0" indent="0">
@@ -3201,7 +3608,15 @@
             </a:r>
             <a:r>
               <a:rPr lang="en-US" sz="1600" dirty="0" smtClean="0"/>
-              <a:t>Concept of Operations) How will this be used? Who are the end users? What will the hardware be?</a:t>
+              <a:t>Concept of Operations) </a:t>
+            </a:r>
+            <a:r>
+              <a:rPr lang="en-US" sz="1600" dirty="0" smtClean="0"/>
+              <a:t>The application </a:t>
+            </a:r>
+            <a:r>
+              <a:rPr lang="en-US" sz="1600" dirty="0" smtClean="0"/>
+              <a:t>is intended for soldiers, law enforcement officers, or other personnel without access to the Internet. The application will be compatible with Android devices.</a:t>
             </a:r>
           </a:p>
           <a:p>
@@ -3216,48 +3631,24 @@
             </a:pPr>
             <a:r>
               <a:rPr lang="en-US" sz="1600" b="1" dirty="0" smtClean="0"/>
-              <a:t>Key Assumptions: </a:t>
-            </a:r>
+              <a:t>Key Assumptions</a:t>
+            </a:r>
+            <a:r>
+              <a:rPr lang="en-US" sz="1600" b="1" dirty="0" smtClean="0"/>
+              <a:t>:</a:t>
+            </a:r>
+            <a:endParaRPr lang="en-US" sz="1600" dirty="0" smtClean="0"/>
+          </a:p>
+          <a:p>
+            <a:pPr marL="233363" indent="-177800"/>
             <a:r>
               <a:rPr lang="en-US" sz="1600" dirty="0" smtClean="0"/>
-              <a:t>What are the critical program assumptions</a:t>
+              <a:t>Raytheon </a:t>
             </a:r>
             <a:r>
               <a:rPr lang="en-US" sz="1600" dirty="0" smtClean="0"/>
-              <a:t>?</a:t>
-            </a:r>
-            <a:endParaRPr lang="en-US" sz="1600" dirty="0" smtClean="0"/>
-          </a:p>
-          <a:p>
-            <a:pPr marL="233363" indent="-177800"/>
-            <a:r>
-              <a:rPr lang="en-US" sz="1600" dirty="0" smtClean="0"/>
-              <a:t>Example </a:t>
-            </a:r>
-            <a:r>
-              <a:rPr lang="en-US" sz="1600" dirty="0" smtClean="0"/>
-              <a:t>: Raytheon will provide </a:t>
-            </a:r>
-            <a:r>
-              <a:rPr lang="en-US" sz="1600" dirty="0" err="1" smtClean="0"/>
-              <a:t>xzy</a:t>
-            </a:r>
-            <a:r>
-              <a:rPr lang="en-US" sz="1600" dirty="0" smtClean="0"/>
-              <a:t> </a:t>
-            </a:r>
-            <a:r>
-              <a:rPr lang="en-US" sz="1600" dirty="0" smtClean="0"/>
-              <a:t>hardware</a:t>
-            </a:r>
-          </a:p>
-          <a:p>
-            <a:pPr marL="233363" indent="-177800"/>
-            <a:r>
-              <a:rPr lang="en-US" sz="1600" dirty="0" smtClean="0"/>
-              <a:t>Raytheon will provide one 10” Samsung Galaxy Tablet</a:t>
-            </a:r>
-            <a:endParaRPr lang="en-US" sz="1600" dirty="0" smtClean="0"/>
+              <a:t>will provide one 10” Samsung Galaxy Tablet</a:t>
+            </a:r>
           </a:p>
           <a:p>
             <a:pPr marL="55563" indent="0">
@@ -3271,19 +3662,42 @@
             </a:pPr>
             <a:r>
               <a:rPr lang="en-US" sz="1600" b="1" dirty="0" smtClean="0"/>
-              <a:t>Critical Success Factors: </a:t>
-            </a:r>
+              <a:t>Critical Success Factors</a:t>
+            </a:r>
+            <a:r>
+              <a:rPr lang="en-US" sz="1600" b="1" dirty="0" smtClean="0"/>
+              <a:t>:</a:t>
+            </a:r>
+            <a:endParaRPr lang="en-US" sz="1600" dirty="0" smtClean="0"/>
+          </a:p>
+          <a:p>
+            <a:pPr marL="233363" indent="-177800"/>
             <a:r>
               <a:rPr lang="en-US" sz="1600" dirty="0" smtClean="0"/>
-              <a:t>What are the key factors for success?</a:t>
+              <a:t>Meet academic requirements</a:t>
             </a:r>
           </a:p>
           <a:p>
             <a:pPr marL="233363" indent="-177800"/>
             <a:r>
               <a:rPr lang="en-US" sz="1600" dirty="0" smtClean="0"/>
-              <a:t>Example: Development environment setup complete by 1 July 2054</a:t>
-            </a:r>
+              <a:t>Completion of all deliverables</a:t>
+            </a:r>
+          </a:p>
+          <a:p>
+            <a:pPr marL="233363" indent="-177800"/>
+            <a:r>
+              <a:rPr lang="en-US" sz="1600" dirty="0" smtClean="0"/>
+              <a:t>Having a locally based moving map</a:t>
+            </a:r>
+          </a:p>
+          <a:p>
+            <a:pPr marL="233363" indent="-177800"/>
+            <a:r>
+              <a:rPr lang="en-US" sz="1600" dirty="0" smtClean="0"/>
+              <a:t>Accessing application from an Android device</a:t>
+            </a:r>
+            <a:endParaRPr lang="en-US" sz="1600" dirty="0" smtClean="0"/>
           </a:p>
           <a:p>
             <a:pPr marL="233363" indent="-177800"/>
@@ -3295,12 +3709,13 @@
             </a:pPr>
             <a:r>
               <a:rPr lang="en-US" sz="1600" b="1" dirty="0" smtClean="0"/>
-              <a:t>Buyoff Criteria: </a:t>
-            </a:r>
-            <a:r>
-              <a:rPr lang="en-US" sz="1600" dirty="0" smtClean="0"/>
-              <a:t>How do you know had success?</a:t>
-            </a:r>
+              <a:t>Buyoff </a:t>
+            </a:r>
+            <a:r>
+              <a:rPr lang="en-US" sz="1600" b="1" dirty="0" smtClean="0"/>
+              <a:t>Criteria:</a:t>
+            </a:r>
+            <a:endParaRPr lang="en-US" sz="1600" dirty="0" smtClean="0"/>
           </a:p>
           <a:p>
             <a:pPr marL="233363" indent="-177800"/>
@@ -3313,7 +3728,11 @@
             <a:pPr marL="233363" indent="-177800"/>
             <a:r>
               <a:rPr lang="en-US" sz="1600" dirty="0" smtClean="0"/>
-              <a:t>Successful completion of all university project requirements</a:t>
+              <a:t>Successful </a:t>
+            </a:r>
+            <a:r>
+              <a:rPr lang="en-US" sz="1600" dirty="0" smtClean="0"/>
+              <a:t>completion of all university project requirements</a:t>
             </a:r>
           </a:p>
           <a:p>
@@ -3447,7 +3866,7 @@
             <a:fld id="{373724D0-DD0F-42EF-84DE-838DB5D26951}" type="datetime1">
               <a:rPr lang="en-US" smtClean="0"/>
               <a:pPr/>
-              <a:t>9/3/2012</a:t>
+              <a:t>9/7/2012</a:t>
             </a:fld>
             <a:endParaRPr lang="en-US" dirty="0"/>
           </a:p>
@@ -3479,43 +3898,32 @@
       </p:sp>
       <p:pic>
         <p:nvPicPr>
-          <p:cNvPr id="9" name="Picture 2" descr="C:\Program Files (x86)\Microsoft Office\MEDIA\CAGCAT10\j0233070.wmf"/>
+          <p:cNvPr id="2" name="Picture 1"/>
           <p:cNvPicPr>
-            <a:picLocks noChangeAspect="1" noChangeArrowheads="1"/>
+            <a:picLocks noChangeAspect="1"/>
           </p:cNvPicPr>
           <p:nvPr/>
         </p:nvPicPr>
         <p:blipFill>
-          <a:blip r:embed="rId2" cstate="print">
+          <a:blip r:embed="rId3">
             <a:extLst>
               <a:ext uri="{28A0092B-C50C-407E-A947-70E740481C1C}">
                 <a14:useLocalDpi xmlns:a14="http://schemas.microsoft.com/office/drawing/2010/main" val="0"/>
               </a:ext>
             </a:extLst>
           </a:blip>
-          <a:srcRect/>
           <a:stretch>
             <a:fillRect/>
           </a:stretch>
         </p:blipFill>
-        <p:spPr bwMode="auto">
+        <p:spPr>
           <a:xfrm>
-            <a:off x="4684163" y="1006374"/>
-            <a:ext cx="3885761" cy="1947829"/>
+            <a:off x="6957748" y="237600"/>
+            <a:ext cx="1315052" cy="3101296"/>
           </a:xfrm>
           <a:prstGeom prst="rect">
             <a:avLst/>
           </a:prstGeom>
-          <a:noFill/>
-          <a:extLst>
-            <a:ext uri="{909E8E84-426E-40DD-AFC4-6F175D3DCCD1}">
-              <a14:hiddenFill xmlns:a14="http://schemas.microsoft.com/office/drawing/2010/main">
-                <a:solidFill>
-                  <a:srgbClr val="FFFFFF"/>
-                </a:solidFill>
-              </a14:hiddenFill>
-            </a:ext>
-          </a:extLst>
         </p:spPr>
       </p:pic>
     </p:spTree>
@@ -3668,7 +4076,7 @@
             <a:fld id="{373724D0-DD0F-42EF-84DE-838DB5D26951}" type="datetime1">
               <a:rPr lang="en-US" smtClean="0"/>
               <a:pPr/>
-              <a:t>9/3/2012</a:t>
+              <a:t>9/7/2012</a:t>
             </a:fld>
             <a:endParaRPr lang="en-US" dirty="0"/>
           </a:p>
@@ -3740,7 +4148,7 @@
       </p:grpSpPr>
       <p:sp>
         <p:nvSpPr>
-          <p:cNvPr id="7" name="Title 6"/>
+          <p:cNvPr id="2" name="Title 1"/>
           <p:cNvSpPr>
             <a:spLocks noGrp="1"/>
           </p:cNvSpPr>
@@ -3757,20 +4165,49 @@
           <a:p>
             <a:r>
               <a:rPr lang="en-US" dirty="0" smtClean="0"/>
-              <a:t>Project Schedule &amp; Milestones</a:t>
+              <a:t>Project Decomposition</a:t>
             </a:r>
             <a:endParaRPr lang="en-US" dirty="0"/>
           </a:p>
         </p:txBody>
       </p:sp>
-      <p:sp>
-        <p:nvSpPr>
-          <p:cNvPr id="8" name="Content Placeholder 7"/>
-          <p:cNvSpPr>
-            <a:spLocks noGrp="1"/>
-          </p:cNvSpPr>
+      <p:pic>
+        <p:nvPicPr>
+          <p:cNvPr id="6" name="Content Placeholder 5"/>
+          <p:cNvPicPr>
+            <a:picLocks noGrp="1" noChangeAspect="1"/>
+          </p:cNvPicPr>
           <p:nvPr>
             <p:ph idx="1"/>
+          </p:nvPr>
+        </p:nvPicPr>
+        <p:blipFill>
+          <a:blip r:embed="rId2">
+            <a:extLst>
+              <a:ext uri="{28A0092B-C50C-407E-A947-70E740481C1C}">
+                <a14:useLocalDpi xmlns:a14="http://schemas.microsoft.com/office/drawing/2010/main" val="0"/>
+              </a:ext>
+            </a:extLst>
+          </a:blip>
+          <a:stretch>
+            <a:fillRect/>
+          </a:stretch>
+        </p:blipFill>
+        <p:spPr>
+          <a:xfrm>
+            <a:off x="457200" y="1777355"/>
+            <a:ext cx="8229600" cy="3573166"/>
+          </a:xfrm>
+        </p:spPr>
+      </p:pic>
+      <p:sp>
+        <p:nvSpPr>
+          <p:cNvPr id="4" name="Date Placeholder 3"/>
+          <p:cNvSpPr>
+            <a:spLocks noGrp="1"/>
+          </p:cNvSpPr>
+          <p:nvPr>
+            <p:ph type="dt" sz="half" idx="10"/>
           </p:nvPr>
         </p:nvSpPr>
         <p:spPr/>
@@ -3778,44 +4215,10 @@
           <a:bodyPr/>
           <a:lstStyle/>
           <a:p>
-            <a:r>
-              <a:rPr lang="en-US" dirty="0" smtClean="0"/>
-              <a:t>Identify key program milestones </a:t>
-            </a:r>
-            <a:r>
-              <a:rPr lang="en-US" b="1" dirty="0" smtClean="0"/>
-              <a:t>with dates</a:t>
-            </a:r>
-            <a:endParaRPr lang="en-US" dirty="0" smtClean="0"/>
-          </a:p>
-          <a:p>
-            <a:r>
-              <a:rPr lang="en-US" dirty="0" smtClean="0"/>
-              <a:t>Screen shot of schedule from Project</a:t>
-            </a:r>
-            <a:endParaRPr lang="en-US" dirty="0"/>
-          </a:p>
-        </p:txBody>
-      </p:sp>
-      <p:sp>
-        <p:nvSpPr>
-          <p:cNvPr id="4" name="Date Placeholder 3"/>
-          <p:cNvSpPr>
-            <a:spLocks noGrp="1"/>
-          </p:cNvSpPr>
-          <p:nvPr>
-            <p:ph type="dt" sz="half" idx="10"/>
-          </p:nvPr>
-        </p:nvSpPr>
-        <p:spPr/>
-        <p:txBody>
-          <a:bodyPr/>
-          <a:lstStyle/>
-          <a:p>
-            <a:fld id="{7E42FB2E-ABA8-41CA-9C7C-28F5EB525474}" type="datetime1">
+            <a:fld id="{373724D0-DD0F-42EF-84DE-838DB5D26951}" type="datetime1">
               <a:rPr lang="en-US" smtClean="0"/>
               <a:pPr/>
-              <a:t>9/3/2012</a:t>
+              <a:t>9/7/2012</a:t>
             </a:fld>
             <a:endParaRPr lang="en-US" dirty="0"/>
           </a:p>
@@ -3841,14 +4244,14 @@
               <a:pPr/>
               <a:t>4</a:t>
             </a:fld>
-            <a:endParaRPr lang="en-US" dirty="0"/>
+            <a:endParaRPr lang="en-US"/>
           </a:p>
         </p:txBody>
       </p:sp>
     </p:spTree>
     <p:extLst>
       <p:ext uri="{BB962C8B-B14F-4D97-AF65-F5344CB8AC3E}">
-        <p14:creationId xmlns:p14="http://schemas.microsoft.com/office/powerpoint/2010/main" val="3661795386"/>
+        <p14:creationId xmlns:p14="http://schemas.microsoft.com/office/powerpoint/2010/main" val="2184614489"/>
       </p:ext>
     </p:extLst>
   </p:cSld>
@@ -3887,7 +4290,7 @@
       </p:grpSpPr>
       <p:sp>
         <p:nvSpPr>
-          <p:cNvPr id="6" name="Title 5"/>
+          <p:cNvPr id="2" name="Title 1"/>
           <p:cNvSpPr>
             <a:spLocks noGrp="1"/>
           </p:cNvSpPr>
@@ -3904,12 +4307,41 @@
           <a:p>
             <a:r>
               <a:rPr lang="en-US" dirty="0" smtClean="0"/>
-              <a:t>Project Team</a:t>
+              <a:t>Project UML Diagram</a:t>
             </a:r>
             <a:endParaRPr lang="en-US" dirty="0"/>
           </a:p>
         </p:txBody>
       </p:sp>
+      <p:pic>
+        <p:nvPicPr>
+          <p:cNvPr id="6" name="Content Placeholder 5"/>
+          <p:cNvPicPr>
+            <a:picLocks noGrp="1" noChangeAspect="1"/>
+          </p:cNvPicPr>
+          <p:nvPr>
+            <p:ph idx="1"/>
+          </p:nvPr>
+        </p:nvPicPr>
+        <p:blipFill>
+          <a:blip r:embed="rId2">
+            <a:extLst>
+              <a:ext uri="{28A0092B-C50C-407E-A947-70E740481C1C}">
+                <a14:useLocalDpi xmlns:a14="http://schemas.microsoft.com/office/drawing/2010/main" val="0"/>
+              </a:ext>
+            </a:extLst>
+          </a:blip>
+          <a:stretch>
+            <a:fillRect/>
+          </a:stretch>
+        </p:blipFill>
+        <p:spPr>
+          <a:xfrm>
+            <a:off x="1100054" y="855663"/>
+            <a:ext cx="6943891" cy="5416550"/>
+          </a:xfrm>
+        </p:spPr>
+      </p:pic>
       <p:sp>
         <p:nvSpPr>
           <p:cNvPr id="4" name="Date Placeholder 3"/>
@@ -3925,10 +4357,10 @@
           <a:bodyPr/>
           <a:lstStyle/>
           <a:p>
-            <a:fld id="{7E42FB2E-ABA8-41CA-9C7C-28F5EB525474}" type="datetime1">
+            <a:fld id="{373724D0-DD0F-42EF-84DE-838DB5D26951}" type="datetime1">
               <a:rPr lang="en-US" smtClean="0"/>
               <a:pPr/>
-              <a:t>9/3/2012</a:t>
+              <a:t>9/7/2012</a:t>
             </a:fld>
             <a:endParaRPr lang="en-US" dirty="0"/>
           </a:p>
@@ -3953,6 +4385,438 @@
               <a:rPr lang="en-US" smtClean="0"/>
               <a:pPr/>
               <a:t>5</a:t>
+            </a:fld>
+            <a:endParaRPr lang="en-US"/>
+          </a:p>
+        </p:txBody>
+      </p:sp>
+    </p:spTree>
+    <p:extLst>
+      <p:ext uri="{BB962C8B-B14F-4D97-AF65-F5344CB8AC3E}">
+        <p14:creationId xmlns:p14="http://schemas.microsoft.com/office/powerpoint/2010/main" val="3690794059"/>
+      </p:ext>
+    </p:extLst>
+  </p:cSld>
+  <p:clrMapOvr>
+    <a:masterClrMapping/>
+  </p:clrMapOvr>
+  <p:transition>
+    <p:fade/>
+  </p:transition>
+  <p:timing>
+    <p:tnLst>
+      <p:par>
+        <p:cTn id="1" dur="indefinite" restart="never" nodeType="tmRoot"/>
+      </p:par>
+    </p:tnLst>
+  </p:timing>
+</p:sld>
+</file>
+
+<file path=ppt/slides/slide6.xml><?xml version="1.0" encoding="utf-8"?>
+<p:sld xmlns:a="http://schemas.openxmlformats.org/drawingml/2006/main" xmlns:r="http://schemas.openxmlformats.org/officeDocument/2006/relationships" xmlns:p="http://schemas.openxmlformats.org/presentationml/2006/main">
+  <p:cSld>
+    <p:spTree>
+      <p:nvGrpSpPr>
+        <p:cNvPr id="1" name=""/>
+        <p:cNvGrpSpPr/>
+        <p:nvPr/>
+      </p:nvGrpSpPr>
+      <p:grpSpPr>
+        <a:xfrm>
+          <a:off x="0" y="0"/>
+          <a:ext cx="0" cy="0"/>
+          <a:chOff x="0" y="0"/>
+          <a:chExt cx="0" cy="0"/>
+        </a:xfrm>
+      </p:grpSpPr>
+      <p:sp>
+        <p:nvSpPr>
+          <p:cNvPr id="2" name="Title 1"/>
+          <p:cNvSpPr>
+            <a:spLocks noGrp="1"/>
+          </p:cNvSpPr>
+          <p:nvPr>
+            <p:ph type="title"/>
+          </p:nvPr>
+        </p:nvSpPr>
+        <p:spPr/>
+        <p:txBody>
+          <a:bodyPr>
+            <a:normAutofit fontScale="90000"/>
+          </a:bodyPr>
+          <a:lstStyle/>
+          <a:p>
+            <a:endParaRPr lang="en-US"/>
+          </a:p>
+        </p:txBody>
+      </p:sp>
+      <p:sp>
+        <p:nvSpPr>
+          <p:cNvPr id="3" name="Content Placeholder 2"/>
+          <p:cNvSpPr>
+            <a:spLocks noGrp="1"/>
+          </p:cNvSpPr>
+          <p:nvPr>
+            <p:ph idx="1"/>
+          </p:nvPr>
+        </p:nvSpPr>
+        <p:spPr/>
+        <p:txBody>
+          <a:bodyPr/>
+          <a:lstStyle/>
+          <a:p>
+            <a:pPr marL="0" indent="0">
+              <a:buNone/>
+            </a:pPr>
+            <a:endParaRPr lang="en-US" dirty="0"/>
+          </a:p>
+        </p:txBody>
+      </p:sp>
+      <p:sp>
+        <p:nvSpPr>
+          <p:cNvPr id="4" name="Date Placeholder 3"/>
+          <p:cNvSpPr>
+            <a:spLocks noGrp="1"/>
+          </p:cNvSpPr>
+          <p:nvPr>
+            <p:ph type="dt" sz="half" idx="10"/>
+          </p:nvPr>
+        </p:nvSpPr>
+        <p:spPr/>
+        <p:txBody>
+          <a:bodyPr/>
+          <a:lstStyle/>
+          <a:p>
+            <a:fld id="{373724D0-DD0F-42EF-84DE-838DB5D26951}" type="datetime1">
+              <a:rPr lang="en-US" smtClean="0"/>
+              <a:pPr/>
+              <a:t>9/7/2012</a:t>
+            </a:fld>
+            <a:endParaRPr lang="en-US" dirty="0"/>
+          </a:p>
+        </p:txBody>
+      </p:sp>
+      <p:sp>
+        <p:nvSpPr>
+          <p:cNvPr id="5" name="Slide Number Placeholder 4"/>
+          <p:cNvSpPr>
+            <a:spLocks noGrp="1"/>
+          </p:cNvSpPr>
+          <p:nvPr>
+            <p:ph type="sldNum" sz="quarter" idx="12"/>
+          </p:nvPr>
+        </p:nvSpPr>
+        <p:spPr/>
+        <p:txBody>
+          <a:bodyPr/>
+          <a:lstStyle/>
+          <a:p>
+            <a:fld id="{8D57DBB9-07C6-49AB-BFD5-E737C7E241F6}" type="slidenum">
+              <a:rPr lang="en-US" smtClean="0"/>
+              <a:pPr/>
+              <a:t>6</a:t>
+            </a:fld>
+            <a:endParaRPr lang="en-US"/>
+          </a:p>
+        </p:txBody>
+      </p:sp>
+      <p:pic>
+        <p:nvPicPr>
+          <p:cNvPr id="1026" name="Picture 2" descr="C:\Users\atniptw\AppData\Local\Microsoft\Windows\Temporary Internet Files\Content.Outlook\DO167TEM\Map Display Screen Shot.png"/>
+          <p:cNvPicPr>
+            <a:picLocks noChangeAspect="1" noChangeArrowheads="1"/>
+          </p:cNvPicPr>
+          <p:nvPr/>
+        </p:nvPicPr>
+        <p:blipFill>
+          <a:blip r:embed="rId2">
+            <a:extLst>
+              <a:ext uri="{28A0092B-C50C-407E-A947-70E740481C1C}">
+                <a14:useLocalDpi xmlns:a14="http://schemas.microsoft.com/office/drawing/2010/main" val="0"/>
+              </a:ext>
+            </a:extLst>
+          </a:blip>
+          <a:srcRect/>
+          <a:stretch>
+            <a:fillRect/>
+          </a:stretch>
+        </p:blipFill>
+        <p:spPr bwMode="auto">
+          <a:xfrm>
+            <a:off x="0" y="0"/>
+            <a:ext cx="9144000" cy="6858000"/>
+          </a:xfrm>
+          <a:prstGeom prst="rect">
+            <a:avLst/>
+          </a:prstGeom>
+          <a:noFill/>
+          <a:extLst>
+            <a:ext uri="{909E8E84-426E-40DD-AFC4-6F175D3DCCD1}">
+              <a14:hiddenFill xmlns:a14="http://schemas.microsoft.com/office/drawing/2010/main">
+                <a:solidFill>
+                  <a:srgbClr val="FFFFFF"/>
+                </a:solidFill>
+              </a14:hiddenFill>
+            </a:ext>
+          </a:extLst>
+        </p:spPr>
+      </p:pic>
+    </p:spTree>
+    <p:extLst>
+      <p:ext uri="{BB962C8B-B14F-4D97-AF65-F5344CB8AC3E}">
+        <p14:creationId xmlns:p14="http://schemas.microsoft.com/office/powerpoint/2010/main" val="2490581267"/>
+      </p:ext>
+    </p:extLst>
+  </p:cSld>
+  <p:clrMapOvr>
+    <a:masterClrMapping/>
+  </p:clrMapOvr>
+  <p:transition>
+    <p:fade/>
+  </p:transition>
+  <p:timing>
+    <p:tnLst>
+      <p:par>
+        <p:cTn id="1" dur="indefinite" restart="never" nodeType="tmRoot"/>
+      </p:par>
+    </p:tnLst>
+  </p:timing>
+</p:sld>
+</file>
+
+<file path=ppt/slides/slide7.xml><?xml version="1.0" encoding="utf-8"?>
+<p:sld xmlns:a="http://schemas.openxmlformats.org/drawingml/2006/main" xmlns:r="http://schemas.openxmlformats.org/officeDocument/2006/relationships" xmlns:p="http://schemas.openxmlformats.org/presentationml/2006/main">
+  <p:cSld>
+    <p:spTree>
+      <p:nvGrpSpPr>
+        <p:cNvPr id="1" name=""/>
+        <p:cNvGrpSpPr/>
+        <p:nvPr/>
+      </p:nvGrpSpPr>
+      <p:grpSpPr>
+        <a:xfrm>
+          <a:off x="0" y="0"/>
+          <a:ext cx="0" cy="0"/>
+          <a:chOff x="0" y="0"/>
+          <a:chExt cx="0" cy="0"/>
+        </a:xfrm>
+      </p:grpSpPr>
+      <p:sp>
+        <p:nvSpPr>
+          <p:cNvPr id="7" name="Title 6"/>
+          <p:cNvSpPr>
+            <a:spLocks noGrp="1"/>
+          </p:cNvSpPr>
+          <p:nvPr>
+            <p:ph type="title"/>
+          </p:nvPr>
+        </p:nvSpPr>
+        <p:spPr/>
+        <p:txBody>
+          <a:bodyPr>
+            <a:normAutofit fontScale="90000"/>
+          </a:bodyPr>
+          <a:lstStyle/>
+          <a:p>
+            <a:r>
+              <a:rPr lang="en-US" dirty="0" smtClean="0"/>
+              <a:t>Project Schedule &amp; Milestones</a:t>
+            </a:r>
+            <a:endParaRPr lang="en-US" dirty="0"/>
+          </a:p>
+        </p:txBody>
+      </p:sp>
+      <p:sp>
+        <p:nvSpPr>
+          <p:cNvPr id="8" name="Content Placeholder 7"/>
+          <p:cNvSpPr>
+            <a:spLocks noGrp="1"/>
+          </p:cNvSpPr>
+          <p:nvPr>
+            <p:ph idx="1"/>
+          </p:nvPr>
+        </p:nvSpPr>
+        <p:spPr/>
+        <p:txBody>
+          <a:bodyPr/>
+          <a:lstStyle/>
+          <a:p>
+            <a:r>
+              <a:rPr lang="en-US" dirty="0" smtClean="0"/>
+              <a:t>Identify key program milestones </a:t>
+            </a:r>
+            <a:r>
+              <a:rPr lang="en-US" b="1" dirty="0" smtClean="0"/>
+              <a:t>with dates</a:t>
+            </a:r>
+            <a:endParaRPr lang="en-US" dirty="0" smtClean="0"/>
+          </a:p>
+          <a:p>
+            <a:r>
+              <a:rPr lang="en-US" dirty="0" smtClean="0"/>
+              <a:t>Screen shot of schedule from Project</a:t>
+            </a:r>
+            <a:endParaRPr lang="en-US" dirty="0"/>
+          </a:p>
+        </p:txBody>
+      </p:sp>
+      <p:sp>
+        <p:nvSpPr>
+          <p:cNvPr id="4" name="Date Placeholder 3"/>
+          <p:cNvSpPr>
+            <a:spLocks noGrp="1"/>
+          </p:cNvSpPr>
+          <p:nvPr>
+            <p:ph type="dt" sz="half" idx="10"/>
+          </p:nvPr>
+        </p:nvSpPr>
+        <p:spPr/>
+        <p:txBody>
+          <a:bodyPr/>
+          <a:lstStyle/>
+          <a:p>
+            <a:fld id="{7E42FB2E-ABA8-41CA-9C7C-28F5EB525474}" type="datetime1">
+              <a:rPr lang="en-US" smtClean="0"/>
+              <a:pPr/>
+              <a:t>9/7/2012</a:t>
+            </a:fld>
+            <a:endParaRPr lang="en-US" dirty="0"/>
+          </a:p>
+        </p:txBody>
+      </p:sp>
+      <p:sp>
+        <p:nvSpPr>
+          <p:cNvPr id="5" name="Slide Number Placeholder 4"/>
+          <p:cNvSpPr>
+            <a:spLocks noGrp="1"/>
+          </p:cNvSpPr>
+          <p:nvPr>
+            <p:ph type="sldNum" sz="quarter" idx="12"/>
+          </p:nvPr>
+        </p:nvSpPr>
+        <p:spPr/>
+        <p:txBody>
+          <a:bodyPr/>
+          <a:lstStyle/>
+          <a:p>
+            <a:fld id="{8D57DBB9-07C6-49AB-BFD5-E737C7E241F6}" type="slidenum">
+              <a:rPr lang="en-US" smtClean="0"/>
+              <a:pPr/>
+              <a:t>7</a:t>
+            </a:fld>
+            <a:endParaRPr lang="en-US" dirty="0"/>
+          </a:p>
+        </p:txBody>
+      </p:sp>
+    </p:spTree>
+    <p:extLst>
+      <p:ext uri="{BB962C8B-B14F-4D97-AF65-F5344CB8AC3E}">
+        <p14:creationId xmlns:p14="http://schemas.microsoft.com/office/powerpoint/2010/main" val="3661795386"/>
+      </p:ext>
+    </p:extLst>
+  </p:cSld>
+  <p:clrMapOvr>
+    <a:masterClrMapping/>
+  </p:clrMapOvr>
+  <p:transition>
+    <p:fade/>
+  </p:transition>
+  <p:timing>
+    <p:tnLst>
+      <p:par>
+        <p:cTn id="1" dur="indefinite" restart="never" nodeType="tmRoot"/>
+      </p:par>
+    </p:tnLst>
+  </p:timing>
+</p:sld>
+</file>
+
+<file path=ppt/slides/slide8.xml><?xml version="1.0" encoding="utf-8"?>
+<p:sld xmlns:a="http://schemas.openxmlformats.org/drawingml/2006/main" xmlns:r="http://schemas.openxmlformats.org/officeDocument/2006/relationships" xmlns:p="http://schemas.openxmlformats.org/presentationml/2006/main">
+  <p:cSld>
+    <p:spTree>
+      <p:nvGrpSpPr>
+        <p:cNvPr id="1" name=""/>
+        <p:cNvGrpSpPr/>
+        <p:nvPr/>
+      </p:nvGrpSpPr>
+      <p:grpSpPr>
+        <a:xfrm>
+          <a:off x="0" y="0"/>
+          <a:ext cx="0" cy="0"/>
+          <a:chOff x="0" y="0"/>
+          <a:chExt cx="0" cy="0"/>
+        </a:xfrm>
+      </p:grpSpPr>
+      <p:sp>
+        <p:nvSpPr>
+          <p:cNvPr id="6" name="Title 5"/>
+          <p:cNvSpPr>
+            <a:spLocks noGrp="1"/>
+          </p:cNvSpPr>
+          <p:nvPr>
+            <p:ph type="title"/>
+          </p:nvPr>
+        </p:nvSpPr>
+        <p:spPr/>
+        <p:txBody>
+          <a:bodyPr>
+            <a:normAutofit fontScale="90000"/>
+          </a:bodyPr>
+          <a:lstStyle/>
+          <a:p>
+            <a:r>
+              <a:rPr lang="en-US" dirty="0" smtClean="0"/>
+              <a:t>Project Team</a:t>
+            </a:r>
+            <a:endParaRPr lang="en-US" dirty="0"/>
+          </a:p>
+        </p:txBody>
+      </p:sp>
+      <p:sp>
+        <p:nvSpPr>
+          <p:cNvPr id="4" name="Date Placeholder 3"/>
+          <p:cNvSpPr>
+            <a:spLocks noGrp="1"/>
+          </p:cNvSpPr>
+          <p:nvPr>
+            <p:ph type="dt" sz="half" idx="10"/>
+          </p:nvPr>
+        </p:nvSpPr>
+        <p:spPr/>
+        <p:txBody>
+          <a:bodyPr/>
+          <a:lstStyle/>
+          <a:p>
+            <a:fld id="{7E42FB2E-ABA8-41CA-9C7C-28F5EB525474}" type="datetime1">
+              <a:rPr lang="en-US" smtClean="0"/>
+              <a:pPr/>
+              <a:t>9/7/2012</a:t>
+            </a:fld>
+            <a:endParaRPr lang="en-US" dirty="0"/>
+          </a:p>
+        </p:txBody>
+      </p:sp>
+      <p:sp>
+        <p:nvSpPr>
+          <p:cNvPr id="5" name="Slide Number Placeholder 4"/>
+          <p:cNvSpPr>
+            <a:spLocks noGrp="1"/>
+          </p:cNvSpPr>
+          <p:nvPr>
+            <p:ph type="sldNum" sz="quarter" idx="12"/>
+          </p:nvPr>
+        </p:nvSpPr>
+        <p:spPr/>
+        <p:txBody>
+          <a:bodyPr/>
+          <a:lstStyle/>
+          <a:p>
+            <a:fld id="{8D57DBB9-07C6-49AB-BFD5-E737C7E241F6}" type="slidenum">
+              <a:rPr lang="en-US" smtClean="0"/>
+              <a:pPr/>
+              <a:t>8</a:t>
             </a:fld>
             <a:endParaRPr lang="en-US" dirty="0"/>
           </a:p>
@@ -4130,7 +4994,7 @@
                 </a:solidFill>
                 <a:latin typeface="+mj-lt"/>
               </a:rPr>
-              <a:t>Jane Doe</a:t>
+              <a:t>Tom Atnip</a:t>
             </a:r>
             <a:endParaRPr lang="en-US" sz="1200" b="1" dirty="0">
               <a:solidFill>
@@ -4274,7 +5138,7 @@
                 </a:solidFill>
                 <a:latin typeface="+mj-lt"/>
               </a:rPr>
-              <a:t>Jack Doe</a:t>
+              <a:t>Susi Cisneros</a:t>
             </a:r>
             <a:endParaRPr lang="en-US" sz="1200" b="1" dirty="0">
               <a:solidFill>
@@ -4311,8 +5175,18 @@
                 <a:effectLst/>
                 <a:latin typeface="+mj-lt"/>
               </a:rPr>
-              <a:t>Team Leader</a:t>
-            </a:r>
+              <a:t>Client Contact</a:t>
+            </a:r>
+            <a:endParaRPr kumimoji="0" lang="en-US" sz="1200" b="0" i="0" u="none" strike="noStrike" cap="none" normalizeH="0" baseline="0" dirty="0" smtClean="0">
+              <a:ln>
+                <a:noFill/>
+              </a:ln>
+              <a:solidFill>
+                <a:sysClr val="windowText" lastClr="000000"/>
+              </a:solidFill>
+              <a:effectLst/>
+              <a:latin typeface="+mj-lt"/>
+            </a:endParaRPr>
           </a:p>
           <a:p>
             <a:pPr marL="0" marR="0" indent="0" algn="ctr" defTabSz="914400" rtl="0" eaLnBrk="0" fontAlgn="base" latinLnBrk="0" hangingPunct="0">
@@ -4418,7 +5292,7 @@
                 </a:solidFill>
                 <a:latin typeface="+mj-lt"/>
               </a:rPr>
-              <a:t>John Doe</a:t>
+              <a:t>Sam Kim</a:t>
             </a:r>
             <a:endParaRPr lang="en-US" sz="1200" b="1" dirty="0">
               <a:solidFill>
@@ -4445,44 +5319,22 @@
               <a:tabLst/>
             </a:pPr>
             <a:r>
-              <a:rPr kumimoji="0" lang="en-US" sz="1200" b="0" i="0" u="none" strike="noStrike" cap="none" normalizeH="0" baseline="0" dirty="0" smtClean="0">
-                <a:ln>
-                  <a:noFill/>
-                </a:ln>
-                <a:solidFill>
-                  <a:sysClr val="windowText" lastClr="000000"/>
-                </a:solidFill>
-                <a:effectLst/>
-                <a:latin typeface="+mj-lt"/>
-              </a:rPr>
-              <a:t>Team Leader</a:t>
-            </a:r>
-          </a:p>
-          <a:p>
-            <a:pPr marL="0" marR="0" indent="0" algn="ctr" defTabSz="914400" rtl="0" eaLnBrk="0" fontAlgn="base" latinLnBrk="0" hangingPunct="0">
-              <a:lnSpc>
-                <a:spcPct val="100000"/>
-              </a:lnSpc>
-              <a:spcBef>
-                <a:spcPct val="0"/>
-              </a:spcBef>
-              <a:spcAft>
-                <a:spcPct val="0"/>
-              </a:spcAft>
-              <a:buClrTx/>
-              <a:buSzTx/>
-              <a:buFontTx/>
-              <a:buNone/>
-              <a:tabLst/>
-            </a:pPr>
-            <a:r>
               <a:rPr lang="en-US" sz="1200" dirty="0" smtClean="0">
                 <a:solidFill>
                   <a:sysClr val="windowText" lastClr="000000"/>
                 </a:solidFill>
                 <a:latin typeface="+mj-lt"/>
               </a:rPr>
-              <a:t>Software Engineer</a:t>
+              <a:t>Software </a:t>
+            </a:r>
+            <a:r>
+              <a:rPr lang="en-US" sz="1200" dirty="0" smtClean="0">
+                <a:solidFill>
+                  <a:sysClr val="windowText" lastClr="000000"/>
+                </a:solidFill>
+                <a:latin typeface="+mj-lt"/>
+              </a:rPr>
+              <a:t>Engineer</a:t>
             </a:r>
             <a:endParaRPr kumimoji="0" lang="en-US" sz="1200" b="0" i="0" u="none" strike="noStrike" cap="none" normalizeH="0" baseline="0" dirty="0" smtClean="0">
               <a:ln>
@@ -4562,7 +5414,7 @@
                 </a:solidFill>
                 <a:latin typeface="+mj-lt"/>
               </a:rPr>
-              <a:t>Jim Doe</a:t>
+              <a:t>Seth Troisi</a:t>
             </a:r>
             <a:endParaRPr lang="en-US" sz="1200" b="1" dirty="0">
               <a:solidFill>
@@ -4589,44 +5441,22 @@
               <a:tabLst/>
             </a:pPr>
             <a:r>
-              <a:rPr kumimoji="0" lang="en-US" sz="1200" b="0" i="0" u="none" strike="noStrike" cap="none" normalizeH="0" baseline="0" dirty="0" smtClean="0">
-                <a:ln>
-                  <a:noFill/>
-                </a:ln>
-                <a:solidFill>
-                  <a:sysClr val="windowText" lastClr="000000"/>
-                </a:solidFill>
-                <a:effectLst/>
-                <a:latin typeface="+mj-lt"/>
-              </a:rPr>
-              <a:t>Team Leader</a:t>
-            </a:r>
-          </a:p>
-          <a:p>
-            <a:pPr marL="0" marR="0" indent="0" algn="ctr" defTabSz="914400" rtl="0" eaLnBrk="0" fontAlgn="base" latinLnBrk="0" hangingPunct="0">
-              <a:lnSpc>
-                <a:spcPct val="100000"/>
-              </a:lnSpc>
-              <a:spcBef>
-                <a:spcPct val="0"/>
-              </a:spcBef>
-              <a:spcAft>
-                <a:spcPct val="0"/>
-              </a:spcAft>
-              <a:buClrTx/>
-              <a:buSzTx/>
-              <a:buFontTx/>
-              <a:buNone/>
-              <a:tabLst/>
-            </a:pPr>
-            <a:r>
               <a:rPr lang="en-US" sz="1200" dirty="0" smtClean="0">
                 <a:solidFill>
                   <a:sysClr val="windowText" lastClr="000000"/>
                 </a:solidFill>
                 <a:latin typeface="+mj-lt"/>
               </a:rPr>
-              <a:t>Software Engineer</a:t>
+              <a:t>Software </a:t>
+            </a:r>
+            <a:r>
+              <a:rPr lang="en-US" sz="1200" dirty="0" smtClean="0">
+                <a:solidFill>
+                  <a:sysClr val="windowText" lastClr="000000"/>
+                </a:solidFill>
+                <a:latin typeface="+mj-lt"/>
+              </a:rPr>
+              <a:t>Engineer</a:t>
             </a:r>
             <a:endParaRPr kumimoji="0" lang="en-US" sz="1200" b="0" i="0" u="none" strike="noStrike" cap="none" normalizeH="0" baseline="0" dirty="0" smtClean="0">
               <a:ln>
@@ -5142,22 +5972,13 @@
               <a:tabLst/>
             </a:pPr>
             <a:r>
-              <a:rPr lang="en-US" sz="1200" b="1" dirty="0" err="1" smtClean="0">
-                <a:solidFill>
-                  <a:sysClr val="windowText" lastClr="000000"/>
-                </a:solidFill>
-                <a:latin typeface="+mj-lt"/>
-              </a:rPr>
-              <a:t>Sriram</a:t>
-            </a:r>
-            <a:r>
               <a:rPr lang="en-US" sz="1200" b="1" dirty="0" smtClean="0">
                 <a:solidFill>
                   <a:sysClr val="windowText" lastClr="000000"/>
                 </a:solidFill>
                 <a:latin typeface="+mj-lt"/>
               </a:rPr>
-              <a:t>/Michael </a:t>
+              <a:t>Michael Wollowski</a:t>
             </a:r>
             <a:endParaRPr lang="en-US" sz="1200" b="1" dirty="0">
               <a:solidFill>
@@ -5315,7 +6136,7 @@
 </p:sld>
 </file>
 
-<file path=ppt/slides/slide6.xml><?xml version="1.0" encoding="utf-8"?>
+<file path=ppt/slides/slide9.xml><?xml version="1.0" encoding="utf-8"?>
 <p:sld xmlns:a="http://schemas.openxmlformats.org/drawingml/2006/main" xmlns:r="http://schemas.openxmlformats.org/officeDocument/2006/relationships" xmlns:p="http://schemas.openxmlformats.org/presentationml/2006/main">
   <p:cSld>
     <p:spTree>
@@ -5382,11 +6203,7 @@
           <a:p>
             <a:r>
               <a:rPr lang="en-US" sz="2400" dirty="0" smtClean="0"/>
-              <a:t>Indicate links and mitigations/capture </a:t>
-            </a:r>
-            <a:r>
-              <a:rPr lang="en-US" sz="2400" dirty="0" smtClean="0"/>
-              <a:t>planes</a:t>
+              <a:t>Indicate links and mitigations/capture planes</a:t>
             </a:r>
           </a:p>
           <a:p>
@@ -5416,7 +6233,7 @@
             <a:fld id="{1620389F-DE1D-44C7-B37E-89BCC2F680BE}" type="datetime1">
               <a:rPr lang="en-US" smtClean="0"/>
               <a:pPr/>
-              <a:t>9/3/2012</a:t>
+              <a:t>9/7/2012</a:t>
             </a:fld>
             <a:endParaRPr lang="en-US"/>
           </a:p>
@@ -5440,7 +6257,7 @@
             <a:fld id="{8D57DBB9-07C6-49AB-BFD5-E737C7E241F6}" type="slidenum">
               <a:rPr lang="en-US" smtClean="0"/>
               <a:pPr/>
-              <a:t>6</a:t>
+              <a:t>9</a:t>
             </a:fld>
             <a:endParaRPr lang="en-US"/>
           </a:p>
@@ -5459,358 +6276,6 @@
   <p:transition>
     <p:fade/>
   </p:transition>
-  <p:timing>
-    <p:tnLst>
-      <p:par>
-        <p:cTn id="1" dur="indefinite" restart="never" nodeType="tmRoot"/>
-      </p:par>
-    </p:tnLst>
-  </p:timing>
-</p:sld>
-</file>
-
-<file path=ppt/slides/slide7.xml><?xml version="1.0" encoding="utf-8"?>
-<p:sld xmlns:a="http://schemas.openxmlformats.org/drawingml/2006/main" xmlns:r="http://schemas.openxmlformats.org/officeDocument/2006/relationships" xmlns:p="http://schemas.openxmlformats.org/presentationml/2006/main">
-  <p:cSld>
-    <p:spTree>
-      <p:nvGrpSpPr>
-        <p:cNvPr id="1" name=""/>
-        <p:cNvGrpSpPr/>
-        <p:nvPr/>
-      </p:nvGrpSpPr>
-      <p:grpSpPr>
-        <a:xfrm>
-          <a:off x="0" y="0"/>
-          <a:ext cx="0" cy="0"/>
-          <a:chOff x="0" y="0"/>
-          <a:chExt cx="0" cy="0"/>
-        </a:xfrm>
-      </p:grpSpPr>
-      <p:sp>
-        <p:nvSpPr>
-          <p:cNvPr id="2" name="Title 1"/>
-          <p:cNvSpPr>
-            <a:spLocks noGrp="1"/>
-          </p:cNvSpPr>
-          <p:nvPr>
-            <p:ph type="title"/>
-          </p:nvPr>
-        </p:nvSpPr>
-        <p:spPr>
-          <a:xfrm>
-            <a:off x="749745" y="2751836"/>
-            <a:ext cx="7772400" cy="1362075"/>
-          </a:xfrm>
-        </p:spPr>
-        <p:txBody>
-          <a:bodyPr/>
-          <a:lstStyle/>
-          <a:p>
-            <a:r>
-              <a:rPr lang="en-US" dirty="0" smtClean="0"/>
-              <a:t>Backup Slides</a:t>
-            </a:r>
-            <a:endParaRPr lang="en-US" dirty="0"/>
-          </a:p>
-        </p:txBody>
-      </p:sp>
-      <p:sp>
-        <p:nvSpPr>
-          <p:cNvPr id="3" name="Text Placeholder 2"/>
-          <p:cNvSpPr>
-            <a:spLocks noGrp="1"/>
-          </p:cNvSpPr>
-          <p:nvPr>
-            <p:ph type="body" idx="1"/>
-          </p:nvPr>
-        </p:nvSpPr>
-        <p:spPr/>
-        <p:txBody>
-          <a:bodyPr>
-            <a:normAutofit/>
-          </a:bodyPr>
-          <a:lstStyle/>
-          <a:p>
-            <a:r>
-              <a:rPr lang="en-US" sz="1800" dirty="0" smtClean="0"/>
-              <a:t>Include extra slides if discussion goes ‘deeper</a:t>
-            </a:r>
-            <a:r>
-              <a:rPr lang="en-US" sz="1800" dirty="0"/>
-              <a:t>’ and all slides from after </a:t>
-            </a:r>
-            <a:r>
-              <a:rPr lang="en-US" sz="1800" dirty="0" smtClean="0"/>
-              <a:t>meeting</a:t>
-            </a:r>
-            <a:endParaRPr lang="en-US" sz="1800" dirty="0"/>
-          </a:p>
-        </p:txBody>
-      </p:sp>
-      <p:sp>
-        <p:nvSpPr>
-          <p:cNvPr id="4" name="Date Placeholder 3"/>
-          <p:cNvSpPr>
-            <a:spLocks noGrp="1"/>
-          </p:cNvSpPr>
-          <p:nvPr>
-            <p:ph type="dt" sz="half" idx="10"/>
-          </p:nvPr>
-        </p:nvSpPr>
-        <p:spPr/>
-        <p:txBody>
-          <a:bodyPr/>
-          <a:lstStyle/>
-          <a:p>
-            <a:fld id="{7E42FB2E-ABA8-41CA-9C7C-28F5EB525474}" type="datetime1">
-              <a:rPr lang="en-US" smtClean="0"/>
-              <a:pPr/>
-              <a:t>9/3/2012</a:t>
-            </a:fld>
-            <a:endParaRPr lang="en-US" dirty="0"/>
-          </a:p>
-        </p:txBody>
-      </p:sp>
-      <p:sp>
-        <p:nvSpPr>
-          <p:cNvPr id="5" name="Slide Number Placeholder 4"/>
-          <p:cNvSpPr>
-            <a:spLocks noGrp="1"/>
-          </p:cNvSpPr>
-          <p:nvPr>
-            <p:ph type="sldNum" sz="quarter" idx="12"/>
-          </p:nvPr>
-        </p:nvSpPr>
-        <p:spPr/>
-        <p:txBody>
-          <a:bodyPr/>
-          <a:lstStyle/>
-          <a:p>
-            <a:fld id="{8D57DBB9-07C6-49AB-BFD5-E737C7E241F6}" type="slidenum">
-              <a:rPr lang="en-US" smtClean="0"/>
-              <a:pPr/>
-              <a:t>7</a:t>
-            </a:fld>
-            <a:endParaRPr lang="en-US" dirty="0"/>
-          </a:p>
-        </p:txBody>
-      </p:sp>
-    </p:spTree>
-    <p:extLst>
-      <p:ext uri="{BB962C8B-B14F-4D97-AF65-F5344CB8AC3E}">
-        <p14:creationId xmlns:p14="http://schemas.microsoft.com/office/powerpoint/2010/main" val="2713489721"/>
-      </p:ext>
-    </p:extLst>
-  </p:cSld>
-  <p:clrMapOvr>
-    <a:masterClrMapping/>
-  </p:clrMapOvr>
-  <p:timing>
-    <p:tnLst>
-      <p:par>
-        <p:cTn id="1" dur="indefinite" restart="never" nodeType="tmRoot"/>
-      </p:par>
-    </p:tnLst>
-  </p:timing>
-</p:sld>
-</file>
-
-<file path=ppt/slides/slide8.xml><?xml version="1.0" encoding="utf-8"?>
-<p:sld xmlns:a="http://schemas.openxmlformats.org/drawingml/2006/main" xmlns:r="http://schemas.openxmlformats.org/officeDocument/2006/relationships" xmlns:p="http://schemas.openxmlformats.org/presentationml/2006/main">
-  <p:cSld>
-    <p:spTree>
-      <p:nvGrpSpPr>
-        <p:cNvPr id="1" name=""/>
-        <p:cNvGrpSpPr/>
-        <p:nvPr/>
-      </p:nvGrpSpPr>
-      <p:grpSpPr>
-        <a:xfrm>
-          <a:off x="0" y="0"/>
-          <a:ext cx="0" cy="0"/>
-          <a:chOff x="0" y="0"/>
-          <a:chExt cx="0" cy="0"/>
-        </a:xfrm>
-      </p:grpSpPr>
-      <p:sp>
-        <p:nvSpPr>
-          <p:cNvPr id="6" name="Title 5"/>
-          <p:cNvSpPr>
-            <a:spLocks noGrp="1"/>
-          </p:cNvSpPr>
-          <p:nvPr>
-            <p:ph type="title"/>
-          </p:nvPr>
-        </p:nvSpPr>
-        <p:spPr/>
-        <p:txBody>
-          <a:bodyPr>
-            <a:normAutofit fontScale="90000"/>
-          </a:bodyPr>
-          <a:lstStyle/>
-          <a:p>
-            <a:r>
-              <a:rPr lang="en-US" dirty="0" smtClean="0"/>
-              <a:t>Lessons Learned</a:t>
-            </a:r>
-            <a:endParaRPr lang="en-US" dirty="0"/>
-          </a:p>
-        </p:txBody>
-      </p:sp>
-      <p:sp>
-        <p:nvSpPr>
-          <p:cNvPr id="7" name="Content Placeholder 6"/>
-          <p:cNvSpPr>
-            <a:spLocks noGrp="1"/>
-          </p:cNvSpPr>
-          <p:nvPr>
-            <p:ph sz="half" idx="1"/>
-          </p:nvPr>
-        </p:nvSpPr>
-        <p:spPr/>
-        <p:txBody>
-          <a:bodyPr>
-            <a:normAutofit/>
-          </a:bodyPr>
-          <a:lstStyle/>
-          <a:p>
-            <a:pPr marL="0" indent="0">
-              <a:buNone/>
-            </a:pPr>
-            <a:r>
-              <a:rPr lang="en-US" sz="2400" b="1" dirty="0" smtClean="0"/>
-              <a:t>Positive Items</a:t>
-            </a:r>
-          </a:p>
-          <a:p>
-            <a:r>
-              <a:rPr lang="en-US" sz="1800" dirty="0" smtClean="0"/>
-              <a:t>Color code MS project </a:t>
-            </a:r>
-            <a:r>
-              <a:rPr lang="en-US" sz="1800" dirty="0" err="1"/>
-              <a:t>G</a:t>
-            </a:r>
-            <a:r>
-              <a:rPr lang="en-US" sz="1800" dirty="0" err="1" smtClean="0"/>
-              <a:t>annt</a:t>
-            </a:r>
-            <a:r>
-              <a:rPr lang="en-US" sz="1800" dirty="0" smtClean="0"/>
-              <a:t> to identify each resource</a:t>
-            </a:r>
-          </a:p>
-          <a:p>
-            <a:r>
-              <a:rPr lang="en-US" sz="1800" dirty="0" smtClean="0"/>
-              <a:t>Etc.</a:t>
-            </a:r>
-          </a:p>
-        </p:txBody>
-      </p:sp>
-      <p:sp>
-        <p:nvSpPr>
-          <p:cNvPr id="8" name="Content Placeholder 7"/>
-          <p:cNvSpPr>
-            <a:spLocks noGrp="1"/>
-          </p:cNvSpPr>
-          <p:nvPr>
-            <p:ph sz="half" idx="2"/>
-          </p:nvPr>
-        </p:nvSpPr>
-        <p:spPr/>
-        <p:txBody>
-          <a:bodyPr/>
-          <a:lstStyle/>
-          <a:p>
-            <a:pPr marL="0" indent="0">
-              <a:buNone/>
-            </a:pPr>
-            <a:r>
-              <a:rPr lang="en-US" sz="2400" b="1" dirty="0" smtClean="0"/>
-              <a:t>Improvements or Changes</a:t>
-            </a:r>
-          </a:p>
-          <a:p>
-            <a:r>
-              <a:rPr lang="en-US" sz="1800" dirty="0" smtClean="0"/>
-              <a:t>Example: Do not pull all </a:t>
-            </a:r>
-            <a:r>
-              <a:rPr lang="en-US" sz="1800" dirty="0" err="1" smtClean="0"/>
-              <a:t>nighter</a:t>
-            </a:r>
-            <a:r>
-              <a:rPr lang="en-US" sz="1800" dirty="0" smtClean="0"/>
-              <a:t> before meetings</a:t>
-            </a:r>
-          </a:p>
-          <a:p>
-            <a:r>
-              <a:rPr lang="en-US" sz="1800" dirty="0" smtClean="0"/>
-              <a:t>Etc.</a:t>
-            </a:r>
-          </a:p>
-        </p:txBody>
-      </p:sp>
-      <p:sp>
-        <p:nvSpPr>
-          <p:cNvPr id="4" name="Date Placeholder 3"/>
-          <p:cNvSpPr>
-            <a:spLocks noGrp="1"/>
-          </p:cNvSpPr>
-          <p:nvPr>
-            <p:ph type="dt" sz="half" idx="10"/>
-          </p:nvPr>
-        </p:nvSpPr>
-        <p:spPr/>
-        <p:txBody>
-          <a:bodyPr/>
-          <a:lstStyle/>
-          <a:p>
-            <a:fld id="{7E42FB2E-ABA8-41CA-9C7C-28F5EB525474}" type="datetime1">
-              <a:rPr lang="en-US" smtClean="0"/>
-              <a:pPr/>
-              <a:t>9/3/2012</a:t>
-            </a:fld>
-            <a:endParaRPr lang="en-US" dirty="0"/>
-          </a:p>
-        </p:txBody>
-      </p:sp>
-      <p:sp>
-        <p:nvSpPr>
-          <p:cNvPr id="5" name="Slide Number Placeholder 4"/>
-          <p:cNvSpPr>
-            <a:spLocks noGrp="1"/>
-          </p:cNvSpPr>
-          <p:nvPr>
-            <p:ph type="sldNum" sz="quarter" idx="12"/>
-          </p:nvPr>
-        </p:nvSpPr>
-        <p:spPr/>
-        <p:txBody>
-          <a:bodyPr/>
-          <a:lstStyle/>
-          <a:p>
-            <a:fld id="{8D57DBB9-07C6-49AB-BFD5-E737C7E241F6}" type="slidenum">
-              <a:rPr lang="en-US" smtClean="0"/>
-              <a:pPr/>
-              <a:t>8</a:t>
-            </a:fld>
-            <a:endParaRPr lang="en-US" dirty="0"/>
-          </a:p>
-        </p:txBody>
-      </p:sp>
-    </p:spTree>
-    <p:extLst>
-      <p:ext uri="{BB962C8B-B14F-4D97-AF65-F5344CB8AC3E}">
-        <p14:creationId xmlns:p14="http://schemas.microsoft.com/office/powerpoint/2010/main" val="3481864823"/>
-      </p:ext>
-    </p:extLst>
-  </p:cSld>
-  <p:clrMapOvr>
-    <a:masterClrMapping/>
-  </p:clrMapOvr>
   <p:timing>
     <p:tnLst>
       <p:par>

</xml_diff>

<commit_message>
Update Gate 5 based on feedback from JD
</commit_message>
<xml_diff>
--- a/Documents/PowerPoints/Senior Design Project - Gate 5 1.0.pptx
+++ b/Documents/PowerPoints/Senior Design Project - Gate 5 1.0.pptx
@@ -15,13 +15,13 @@
     <p:sldId id="266" r:id="rId3"/>
     <p:sldId id="263" r:id="rId4"/>
     <p:sldId id="272" r:id="rId5"/>
-    <p:sldId id="273" r:id="rId6"/>
-    <p:sldId id="274" r:id="rId7"/>
-    <p:sldId id="267" r:id="rId8"/>
-    <p:sldId id="268" r:id="rId9"/>
-    <p:sldId id="269" r:id="rId10"/>
-    <p:sldId id="270" r:id="rId11"/>
-    <p:sldId id="271" r:id="rId12"/>
+    <p:sldId id="274" r:id="rId6"/>
+    <p:sldId id="267" r:id="rId7"/>
+    <p:sldId id="268" r:id="rId8"/>
+    <p:sldId id="269" r:id="rId9"/>
+    <p:sldId id="270" r:id="rId10"/>
+    <p:sldId id="271" r:id="rId11"/>
+    <p:sldId id="273" r:id="rId12"/>
   </p:sldIdLst>
   <p:sldSz cx="9144000" cy="6858000" type="screen4x3"/>
   <p:notesSz cx="6858000" cy="9144000"/>
@@ -216,7 +216,7 @@
                 <a:latin typeface="Arial" pitchFamily="34" charset="0"/>
               </a:rPr>
               <a:pPr/>
-              <a:t>9/7/2012</a:t>
+              <a:t>9/10/2012</a:t>
             </a:fld>
             <a:endParaRPr lang="en-US" dirty="0">
               <a:latin typeface="Arial" pitchFamily="34" charset="0"/>
@@ -399,7 +399,7 @@
             <a:fld id="{FC1312E8-DAE4-4DB4-9959-6EFE043C5908}" type="datetimeFigureOut">
               <a:rPr lang="en-US" smtClean="0"/>
               <a:pPr/>
-              <a:t>9/7/2012</a:t>
+              <a:t>9/10/2012</a:t>
             </a:fld>
             <a:endParaRPr lang="en-US" dirty="0"/>
           </a:p>
@@ -759,6 +759,91 @@
 </p:notes>
 </file>
 
+<file path=ppt/notesSlides/notesSlide2.xml><?xml version="1.0" encoding="utf-8"?>
+<p:notes xmlns:a="http://schemas.openxmlformats.org/drawingml/2006/main" xmlns:r="http://schemas.openxmlformats.org/officeDocument/2006/relationships" xmlns:p="http://schemas.openxmlformats.org/presentationml/2006/main">
+  <p:cSld>
+    <p:spTree>
+      <p:nvGrpSpPr>
+        <p:cNvPr id="1" name=""/>
+        <p:cNvGrpSpPr/>
+        <p:nvPr/>
+      </p:nvGrpSpPr>
+      <p:grpSpPr>
+        <a:xfrm>
+          <a:off x="0" y="0"/>
+          <a:ext cx="0" cy="0"/>
+          <a:chOff x="0" y="0"/>
+          <a:chExt cx="0" cy="0"/>
+        </a:xfrm>
+      </p:grpSpPr>
+      <p:sp>
+        <p:nvSpPr>
+          <p:cNvPr id="2" name="Slide Image Placeholder 1"/>
+          <p:cNvSpPr>
+            <a:spLocks noGrp="1" noRot="1" noChangeAspect="1"/>
+          </p:cNvSpPr>
+          <p:nvPr>
+            <p:ph type="sldImg"/>
+          </p:nvPr>
+        </p:nvSpPr>
+        <p:spPr/>
+      </p:sp>
+      <p:sp>
+        <p:nvSpPr>
+          <p:cNvPr id="3" name="Notes Placeholder 2"/>
+          <p:cNvSpPr>
+            <a:spLocks noGrp="1"/>
+          </p:cNvSpPr>
+          <p:nvPr>
+            <p:ph type="body" idx="1"/>
+          </p:nvPr>
+        </p:nvSpPr>
+        <p:spPr/>
+        <p:txBody>
+          <a:bodyPr/>
+          <a:lstStyle/>
+          <a:p>
+            <a:endParaRPr lang="en-US"/>
+          </a:p>
+        </p:txBody>
+      </p:sp>
+      <p:sp>
+        <p:nvSpPr>
+          <p:cNvPr id="4" name="Slide Number Placeholder 3"/>
+          <p:cNvSpPr>
+            <a:spLocks noGrp="1"/>
+          </p:cNvSpPr>
+          <p:nvPr>
+            <p:ph type="sldNum" sz="quarter" idx="10"/>
+          </p:nvPr>
+        </p:nvSpPr>
+        <p:spPr/>
+        <p:txBody>
+          <a:bodyPr/>
+          <a:lstStyle/>
+          <a:p>
+            <a:fld id="{B0D02AC4-1C81-4AB4-8D73-92191CCF549E}" type="slidenum">
+              <a:rPr lang="en-US" smtClean="0"/>
+              <a:pPr/>
+              <a:t>11</a:t>
+            </a:fld>
+            <a:endParaRPr lang="en-US" dirty="0"/>
+          </a:p>
+        </p:txBody>
+      </p:sp>
+    </p:spTree>
+    <p:extLst>
+      <p:ext uri="{BB962C8B-B14F-4D97-AF65-F5344CB8AC3E}">
+        <p14:creationId xmlns:p14="http://schemas.microsoft.com/office/powerpoint/2010/main" val="2481227216"/>
+      </p:ext>
+    </p:extLst>
+  </p:cSld>
+  <p:clrMapOvr>
+    <a:masterClrMapping/>
+  </p:clrMapOvr>
+</p:notes>
+</file>
+
 <file path=ppt/slideLayouts/slideLayout1.xml><?xml version="1.0" encoding="utf-8"?>
 <p:sldLayout xmlns:a="http://schemas.openxmlformats.org/drawingml/2006/main" xmlns:r="http://schemas.openxmlformats.org/officeDocument/2006/relationships" xmlns:p="http://schemas.openxmlformats.org/presentationml/2006/main" type="obj" preserve="1">
   <p:cSld name="Title and Content">
@@ -874,7 +959,7 @@
             <a:fld id="{373724D0-DD0F-42EF-84DE-838DB5D26951}" type="datetime1">
               <a:rPr lang="en-US" smtClean="0"/>
               <a:pPr/>
-              <a:t>9/7/2012</a:t>
+              <a:t>9/10/2012</a:t>
             </a:fld>
             <a:endParaRPr lang="en-US" dirty="0"/>
           </a:p>
@@ -1118,7 +1203,7 @@
             <a:fld id="{7E42FB2E-ABA8-41CA-9C7C-28F5EB525474}" type="datetime1">
               <a:rPr lang="en-US" smtClean="0"/>
               <a:pPr/>
-              <a:t>9/7/2012</a:t>
+              <a:t>9/10/2012</a:t>
             </a:fld>
             <a:endParaRPr lang="en-US" dirty="0"/>
           </a:p>
@@ -1390,7 +1475,7 @@
             <a:fld id="{7E42FB2E-ABA8-41CA-9C7C-28F5EB525474}" type="datetime1">
               <a:rPr lang="en-US" smtClean="0"/>
               <a:pPr/>
-              <a:t>9/7/2012</a:t>
+              <a:t>9/10/2012</a:t>
             </a:fld>
             <a:endParaRPr lang="en-US" dirty="0"/>
           </a:p>
@@ -1803,7 +1888,7 @@
             <a:fld id="{7E42FB2E-ABA8-41CA-9C7C-28F5EB525474}" type="datetime1">
               <a:rPr lang="en-US" smtClean="0"/>
               <a:pPr/>
-              <a:t>9/7/2012</a:t>
+              <a:t>9/10/2012</a:t>
             </a:fld>
             <a:endParaRPr lang="en-US" dirty="0"/>
           </a:p>
@@ -1905,7 +1990,7 @@
             <a:fld id="{1620389F-DE1D-44C7-B37E-89BCC2F680BE}" type="datetime1">
               <a:rPr lang="en-US" smtClean="0"/>
               <a:pPr/>
-              <a:t>9/7/2012</a:t>
+              <a:t>9/10/2012</a:t>
             </a:fld>
             <a:endParaRPr lang="en-US"/>
           </a:p>
@@ -1993,7 +2078,7 @@
             <a:fld id="{7E42FB2E-ABA8-41CA-9C7C-28F5EB525474}" type="datetime1">
               <a:rPr lang="en-US" smtClean="0"/>
               <a:pPr/>
-              <a:t>9/7/2012</a:t>
+              <a:t>9/10/2012</a:t>
             </a:fld>
             <a:endParaRPr lang="en-US" dirty="0"/>
           </a:p>
@@ -2614,7 +2699,7 @@
             <a:fld id="{7E42FB2E-ABA8-41CA-9C7C-28F5EB525474}" type="datetime1">
               <a:rPr lang="en-US" smtClean="0"/>
               <a:pPr/>
-              <a:t>9/7/2012</a:t>
+              <a:t>9/10/2012</a:t>
             </a:fld>
             <a:endParaRPr lang="en-US" dirty="0"/>
           </a:p>
@@ -3058,12 +3143,24 @@
               <a:rPr lang="en-US" dirty="0" smtClean="0"/>
             </a:br>
             <a:r>
+              <a:rPr lang="en-US" dirty="0"/>
+              <a:t>Android </a:t>
+            </a:r>
+            <a:r>
               <a:rPr lang="en-US" dirty="0" smtClean="0"/>
-              <a:t>Situational Awareness</a:t>
+              <a:t>Based Situational </a:t>
             </a:r>
             <a:r>
               <a:rPr lang="en-US" dirty="0" smtClean="0"/>
-              <a:t>: Moving Map</a:t>
+              <a:t>Awareness: </a:t>
+            </a:r>
+            <a:r>
+              <a:rPr lang="en-US" dirty="0" smtClean="0"/>
+              <a:t>Moving </a:t>
+            </a:r>
+            <a:r>
+              <a:rPr lang="en-US" dirty="0" smtClean="0"/>
+              <a:t>Map</a:t>
             </a:r>
             <a:br>
               <a:rPr lang="en-US" dirty="0" smtClean="0"/>
@@ -3187,7 +3284,7 @@
       </p:grpSpPr>
       <p:sp>
         <p:nvSpPr>
-          <p:cNvPr id="2" name="Title 1"/>
+          <p:cNvPr id="6" name="Title 5"/>
           <p:cNvSpPr>
             <a:spLocks noGrp="1"/>
           </p:cNvSpPr>
@@ -3195,19 +3292,16 @@
             <p:ph type="title"/>
           </p:nvPr>
         </p:nvSpPr>
-        <p:spPr>
-          <a:xfrm>
-            <a:off x="749745" y="2751836"/>
-            <a:ext cx="7772400" cy="1362075"/>
-          </a:xfrm>
-        </p:spPr>
-        <p:txBody>
-          <a:bodyPr/>
+        <p:spPr/>
+        <p:txBody>
+          <a:bodyPr>
+            <a:normAutofit fontScale="90000"/>
+          </a:bodyPr>
           <a:lstStyle/>
           <a:p>
             <a:r>
               <a:rPr lang="en-US" dirty="0" smtClean="0"/>
-              <a:t>Backup Slides</a:t>
+              <a:t>Lessons Learned</a:t>
             </a:r>
             <a:endParaRPr lang="en-US" dirty="0"/>
           </a:p>
@@ -3215,12 +3309,12 @@
       </p:sp>
       <p:sp>
         <p:nvSpPr>
-          <p:cNvPr id="3" name="Text Placeholder 2"/>
-          <p:cNvSpPr>
-            <a:spLocks noGrp="1"/>
-          </p:cNvSpPr>
-          <p:nvPr>
-            <p:ph type="body" idx="1"/>
+          <p:cNvPr id="7" name="Content Placeholder 6"/>
+          <p:cNvSpPr>
+            <a:spLocks noGrp="1"/>
+          </p:cNvSpPr>
+          <p:nvPr>
+            <p:ph sz="half" idx="1"/>
           </p:nvPr>
         </p:nvSpPr>
         <p:spPr/>
@@ -3230,30 +3324,48 @@
           </a:bodyPr>
           <a:lstStyle/>
           <a:p>
+            <a:pPr marL="0" indent="0">
+              <a:buNone/>
+            </a:pPr>
+            <a:r>
+              <a:rPr lang="en-US" sz="2400" b="1" dirty="0" smtClean="0"/>
+              <a:t>Positive Items</a:t>
+            </a:r>
+          </a:p>
+          <a:p>
             <a:r>
               <a:rPr lang="en-US" sz="1800" dirty="0" smtClean="0"/>
-              <a:t>Include extra slides if discussion goes ‘deeper</a:t>
-            </a:r>
-            <a:r>
-              <a:rPr lang="en-US" sz="1800" dirty="0"/>
-              <a:t>’ and all slides from after </a:t>
+              <a:t>Color code MS project </a:t>
+            </a:r>
+            <a:r>
+              <a:rPr lang="en-US" sz="1800" dirty="0" err="1"/>
+              <a:t>G</a:t>
+            </a:r>
+            <a:r>
+              <a:rPr lang="en-US" sz="1800" dirty="0" err="1" smtClean="0"/>
+              <a:t>annt</a:t>
             </a:r>
             <a:r>
               <a:rPr lang="en-US" sz="1800" dirty="0" smtClean="0"/>
-              <a:t>meeting</a:t>
-            </a:r>
-            <a:endParaRPr lang="en-US" sz="1800" dirty="0"/>
-          </a:p>
-        </p:txBody>
-      </p:sp>
-      <p:sp>
-        <p:nvSpPr>
-          <p:cNvPr id="4" name="Date Placeholder 3"/>
-          <p:cNvSpPr>
-            <a:spLocks noGrp="1"/>
-          </p:cNvSpPr>
-          <p:nvPr>
-            <p:ph type="dt" sz="half" idx="10"/>
+              <a:t> to identify each resource</a:t>
+            </a:r>
+          </a:p>
+          <a:p>
+            <a:r>
+              <a:rPr lang="en-US" sz="1800" dirty="0" smtClean="0"/>
+              <a:t>Etc.</a:t>
+            </a:r>
+          </a:p>
+        </p:txBody>
+      </p:sp>
+      <p:sp>
+        <p:nvSpPr>
+          <p:cNvPr id="8" name="Content Placeholder 7"/>
+          <p:cNvSpPr>
+            <a:spLocks noGrp="1"/>
+          </p:cNvSpPr>
+          <p:nvPr>
+            <p:ph sz="half" idx="2"/>
           </p:nvPr>
         </p:nvSpPr>
         <p:spPr/>
@@ -3261,10 +3373,55 @@
           <a:bodyPr/>
           <a:lstStyle/>
           <a:p>
+            <a:pPr marL="0" indent="0">
+              <a:buNone/>
+            </a:pPr>
+            <a:r>
+              <a:rPr lang="en-US" sz="2400" b="1" dirty="0" smtClean="0"/>
+              <a:t>Improvements or Changes</a:t>
+            </a:r>
+          </a:p>
+          <a:p>
+            <a:r>
+              <a:rPr lang="en-US" sz="1800" dirty="0" smtClean="0"/>
+              <a:t>Example: Do not pull all </a:t>
+            </a:r>
+            <a:r>
+              <a:rPr lang="en-US" sz="1800" dirty="0" err="1" smtClean="0"/>
+              <a:t>nighter</a:t>
+            </a:r>
+            <a:r>
+              <a:rPr lang="en-US" sz="1800" dirty="0" smtClean="0"/>
+              <a:t> before meetings</a:t>
+            </a:r>
+          </a:p>
+          <a:p>
+            <a:r>
+              <a:rPr lang="en-US" sz="1800" dirty="0" smtClean="0"/>
+              <a:t>Etc.</a:t>
+            </a:r>
+          </a:p>
+        </p:txBody>
+      </p:sp>
+      <p:sp>
+        <p:nvSpPr>
+          <p:cNvPr id="4" name="Date Placeholder 3"/>
+          <p:cNvSpPr>
+            <a:spLocks noGrp="1"/>
+          </p:cNvSpPr>
+          <p:nvPr>
+            <p:ph type="dt" sz="half" idx="10"/>
+          </p:nvPr>
+        </p:nvSpPr>
+        <p:spPr/>
+        <p:txBody>
+          <a:bodyPr/>
+          <a:lstStyle/>
+          <a:p>
             <a:fld id="{7E42FB2E-ABA8-41CA-9C7C-28F5EB525474}" type="datetime1">
               <a:rPr lang="en-US" smtClean="0"/>
               <a:pPr/>
-              <a:t>9/7/2012</a:t>
+              <a:t>9/10/2012</a:t>
             </a:fld>
             <a:endParaRPr lang="en-US" dirty="0"/>
           </a:p>
@@ -3297,7 +3454,7 @@
     </p:spTree>
     <p:extLst>
       <p:ext uri="{BB962C8B-B14F-4D97-AF65-F5344CB8AC3E}">
-        <p14:creationId xmlns:p14="http://schemas.microsoft.com/office/powerpoint/2010/main" val="2713489721"/>
+        <p14:creationId xmlns:p14="http://schemas.microsoft.com/office/powerpoint/2010/main" val="3481864823"/>
       </p:ext>
     </p:extLst>
   </p:cSld>
@@ -3333,7 +3490,7 @@
       </p:grpSpPr>
       <p:sp>
         <p:nvSpPr>
-          <p:cNvPr id="6" name="Title 5"/>
+          <p:cNvPr id="2" name="Title 1"/>
           <p:cNvSpPr>
             <a:spLocks noGrp="1"/>
           </p:cNvSpPr>
@@ -3350,71 +3507,49 @@
           <a:p>
             <a:r>
               <a:rPr lang="en-US" dirty="0" smtClean="0"/>
-              <a:t>Lessons Learned</a:t>
+              <a:t>Project UML Diagram</a:t>
             </a:r>
             <a:endParaRPr lang="en-US" dirty="0"/>
           </a:p>
         </p:txBody>
       </p:sp>
-      <p:sp>
-        <p:nvSpPr>
-          <p:cNvPr id="7" name="Content Placeholder 6"/>
-          <p:cNvSpPr>
-            <a:spLocks noGrp="1"/>
-          </p:cNvSpPr>
-          <p:nvPr>
-            <p:ph sz="half" idx="1"/>
-          </p:nvPr>
-        </p:nvSpPr>
-        <p:spPr/>
-        <p:txBody>
-          <a:bodyPr>
-            <a:normAutofit/>
-          </a:bodyPr>
-          <a:lstStyle/>
-          <a:p>
-            <a:pPr marL="0" indent="0">
-              <a:buNone/>
-            </a:pPr>
-            <a:r>
-              <a:rPr lang="en-US" sz="2400" b="1" dirty="0" smtClean="0"/>
-              <a:t>Positive Items</a:t>
-            </a:r>
-          </a:p>
-          <a:p>
-            <a:r>
-              <a:rPr lang="en-US" sz="1800" dirty="0" smtClean="0"/>
-              <a:t>Color code MS project </a:t>
-            </a:r>
-            <a:r>
-              <a:rPr lang="en-US" sz="1800" dirty="0" err="1"/>
-              <a:t>G</a:t>
-            </a:r>
-            <a:r>
-              <a:rPr lang="en-US" sz="1800" dirty="0" err="1" smtClean="0"/>
-              <a:t>annt</a:t>
-            </a:r>
-            <a:r>
-              <a:rPr lang="en-US" sz="1800" dirty="0" smtClean="0"/>
-              <a:t> to identify each resource</a:t>
-            </a:r>
-          </a:p>
-          <a:p>
-            <a:r>
-              <a:rPr lang="en-US" sz="1800" dirty="0" smtClean="0"/>
-              <a:t>Etc.</a:t>
-            </a:r>
-          </a:p>
-        </p:txBody>
-      </p:sp>
-      <p:sp>
-        <p:nvSpPr>
-          <p:cNvPr id="8" name="Content Placeholder 7"/>
-          <p:cNvSpPr>
-            <a:spLocks noGrp="1"/>
-          </p:cNvSpPr>
-          <p:nvPr>
-            <p:ph sz="half" idx="2"/>
+      <p:pic>
+        <p:nvPicPr>
+          <p:cNvPr id="6" name="Content Placeholder 5"/>
+          <p:cNvPicPr>
+            <a:picLocks noGrp="1" noChangeAspect="1"/>
+          </p:cNvPicPr>
+          <p:nvPr>
+            <p:ph idx="1"/>
+          </p:nvPr>
+        </p:nvPicPr>
+        <p:blipFill>
+          <a:blip r:embed="rId3">
+            <a:extLst>
+              <a:ext uri="{28A0092B-C50C-407E-A947-70E740481C1C}">
+                <a14:useLocalDpi xmlns:a14="http://schemas.microsoft.com/office/drawing/2010/main" val="0"/>
+              </a:ext>
+            </a:extLst>
+          </a:blip>
+          <a:stretch>
+            <a:fillRect/>
+          </a:stretch>
+        </p:blipFill>
+        <p:spPr>
+          <a:xfrm>
+            <a:off x="1100054" y="855663"/>
+            <a:ext cx="6943891" cy="5416550"/>
+          </a:xfrm>
+        </p:spPr>
+      </p:pic>
+      <p:sp>
+        <p:nvSpPr>
+          <p:cNvPr id="4" name="Date Placeholder 3"/>
+          <p:cNvSpPr>
+            <a:spLocks noGrp="1"/>
+          </p:cNvSpPr>
+          <p:nvPr>
+            <p:ph type="dt" sz="half" idx="10"/>
           </p:nvPr>
         </p:nvSpPr>
         <p:spPr/>
@@ -3422,55 +3557,10 @@
           <a:bodyPr/>
           <a:lstStyle/>
           <a:p>
-            <a:pPr marL="0" indent="0">
-              <a:buNone/>
-            </a:pPr>
-            <a:r>
-              <a:rPr lang="en-US" sz="2400" b="1" dirty="0" smtClean="0"/>
-              <a:t>Improvements or Changes</a:t>
-            </a:r>
-          </a:p>
-          <a:p>
-            <a:r>
-              <a:rPr lang="en-US" sz="1800" dirty="0" smtClean="0"/>
-              <a:t>Example: Do not pull all </a:t>
-            </a:r>
-            <a:r>
-              <a:rPr lang="en-US" sz="1800" dirty="0" err="1" smtClean="0"/>
-              <a:t>nighter</a:t>
-            </a:r>
-            <a:r>
-              <a:rPr lang="en-US" sz="1800" dirty="0" smtClean="0"/>
-              <a:t> before meetings</a:t>
-            </a:r>
-          </a:p>
-          <a:p>
-            <a:r>
-              <a:rPr lang="en-US" sz="1800" dirty="0" smtClean="0"/>
-              <a:t>Etc.</a:t>
-            </a:r>
-          </a:p>
-        </p:txBody>
-      </p:sp>
-      <p:sp>
-        <p:nvSpPr>
-          <p:cNvPr id="4" name="Date Placeholder 3"/>
-          <p:cNvSpPr>
-            <a:spLocks noGrp="1"/>
-          </p:cNvSpPr>
-          <p:nvPr>
-            <p:ph type="dt" sz="half" idx="10"/>
-          </p:nvPr>
-        </p:nvSpPr>
-        <p:spPr/>
-        <p:txBody>
-          <a:bodyPr/>
-          <a:lstStyle/>
-          <a:p>
-            <a:fld id="{7E42FB2E-ABA8-41CA-9C7C-28F5EB525474}" type="datetime1">
+            <a:fld id="{373724D0-DD0F-42EF-84DE-838DB5D26951}" type="datetime1">
               <a:rPr lang="en-US" smtClean="0"/>
               <a:pPr/>
-              <a:t>9/7/2012</a:t>
+              <a:t>9/10/2012</a:t>
             </a:fld>
             <a:endParaRPr lang="en-US" dirty="0"/>
           </a:p>
@@ -3496,20 +3586,23 @@
               <a:pPr/>
               <a:t>11</a:t>
             </a:fld>
-            <a:endParaRPr lang="en-US" dirty="0"/>
+            <a:endParaRPr lang="en-US"/>
           </a:p>
         </p:txBody>
       </p:sp>
     </p:spTree>
     <p:extLst>
       <p:ext uri="{BB962C8B-B14F-4D97-AF65-F5344CB8AC3E}">
-        <p14:creationId xmlns:p14="http://schemas.microsoft.com/office/powerpoint/2010/main" val="3481864823"/>
+        <p14:creationId xmlns:p14="http://schemas.microsoft.com/office/powerpoint/2010/main" val="3690794059"/>
       </p:ext>
     </p:extLst>
   </p:cSld>
   <p:clrMapOvr>
     <a:masterClrMapping/>
   </p:clrMapOvr>
+  <p:transition>
+    <p:fade/>
+  </p:transition>
   <p:timing>
     <p:tnLst>
       <p:par>
@@ -3575,7 +3668,7 @@
         <p:spPr/>
         <p:txBody>
           <a:bodyPr>
-            <a:normAutofit fontScale="85000" lnSpcReduction="20000"/>
+            <a:normAutofit fontScale="92500" lnSpcReduction="20000"/>
           </a:bodyPr>
           <a:lstStyle/>
           <a:p>
@@ -3590,7 +3683,6 @@
               <a:rPr lang="en-US" sz="1600" dirty="0" smtClean="0"/>
               <a:t>There are no current Raytheon non-web based mapping applications on an Android device. </a:t>
             </a:r>
-            <a:endParaRPr lang="en-US" sz="1600" dirty="0" smtClean="0"/>
           </a:p>
           <a:p>
             <a:pPr marL="0" indent="0">
@@ -3608,15 +3700,7 @@
             </a:r>
             <a:r>
               <a:rPr lang="en-US" sz="1600" dirty="0" smtClean="0"/>
-              <a:t>Concept of Operations) </a:t>
-            </a:r>
-            <a:r>
-              <a:rPr lang="en-US" sz="1600" dirty="0" smtClean="0"/>
-              <a:t>The application </a:t>
-            </a:r>
-            <a:r>
-              <a:rPr lang="en-US" sz="1600" dirty="0" smtClean="0"/>
-              <a:t>is intended for soldiers, law enforcement officers, or other personnel without access to the Internet. The application will be compatible with Android devices.</a:t>
+              <a:t>Concept of Operations) The application is intended for soldiers, law enforcement officers, or other personnel without access to the Internet. The application will be compatible with Android devices.</a:t>
             </a:r>
           </a:p>
           <a:p>
@@ -3631,11 +3715,7 @@
             </a:pPr>
             <a:r>
               <a:rPr lang="en-US" sz="1600" b="1" dirty="0" smtClean="0"/>
-              <a:t>Key Assumptions</a:t>
-            </a:r>
-            <a:r>
-              <a:rPr lang="en-US" sz="1600" b="1" dirty="0" smtClean="0"/>
-              <a:t>:</a:t>
+              <a:t>Key Assumptions:</a:t>
             </a:r>
             <a:endParaRPr lang="en-US" sz="1600" dirty="0" smtClean="0"/>
           </a:p>
@@ -3643,11 +3723,7 @@
             <a:pPr marL="233363" indent="-177800"/>
             <a:r>
               <a:rPr lang="en-US" sz="1600" dirty="0" smtClean="0"/>
-              <a:t>Raytheon </a:t>
-            </a:r>
-            <a:r>
-              <a:rPr lang="en-US" sz="1600" dirty="0" smtClean="0"/>
-              <a:t>will provide one 10” Samsung Galaxy Tablet</a:t>
+              <a:t>Raytheon will provide one 10” Samsung Galaxy Tablet</a:t>
             </a:r>
           </a:p>
           <a:p>
@@ -3662,11 +3738,7 @@
             </a:pPr>
             <a:r>
               <a:rPr lang="en-US" sz="1600" b="1" dirty="0" smtClean="0"/>
-              <a:t>Critical Success Factors</a:t>
-            </a:r>
-            <a:r>
-              <a:rPr lang="en-US" sz="1600" b="1" dirty="0" smtClean="0"/>
-              <a:t>:</a:t>
+              <a:t>Critical Success Factors:</a:t>
             </a:r>
             <a:endParaRPr lang="en-US" sz="1600" dirty="0" smtClean="0"/>
           </a:p>
@@ -3674,46 +3746,29 @@
             <a:pPr marL="233363" indent="-177800"/>
             <a:r>
               <a:rPr lang="en-US" sz="1600" dirty="0" smtClean="0"/>
-              <a:t>Meet academic requirements</a:t>
+              <a:t>Selected a map engine by 9/19/2012</a:t>
             </a:r>
           </a:p>
           <a:p>
             <a:pPr marL="233363" indent="-177800"/>
             <a:r>
               <a:rPr lang="en-US" sz="1600" dirty="0" smtClean="0"/>
-              <a:t>Completion of all deliverables</a:t>
-            </a:r>
-          </a:p>
-          <a:p>
-            <a:pPr marL="233363" indent="-177800"/>
-            <a:r>
-              <a:rPr lang="en-US" sz="1600" dirty="0" smtClean="0"/>
-              <a:t>Having a locally based moving map</a:t>
-            </a:r>
-          </a:p>
-          <a:p>
-            <a:pPr marL="233363" indent="-177800"/>
-            <a:r>
-              <a:rPr lang="en-US" sz="1600" dirty="0" smtClean="0"/>
-              <a:t>Accessing application from an Android device</a:t>
-            </a:r>
-            <a:endParaRPr lang="en-US" sz="1600" dirty="0" smtClean="0"/>
-          </a:p>
-          <a:p>
-            <a:pPr marL="233363" indent="-177800"/>
-            <a:endParaRPr lang="en-US" sz="1600" dirty="0" smtClean="0"/>
+              <a:t>Screen shots of existing applications by 9/19/2012</a:t>
+            </a:r>
           </a:p>
           <a:p>
             <a:pPr marL="55563" indent="0">
               <a:buNone/>
             </a:pPr>
+            <a:endParaRPr lang="en-US" sz="1600" dirty="0" smtClean="0"/>
+          </a:p>
+          <a:p>
+            <a:pPr marL="55563" indent="0">
+              <a:buNone/>
+            </a:pPr>
             <a:r>
               <a:rPr lang="en-US" sz="1600" b="1" dirty="0" smtClean="0"/>
-              <a:t>Buyoff </a:t>
-            </a:r>
-            <a:r>
-              <a:rPr lang="en-US" sz="1600" b="1" dirty="0" smtClean="0"/>
-              <a:t>Criteria:</a:t>
+              <a:t>Buyoff Criteria:</a:t>
             </a:r>
             <a:endParaRPr lang="en-US" sz="1600" dirty="0" smtClean="0"/>
           </a:p>
@@ -3728,11 +3783,7 @@
             <a:pPr marL="233363" indent="-177800"/>
             <a:r>
               <a:rPr lang="en-US" sz="1600" dirty="0" smtClean="0"/>
-              <a:t>Successful </a:t>
-            </a:r>
-            <a:r>
-              <a:rPr lang="en-US" sz="1600" dirty="0" smtClean="0"/>
-              <a:t>completion of all university project requirements</a:t>
+              <a:t>Successful completion of all university project requirements</a:t>
             </a:r>
           </a:p>
           <a:p>
@@ -3866,7 +3917,7 @@
             <a:fld id="{373724D0-DD0F-42EF-84DE-838DB5D26951}" type="datetime1">
               <a:rPr lang="en-US" smtClean="0"/>
               <a:pPr/>
-              <a:t>9/7/2012</a:t>
+              <a:t>9/10/2012</a:t>
             </a:fld>
             <a:endParaRPr lang="en-US" dirty="0"/>
           </a:p>
@@ -4076,7 +4127,7 @@
             <a:fld id="{373724D0-DD0F-42EF-84DE-838DB5D26951}" type="datetime1">
               <a:rPr lang="en-US" smtClean="0"/>
               <a:pPr/>
-              <a:t>9/7/2012</a:t>
+              <a:t>9/10/2012</a:t>
             </a:fld>
             <a:endParaRPr lang="en-US" dirty="0"/>
           </a:p>
@@ -4218,7 +4269,7 @@
             <a:fld id="{373724D0-DD0F-42EF-84DE-838DB5D26951}" type="datetime1">
               <a:rPr lang="en-US" smtClean="0"/>
               <a:pPr/>
-              <a:t>9/7/2012</a:t>
+              <a:t>9/10/2012</a:t>
             </a:fld>
             <a:endParaRPr lang="en-US" dirty="0"/>
           </a:p>
@@ -4305,148 +4356,6 @@
           </a:bodyPr>
           <a:lstStyle/>
           <a:p>
-            <a:r>
-              <a:rPr lang="en-US" dirty="0" smtClean="0"/>
-              <a:t>Project UML Diagram</a:t>
-            </a:r>
-            <a:endParaRPr lang="en-US" dirty="0"/>
-          </a:p>
-        </p:txBody>
-      </p:sp>
-      <p:pic>
-        <p:nvPicPr>
-          <p:cNvPr id="6" name="Content Placeholder 5"/>
-          <p:cNvPicPr>
-            <a:picLocks noGrp="1" noChangeAspect="1"/>
-          </p:cNvPicPr>
-          <p:nvPr>
-            <p:ph idx="1"/>
-          </p:nvPr>
-        </p:nvPicPr>
-        <p:blipFill>
-          <a:blip r:embed="rId2">
-            <a:extLst>
-              <a:ext uri="{28A0092B-C50C-407E-A947-70E740481C1C}">
-                <a14:useLocalDpi xmlns:a14="http://schemas.microsoft.com/office/drawing/2010/main" val="0"/>
-              </a:ext>
-            </a:extLst>
-          </a:blip>
-          <a:stretch>
-            <a:fillRect/>
-          </a:stretch>
-        </p:blipFill>
-        <p:spPr>
-          <a:xfrm>
-            <a:off x="1100054" y="855663"/>
-            <a:ext cx="6943891" cy="5416550"/>
-          </a:xfrm>
-        </p:spPr>
-      </p:pic>
-      <p:sp>
-        <p:nvSpPr>
-          <p:cNvPr id="4" name="Date Placeholder 3"/>
-          <p:cNvSpPr>
-            <a:spLocks noGrp="1"/>
-          </p:cNvSpPr>
-          <p:nvPr>
-            <p:ph type="dt" sz="half" idx="10"/>
-          </p:nvPr>
-        </p:nvSpPr>
-        <p:spPr/>
-        <p:txBody>
-          <a:bodyPr/>
-          <a:lstStyle/>
-          <a:p>
-            <a:fld id="{373724D0-DD0F-42EF-84DE-838DB5D26951}" type="datetime1">
-              <a:rPr lang="en-US" smtClean="0"/>
-              <a:pPr/>
-              <a:t>9/7/2012</a:t>
-            </a:fld>
-            <a:endParaRPr lang="en-US" dirty="0"/>
-          </a:p>
-        </p:txBody>
-      </p:sp>
-      <p:sp>
-        <p:nvSpPr>
-          <p:cNvPr id="5" name="Slide Number Placeholder 4"/>
-          <p:cNvSpPr>
-            <a:spLocks noGrp="1"/>
-          </p:cNvSpPr>
-          <p:nvPr>
-            <p:ph type="sldNum" sz="quarter" idx="12"/>
-          </p:nvPr>
-        </p:nvSpPr>
-        <p:spPr/>
-        <p:txBody>
-          <a:bodyPr/>
-          <a:lstStyle/>
-          <a:p>
-            <a:fld id="{8D57DBB9-07C6-49AB-BFD5-E737C7E241F6}" type="slidenum">
-              <a:rPr lang="en-US" smtClean="0"/>
-              <a:pPr/>
-              <a:t>5</a:t>
-            </a:fld>
-            <a:endParaRPr lang="en-US"/>
-          </a:p>
-        </p:txBody>
-      </p:sp>
-    </p:spTree>
-    <p:extLst>
-      <p:ext uri="{BB962C8B-B14F-4D97-AF65-F5344CB8AC3E}">
-        <p14:creationId xmlns:p14="http://schemas.microsoft.com/office/powerpoint/2010/main" val="3690794059"/>
-      </p:ext>
-    </p:extLst>
-  </p:cSld>
-  <p:clrMapOvr>
-    <a:masterClrMapping/>
-  </p:clrMapOvr>
-  <p:transition>
-    <p:fade/>
-  </p:transition>
-  <p:timing>
-    <p:tnLst>
-      <p:par>
-        <p:cTn id="1" dur="indefinite" restart="never" nodeType="tmRoot"/>
-      </p:par>
-    </p:tnLst>
-  </p:timing>
-</p:sld>
-</file>
-
-<file path=ppt/slides/slide6.xml><?xml version="1.0" encoding="utf-8"?>
-<p:sld xmlns:a="http://schemas.openxmlformats.org/drawingml/2006/main" xmlns:r="http://schemas.openxmlformats.org/officeDocument/2006/relationships" xmlns:p="http://schemas.openxmlformats.org/presentationml/2006/main">
-  <p:cSld>
-    <p:spTree>
-      <p:nvGrpSpPr>
-        <p:cNvPr id="1" name=""/>
-        <p:cNvGrpSpPr/>
-        <p:nvPr/>
-      </p:nvGrpSpPr>
-      <p:grpSpPr>
-        <a:xfrm>
-          <a:off x="0" y="0"/>
-          <a:ext cx="0" cy="0"/>
-          <a:chOff x="0" y="0"/>
-          <a:chExt cx="0" cy="0"/>
-        </a:xfrm>
-      </p:grpSpPr>
-      <p:sp>
-        <p:nvSpPr>
-          <p:cNvPr id="2" name="Title 1"/>
-          <p:cNvSpPr>
-            <a:spLocks noGrp="1"/>
-          </p:cNvSpPr>
-          <p:nvPr>
-            <p:ph type="title"/>
-          </p:nvPr>
-        </p:nvSpPr>
-        <p:spPr/>
-        <p:txBody>
-          <a:bodyPr>
-            <a:normAutofit fontScale="90000"/>
-          </a:bodyPr>
-          <a:lstStyle/>
-          <a:p>
             <a:endParaRPr lang="en-US"/>
           </a:p>
         </p:txBody>
@@ -4491,7 +4400,7 @@
             <a:fld id="{373724D0-DD0F-42EF-84DE-838DB5D26951}" type="datetime1">
               <a:rPr lang="en-US" smtClean="0"/>
               <a:pPr/>
-              <a:t>9/7/2012</a:t>
+              <a:t>9/10/2012</a:t>
             </a:fld>
             <a:endParaRPr lang="en-US" dirty="0"/>
           </a:p>
@@ -4515,7 +4424,7 @@
             <a:fld id="{8D57DBB9-07C6-49AB-BFD5-E737C7E241F6}" type="slidenum">
               <a:rPr lang="en-US" smtClean="0"/>
               <a:pPr/>
-              <a:t>6</a:t>
+              <a:t>5</a:t>
             </a:fld>
             <a:endParaRPr lang="en-US"/>
           </a:p>
@@ -4585,7 +4494,7 @@
 </p:sld>
 </file>
 
-<file path=ppt/slides/slide7.xml><?xml version="1.0" encoding="utf-8"?>
+<file path=ppt/slides/slide6.xml><?xml version="1.0" encoding="utf-8"?>
 <p:sld xmlns:a="http://schemas.openxmlformats.org/drawingml/2006/main" xmlns:r="http://schemas.openxmlformats.org/officeDocument/2006/relationships" xmlns:p="http://schemas.openxmlformats.org/presentationml/2006/main">
   <p:cSld>
     <p:spTree>
@@ -4679,7 +4588,7 @@
             <a:fld id="{7E42FB2E-ABA8-41CA-9C7C-28F5EB525474}" type="datetime1">
               <a:rPr lang="en-US" smtClean="0"/>
               <a:pPr/>
-              <a:t>9/7/2012</a:t>
+              <a:t>9/10/2012</a:t>
             </a:fld>
             <a:endParaRPr lang="en-US" dirty="0"/>
           </a:p>
@@ -4703,7 +4612,7 @@
             <a:fld id="{8D57DBB9-07C6-49AB-BFD5-E737C7E241F6}" type="slidenum">
               <a:rPr lang="en-US" smtClean="0"/>
               <a:pPr/>
-              <a:t>7</a:t>
+              <a:t>6</a:t>
             </a:fld>
             <a:endParaRPr lang="en-US" dirty="0"/>
           </a:p>
@@ -4732,7 +4641,7 @@
 </p:sld>
 </file>
 
-<file path=ppt/slides/slide8.xml><?xml version="1.0" encoding="utf-8"?>
+<file path=ppt/slides/slide7.xml><?xml version="1.0" encoding="utf-8"?>
 <p:sld xmlns:a="http://schemas.openxmlformats.org/drawingml/2006/main" xmlns:r="http://schemas.openxmlformats.org/officeDocument/2006/relationships" xmlns:p="http://schemas.openxmlformats.org/presentationml/2006/main">
   <p:cSld>
     <p:spTree>
@@ -4792,7 +4701,7 @@
             <a:fld id="{7E42FB2E-ABA8-41CA-9C7C-28F5EB525474}" type="datetime1">
               <a:rPr lang="en-US" smtClean="0"/>
               <a:pPr/>
-              <a:t>9/7/2012</a:t>
+              <a:t>9/10/2012</a:t>
             </a:fld>
             <a:endParaRPr lang="en-US" dirty="0"/>
           </a:p>
@@ -4816,7 +4725,7 @@
             <a:fld id="{8D57DBB9-07C6-49AB-BFD5-E737C7E241F6}" type="slidenum">
               <a:rPr lang="en-US" smtClean="0"/>
               <a:pPr/>
-              <a:t>8</a:t>
+              <a:t>7</a:t>
             </a:fld>
             <a:endParaRPr lang="en-US" dirty="0"/>
           </a:p>
@@ -5177,16 +5086,6 @@
               </a:rPr>
               <a:t>Client Contact</a:t>
             </a:r>
-            <a:endParaRPr kumimoji="0" lang="en-US" sz="1200" b="0" i="0" u="none" strike="noStrike" cap="none" normalizeH="0" baseline="0" dirty="0" smtClean="0">
-              <a:ln>
-                <a:noFill/>
-              </a:ln>
-              <a:solidFill>
-                <a:sysClr val="windowText" lastClr="000000"/>
-              </a:solidFill>
-              <a:effectLst/>
-              <a:latin typeface="+mj-lt"/>
-            </a:endParaRPr>
           </a:p>
           <a:p>
             <a:pPr marL="0" marR="0" indent="0" algn="ctr" defTabSz="914400" rtl="0" eaLnBrk="0" fontAlgn="base" latinLnBrk="0" hangingPunct="0">
@@ -5325,16 +5224,7 @@
                 </a:solidFill>
                 <a:latin typeface="+mj-lt"/>
               </a:rPr>
-              <a:t>Software </a:t>
-            </a:r>
-            <a:r>
-              <a:rPr lang="en-US" sz="1200" dirty="0" smtClean="0">
-                <a:solidFill>
-                  <a:sysClr val="windowText" lastClr="000000"/>
-                </a:solidFill>
-                <a:latin typeface="+mj-lt"/>
-              </a:rPr>
-              <a:t>Engineer</a:t>
+              <a:t>Software Engineer</a:t>
             </a:r>
             <a:endParaRPr kumimoji="0" lang="en-US" sz="1200" b="0" i="0" u="none" strike="noStrike" cap="none" normalizeH="0" baseline="0" dirty="0" smtClean="0">
               <a:ln>
@@ -5447,16 +5337,7 @@
                 </a:solidFill>
                 <a:latin typeface="+mj-lt"/>
               </a:rPr>
-              <a:t>Software </a:t>
-            </a:r>
-            <a:r>
-              <a:rPr lang="en-US" sz="1200" dirty="0" smtClean="0">
-                <a:solidFill>
-                  <a:sysClr val="windowText" lastClr="000000"/>
-                </a:solidFill>
-                <a:latin typeface="+mj-lt"/>
-              </a:rPr>
-              <a:t>Engineer</a:t>
+              <a:t>Software Engineer</a:t>
             </a:r>
             <a:endParaRPr kumimoji="0" lang="en-US" sz="1200" b="0" i="0" u="none" strike="noStrike" cap="none" normalizeH="0" baseline="0" dirty="0" smtClean="0">
               <a:ln>
@@ -6136,6 +6017,182 @@
 </p:sld>
 </file>
 
+<file path=ppt/slides/slide8.xml><?xml version="1.0" encoding="utf-8"?>
+<p:sld xmlns:a="http://schemas.openxmlformats.org/drawingml/2006/main" xmlns:r="http://schemas.openxmlformats.org/officeDocument/2006/relationships" xmlns:p="http://schemas.openxmlformats.org/presentationml/2006/main">
+  <p:cSld>
+    <p:spTree>
+      <p:nvGrpSpPr>
+        <p:cNvPr id="1" name=""/>
+        <p:cNvGrpSpPr/>
+        <p:nvPr/>
+      </p:nvGrpSpPr>
+      <p:grpSpPr>
+        <a:xfrm>
+          <a:off x="0" y="0"/>
+          <a:ext cx="0" cy="0"/>
+          <a:chOff x="0" y="0"/>
+          <a:chExt cx="0" cy="0"/>
+        </a:xfrm>
+      </p:grpSpPr>
+      <p:sp>
+        <p:nvSpPr>
+          <p:cNvPr id="5" name="Title 4"/>
+          <p:cNvSpPr>
+            <a:spLocks noGrp="1"/>
+          </p:cNvSpPr>
+          <p:nvPr>
+            <p:ph type="title"/>
+          </p:nvPr>
+        </p:nvSpPr>
+        <p:spPr/>
+        <p:txBody>
+          <a:bodyPr>
+            <a:normAutofit fontScale="90000"/>
+          </a:bodyPr>
+          <a:lstStyle/>
+          <a:p>
+            <a:r>
+              <a:rPr lang="en-US" dirty="0" smtClean="0"/>
+              <a:t>Assumptions, Risks, &amp; Opportunities</a:t>
+            </a:r>
+            <a:endParaRPr lang="en-US" dirty="0"/>
+          </a:p>
+        </p:txBody>
+      </p:sp>
+      <p:sp>
+        <p:nvSpPr>
+          <p:cNvPr id="6" name="Content Placeholder 5"/>
+          <p:cNvSpPr>
+            <a:spLocks noGrp="1"/>
+          </p:cNvSpPr>
+          <p:nvPr>
+            <p:ph idx="1"/>
+          </p:nvPr>
+        </p:nvSpPr>
+        <p:spPr/>
+        <p:txBody>
+          <a:bodyPr>
+            <a:normAutofit/>
+          </a:bodyPr>
+          <a:lstStyle/>
+          <a:p>
+            <a:r>
+              <a:rPr lang="en-US" sz="2400" dirty="0" smtClean="0"/>
+              <a:t>Find </a:t>
+            </a:r>
+            <a:r>
+              <a:rPr lang="en-US" sz="2400" dirty="0" smtClean="0"/>
+              <a:t>a way to use already implemented  mapping tools (e.g. panning, zooming</a:t>
+            </a:r>
+            <a:r>
+              <a:rPr lang="en-US" sz="2400" dirty="0" smtClean="0"/>
+              <a:t>)</a:t>
+            </a:r>
+          </a:p>
+          <a:p>
+            <a:r>
+              <a:rPr lang="en-US" sz="2400" dirty="0" smtClean="0"/>
+              <a:t>Find a mapping engine that supports the correct mapping format</a:t>
+            </a:r>
+          </a:p>
+          <a:p>
+            <a:r>
+              <a:rPr lang="en-US" sz="2400" dirty="0" smtClean="0"/>
+              <a:t>Libraries for</a:t>
+            </a:r>
+            <a:r>
+              <a:rPr lang="en-US" sz="2400" dirty="0" smtClean="0"/>
+              <a:t> pulling mapping information from local server (e.g. </a:t>
+            </a:r>
+            <a:r>
+              <a:rPr lang="en-US" sz="2400" dirty="0" err="1" smtClean="0"/>
+              <a:t>Wifi</a:t>
+            </a:r>
+            <a:r>
+              <a:rPr lang="en-US" sz="2400" dirty="0" smtClean="0"/>
+              <a:t>, </a:t>
+            </a:r>
+            <a:r>
+              <a:rPr lang="en-US" sz="2400" smtClean="0"/>
+              <a:t>USB)</a:t>
+            </a:r>
+          </a:p>
+          <a:p>
+            <a:endParaRPr lang="en-US" sz="2400" dirty="0"/>
+          </a:p>
+        </p:txBody>
+      </p:sp>
+      <p:sp>
+        <p:nvSpPr>
+          <p:cNvPr id="3" name="Date Placeholder 2"/>
+          <p:cNvSpPr>
+            <a:spLocks noGrp="1"/>
+          </p:cNvSpPr>
+          <p:nvPr>
+            <p:ph type="dt" sz="half" idx="10"/>
+          </p:nvPr>
+        </p:nvSpPr>
+        <p:spPr/>
+        <p:txBody>
+          <a:bodyPr/>
+          <a:lstStyle/>
+          <a:p>
+            <a:fld id="{1620389F-DE1D-44C7-B37E-89BCC2F680BE}" type="datetime1">
+              <a:rPr lang="en-US" smtClean="0"/>
+              <a:pPr/>
+              <a:t>9/10/2012</a:t>
+            </a:fld>
+            <a:endParaRPr lang="en-US"/>
+          </a:p>
+        </p:txBody>
+      </p:sp>
+      <p:sp>
+        <p:nvSpPr>
+          <p:cNvPr id="4" name="Slide Number Placeholder 3"/>
+          <p:cNvSpPr>
+            <a:spLocks noGrp="1"/>
+          </p:cNvSpPr>
+          <p:nvPr>
+            <p:ph type="sldNum" sz="quarter" idx="12"/>
+          </p:nvPr>
+        </p:nvSpPr>
+        <p:spPr/>
+        <p:txBody>
+          <a:bodyPr/>
+          <a:lstStyle/>
+          <a:p>
+            <a:fld id="{8D57DBB9-07C6-49AB-BFD5-E737C7E241F6}" type="slidenum">
+              <a:rPr lang="en-US" smtClean="0"/>
+              <a:pPr/>
+              <a:t>8</a:t>
+            </a:fld>
+            <a:endParaRPr lang="en-US"/>
+          </a:p>
+        </p:txBody>
+      </p:sp>
+    </p:spTree>
+    <p:extLst>
+      <p:ext uri="{BB962C8B-B14F-4D97-AF65-F5344CB8AC3E}">
+        <p14:creationId xmlns:p14="http://schemas.microsoft.com/office/powerpoint/2010/main" val="1903216594"/>
+      </p:ext>
+    </p:extLst>
+  </p:cSld>
+  <p:clrMapOvr>
+    <a:masterClrMapping/>
+  </p:clrMapOvr>
+  <p:transition>
+    <p:fade/>
+  </p:transition>
+  <p:timing>
+    <p:tnLst>
+      <p:par>
+        <p:cTn id="1" dur="indefinite" restart="never" nodeType="tmRoot"/>
+      </p:par>
+    </p:tnLst>
+  </p:timing>
+</p:sld>
+</file>
+
 <file path=ppt/slides/slide9.xml><?xml version="1.0" encoding="utf-8"?>
 <p:sld xmlns:a="http://schemas.openxmlformats.org/drawingml/2006/main" xmlns:r="http://schemas.openxmlformats.org/officeDocument/2006/relationships" xmlns:p="http://schemas.openxmlformats.org/presentationml/2006/main">
   <p:cSld>
@@ -6155,7 +6212,7 @@
       </p:grpSpPr>
       <p:sp>
         <p:nvSpPr>
-          <p:cNvPr id="5" name="Title 4"/>
+          <p:cNvPr id="2" name="Title 1"/>
           <p:cNvSpPr>
             <a:spLocks noGrp="1"/>
           </p:cNvSpPr>
@@ -6163,16 +6220,19 @@
             <p:ph type="title"/>
           </p:nvPr>
         </p:nvSpPr>
-        <p:spPr/>
-        <p:txBody>
-          <a:bodyPr>
-            <a:normAutofit fontScale="90000"/>
-          </a:bodyPr>
+        <p:spPr>
+          <a:xfrm>
+            <a:off x="749745" y="2751836"/>
+            <a:ext cx="7772400" cy="1362075"/>
+          </a:xfrm>
+        </p:spPr>
+        <p:txBody>
+          <a:bodyPr/>
           <a:lstStyle/>
           <a:p>
             <a:r>
               <a:rPr lang="en-US" dirty="0" smtClean="0"/>
-              <a:t>Assumptions, Risks, &amp; Opportunities</a:t>
+              <a:t>Backup Slides</a:t>
             </a:r>
             <a:endParaRPr lang="en-US" dirty="0"/>
           </a:p>
@@ -6180,12 +6240,12 @@
       </p:sp>
       <p:sp>
         <p:nvSpPr>
-          <p:cNvPr id="6" name="Content Placeholder 5"/>
-          <p:cNvSpPr>
-            <a:spLocks noGrp="1"/>
-          </p:cNvSpPr>
-          <p:nvPr>
-            <p:ph idx="1"/>
+          <p:cNvPr id="3" name="Text Placeholder 2"/>
+          <p:cNvSpPr>
+            <a:spLocks noGrp="1"/>
+          </p:cNvSpPr>
+          <p:nvPr>
+            <p:ph type="body" idx="1"/>
           </p:nvPr>
         </p:nvSpPr>
         <p:spPr/>
@@ -6196,28 +6256,24 @@
           <a:lstStyle/>
           <a:p>
             <a:r>
-              <a:rPr lang="en-US" sz="2400" dirty="0" smtClean="0"/>
-              <a:t>Identify</a:t>
-            </a:r>
-          </a:p>
-          <a:p>
-            <a:r>
-              <a:rPr lang="en-US" sz="2400" dirty="0" smtClean="0"/>
-              <a:t>Indicate links and mitigations/capture planes</a:t>
-            </a:r>
-          </a:p>
-          <a:p>
-            <a:r>
-              <a:rPr lang="en-US" sz="2400" dirty="0" smtClean="0"/>
-              <a:t>Find a way to use already implemented  mapping tools (e.g. panning, zooming)</a:t>
-            </a:r>
-            <a:endParaRPr lang="en-US" sz="2400" dirty="0"/>
-          </a:p>
-        </p:txBody>
-      </p:sp>
-      <p:sp>
-        <p:nvSpPr>
-          <p:cNvPr id="3" name="Date Placeholder 2"/>
+              <a:rPr lang="en-US" sz="1800" dirty="0" smtClean="0"/>
+              <a:t>Include extra slides if discussion goes ‘deeper</a:t>
+            </a:r>
+            <a:r>
+              <a:rPr lang="en-US" sz="1800" dirty="0"/>
+              <a:t>’ and all slides from after </a:t>
+            </a:r>
+            <a:r>
+              <a:rPr lang="en-US" sz="1800" dirty="0" smtClean="0"/>
+              <a:t>meeting</a:t>
+            </a:r>
+            <a:endParaRPr lang="en-US" sz="1800" dirty="0"/>
+          </a:p>
+        </p:txBody>
+      </p:sp>
+      <p:sp>
+        <p:nvSpPr>
+          <p:cNvPr id="4" name="Date Placeholder 3"/>
           <p:cNvSpPr>
             <a:spLocks noGrp="1"/>
           </p:cNvSpPr>
@@ -6230,18 +6286,18 @@
           <a:bodyPr/>
           <a:lstStyle/>
           <a:p>
-            <a:fld id="{1620389F-DE1D-44C7-B37E-89BCC2F680BE}" type="datetime1">
+            <a:fld id="{7E42FB2E-ABA8-41CA-9C7C-28F5EB525474}" type="datetime1">
               <a:rPr lang="en-US" smtClean="0"/>
               <a:pPr/>
-              <a:t>9/7/2012</a:t>
+              <a:t>9/10/2012</a:t>
             </a:fld>
-            <a:endParaRPr lang="en-US"/>
-          </a:p>
-        </p:txBody>
-      </p:sp>
-      <p:sp>
-        <p:nvSpPr>
-          <p:cNvPr id="4" name="Slide Number Placeholder 3"/>
+            <a:endParaRPr lang="en-US" dirty="0"/>
+          </a:p>
+        </p:txBody>
+      </p:sp>
+      <p:sp>
+        <p:nvSpPr>
+          <p:cNvPr id="5" name="Slide Number Placeholder 4"/>
           <p:cNvSpPr>
             <a:spLocks noGrp="1"/>
           </p:cNvSpPr>
@@ -6259,23 +6315,20 @@
               <a:pPr/>
               <a:t>9</a:t>
             </a:fld>
-            <a:endParaRPr lang="en-US"/>
+            <a:endParaRPr lang="en-US" dirty="0"/>
           </a:p>
         </p:txBody>
       </p:sp>
     </p:spTree>
     <p:extLst>
       <p:ext uri="{BB962C8B-B14F-4D97-AF65-F5344CB8AC3E}">
-        <p14:creationId xmlns:p14="http://schemas.microsoft.com/office/powerpoint/2010/main" val="1903216594"/>
+        <p14:creationId xmlns:p14="http://schemas.microsoft.com/office/powerpoint/2010/main" val="2713489721"/>
       </p:ext>
     </p:extLst>
   </p:cSld>
   <p:clrMapOvr>
     <a:masterClrMapping/>
   </p:clrMapOvr>
-  <p:transition>
-    <p:fade/>
-  </p:transition>
   <p:timing>
     <p:tnLst>
       <p:par>

</xml_diff>

<commit_message>
Week 2 Meeting Agendas
</commit_message>
<xml_diff>
--- a/Documents/PowerPoints/Senior Design Project - Gate 5 1.0.pptx
+++ b/Documents/PowerPoints/Senior Design Project - Gate 5 1.0.pptx
@@ -216,7 +216,7 @@
                 <a:latin typeface="Arial" pitchFamily="34" charset="0"/>
               </a:rPr>
               <a:pPr/>
-              <a:t>9/10/2012</a:t>
+              <a:t>9/12/2012</a:t>
             </a:fld>
             <a:endParaRPr lang="en-US" dirty="0">
               <a:latin typeface="Arial" pitchFamily="34" charset="0"/>
@@ -399,7 +399,7 @@
             <a:fld id="{FC1312E8-DAE4-4DB4-9959-6EFE043C5908}" type="datetimeFigureOut">
               <a:rPr lang="en-US" smtClean="0"/>
               <a:pPr/>
-              <a:t>9/10/2012</a:t>
+              <a:t>9/12/2012</a:t>
             </a:fld>
             <a:endParaRPr lang="en-US" dirty="0"/>
           </a:p>
@@ -959,7 +959,7 @@
             <a:fld id="{373724D0-DD0F-42EF-84DE-838DB5D26951}" type="datetime1">
               <a:rPr lang="en-US" smtClean="0"/>
               <a:pPr/>
-              <a:t>9/10/2012</a:t>
+              <a:t>9/12/2012</a:t>
             </a:fld>
             <a:endParaRPr lang="en-US" dirty="0"/>
           </a:p>
@@ -1203,7 +1203,7 @@
             <a:fld id="{7E42FB2E-ABA8-41CA-9C7C-28F5EB525474}" type="datetime1">
               <a:rPr lang="en-US" smtClean="0"/>
               <a:pPr/>
-              <a:t>9/10/2012</a:t>
+              <a:t>9/12/2012</a:t>
             </a:fld>
             <a:endParaRPr lang="en-US" dirty="0"/>
           </a:p>
@@ -1475,7 +1475,7 @@
             <a:fld id="{7E42FB2E-ABA8-41CA-9C7C-28F5EB525474}" type="datetime1">
               <a:rPr lang="en-US" smtClean="0"/>
               <a:pPr/>
-              <a:t>9/10/2012</a:t>
+              <a:t>9/12/2012</a:t>
             </a:fld>
             <a:endParaRPr lang="en-US" dirty="0"/>
           </a:p>
@@ -1888,7 +1888,7 @@
             <a:fld id="{7E42FB2E-ABA8-41CA-9C7C-28F5EB525474}" type="datetime1">
               <a:rPr lang="en-US" smtClean="0"/>
               <a:pPr/>
-              <a:t>9/10/2012</a:t>
+              <a:t>9/12/2012</a:t>
             </a:fld>
             <a:endParaRPr lang="en-US" dirty="0"/>
           </a:p>
@@ -1990,7 +1990,7 @@
             <a:fld id="{1620389F-DE1D-44C7-B37E-89BCC2F680BE}" type="datetime1">
               <a:rPr lang="en-US" smtClean="0"/>
               <a:pPr/>
-              <a:t>9/10/2012</a:t>
+              <a:t>9/12/2012</a:t>
             </a:fld>
             <a:endParaRPr lang="en-US"/>
           </a:p>
@@ -2078,7 +2078,7 @@
             <a:fld id="{7E42FB2E-ABA8-41CA-9C7C-28F5EB525474}" type="datetime1">
               <a:rPr lang="en-US" smtClean="0"/>
               <a:pPr/>
-              <a:t>9/10/2012</a:t>
+              <a:t>9/12/2012</a:t>
             </a:fld>
             <a:endParaRPr lang="en-US" dirty="0"/>
           </a:p>
@@ -2699,7 +2699,7 @@
             <a:fld id="{7E42FB2E-ABA8-41CA-9C7C-28F5EB525474}" type="datetime1">
               <a:rPr lang="en-US" smtClean="0"/>
               <a:pPr/>
-              <a:t>9/10/2012</a:t>
+              <a:t>9/12/2012</a:t>
             </a:fld>
             <a:endParaRPr lang="en-US" dirty="0"/>
           </a:p>
@@ -3148,19 +3148,7 @@
             </a:r>
             <a:r>
               <a:rPr lang="en-US" dirty="0" smtClean="0"/>
-              <a:t>Based Situational </a:t>
-            </a:r>
-            <a:r>
-              <a:rPr lang="en-US" dirty="0" smtClean="0"/>
-              <a:t>Awareness: </a:t>
-            </a:r>
-            <a:r>
-              <a:rPr lang="en-US" dirty="0" smtClean="0"/>
-              <a:t>Moving </a:t>
-            </a:r>
-            <a:r>
-              <a:rPr lang="en-US" dirty="0" smtClean="0"/>
-              <a:t>Map</a:t>
+              <a:t>Based Situational Awareness: Moving Map</a:t>
             </a:r>
             <a:br>
               <a:rPr lang="en-US" dirty="0" smtClean="0"/>
@@ -3421,7 +3409,7 @@
             <a:fld id="{7E42FB2E-ABA8-41CA-9C7C-28F5EB525474}" type="datetime1">
               <a:rPr lang="en-US" smtClean="0"/>
               <a:pPr/>
-              <a:t>9/10/2012</a:t>
+              <a:t>9/12/2012</a:t>
             </a:fld>
             <a:endParaRPr lang="en-US" dirty="0"/>
           </a:p>
@@ -3560,7 +3548,7 @@
             <a:fld id="{373724D0-DD0F-42EF-84DE-838DB5D26951}" type="datetime1">
               <a:rPr lang="en-US" smtClean="0"/>
               <a:pPr/>
-              <a:t>9/10/2012</a:t>
+              <a:t>9/12/2012</a:t>
             </a:fld>
             <a:endParaRPr lang="en-US" dirty="0"/>
           </a:p>
@@ -3746,15 +3734,25 @@
             <a:pPr marL="233363" indent="-177800"/>
             <a:r>
               <a:rPr lang="en-US" sz="1600" dirty="0" smtClean="0"/>
-              <a:t>Selected a map engine by 9/19/2012</a:t>
-            </a:r>
+              <a:t>Selected a map engine by </a:t>
+            </a:r>
+            <a:r>
+              <a:rPr lang="en-US" sz="1600" dirty="0" smtClean="0"/>
+              <a:t>9/26/2012</a:t>
+            </a:r>
+            <a:endParaRPr lang="en-US" sz="1600" dirty="0" smtClean="0"/>
           </a:p>
           <a:p>
             <a:pPr marL="233363" indent="-177800"/>
             <a:r>
               <a:rPr lang="en-US" sz="1600" dirty="0" smtClean="0"/>
-              <a:t>Screen shots of existing applications by 9/19/2012</a:t>
-            </a:r>
+              <a:t>Screen shots of existing applications by </a:t>
+            </a:r>
+            <a:r>
+              <a:rPr lang="en-US" sz="1600" dirty="0" smtClean="0"/>
+              <a:t>9/26/2012, and ask for screen shots of all required maps layers</a:t>
+            </a:r>
+            <a:endParaRPr lang="en-US" sz="1600" dirty="0" smtClean="0"/>
           </a:p>
           <a:p>
             <a:pPr marL="55563" indent="0">
@@ -3917,7 +3915,7 @@
             <a:fld id="{373724D0-DD0F-42EF-84DE-838DB5D26951}" type="datetime1">
               <a:rPr lang="en-US" smtClean="0"/>
               <a:pPr/>
-              <a:t>9/10/2012</a:t>
+              <a:t>9/12/2012</a:t>
             </a:fld>
             <a:endParaRPr lang="en-US" dirty="0"/>
           </a:p>
@@ -4127,7 +4125,7 @@
             <a:fld id="{373724D0-DD0F-42EF-84DE-838DB5D26951}" type="datetime1">
               <a:rPr lang="en-US" smtClean="0"/>
               <a:pPr/>
-              <a:t>9/10/2012</a:t>
+              <a:t>9/12/2012</a:t>
             </a:fld>
             <a:endParaRPr lang="en-US" dirty="0"/>
           </a:p>
@@ -4269,7 +4267,7 @@
             <a:fld id="{373724D0-DD0F-42EF-84DE-838DB5D26951}" type="datetime1">
               <a:rPr lang="en-US" smtClean="0"/>
               <a:pPr/>
-              <a:t>9/10/2012</a:t>
+              <a:t>9/12/2012</a:t>
             </a:fld>
             <a:endParaRPr lang="en-US" dirty="0"/>
           </a:p>
@@ -4356,7 +4354,11 @@
           </a:bodyPr>
           <a:lstStyle/>
           <a:p>
-            <a:endParaRPr lang="en-US"/>
+            <a:r>
+              <a:rPr lang="en-US" dirty="0" smtClean="0"/>
+              <a:t>Existing Situational Awareness Software</a:t>
+            </a:r>
+            <a:endParaRPr lang="en-US" dirty="0"/>
           </a:p>
         </p:txBody>
       </p:sp>
@@ -4400,7 +4402,7 @@
             <a:fld id="{373724D0-DD0F-42EF-84DE-838DB5D26951}" type="datetime1">
               <a:rPr lang="en-US" smtClean="0"/>
               <a:pPr/>
-              <a:t>9/10/2012</a:t>
+              <a:t>9/12/2012</a:t>
             </a:fld>
             <a:endParaRPr lang="en-US" dirty="0"/>
           </a:p>
@@ -4453,8 +4455,8 @@
         </p:blipFill>
         <p:spPr bwMode="auto">
           <a:xfrm>
-            <a:off x="0" y="0"/>
-            <a:ext cx="9144000" cy="6858000"/>
+            <a:off x="669700" y="878983"/>
+            <a:ext cx="7972023" cy="5979017"/>
           </a:xfrm>
           <a:prstGeom prst="rect">
             <a:avLst/>
@@ -4588,7 +4590,7 @@
             <a:fld id="{7E42FB2E-ABA8-41CA-9C7C-28F5EB525474}" type="datetime1">
               <a:rPr lang="en-US" smtClean="0"/>
               <a:pPr/>
-              <a:t>9/10/2012</a:t>
+              <a:t>9/12/2012</a:t>
             </a:fld>
             <a:endParaRPr lang="en-US" dirty="0"/>
           </a:p>
@@ -4701,7 +4703,7 @@
             <a:fld id="{7E42FB2E-ABA8-41CA-9C7C-28F5EB525474}" type="datetime1">
               <a:rPr lang="en-US" smtClean="0"/>
               <a:pPr/>
-              <a:t>9/10/2012</a:t>
+              <a:t>9/12/2012</a:t>
             </a:fld>
             <a:endParaRPr lang="en-US" dirty="0"/>
           </a:p>
@@ -6082,7 +6084,26 @@
             </a:r>
             <a:r>
               <a:rPr lang="en-US" sz="2400" dirty="0" smtClean="0"/>
-              <a:t>a way to use already implemented  mapping tools (e.g. panning, zooming</a:t>
+              <a:t>a mapping engine that supports the correct mapping </a:t>
+            </a:r>
+            <a:r>
+              <a:rPr lang="en-US" sz="2400" dirty="0" smtClean="0"/>
+              <a:t>format (Engine supports xyz format)</a:t>
+            </a:r>
+            <a:endParaRPr lang="en-US" sz="2400" dirty="0" smtClean="0"/>
+          </a:p>
+          <a:p>
+            <a:r>
+              <a:rPr lang="en-US" sz="2400" dirty="0" smtClean="0"/>
+              <a:t>Libraries for pulling mapping information from local server (e.g. </a:t>
+            </a:r>
+            <a:r>
+              <a:rPr lang="en-US" sz="2400" dirty="0" err="1" smtClean="0"/>
+              <a:t>Wifi</a:t>
+            </a:r>
+            <a:r>
+              <a:rPr lang="en-US" sz="2400" dirty="0" smtClean="0"/>
+              <a:t>, USB</a:t>
             </a:r>
             <a:r>
               <a:rPr lang="en-US" sz="2400" dirty="0" smtClean="0"/>
@@ -6092,30 +6113,43 @@
           <a:p>
             <a:r>
               <a:rPr lang="en-US" sz="2400" dirty="0" smtClean="0"/>
-              <a:t>Find a mapping engine that supports the correct mapping format</a:t>
-            </a:r>
+              <a:t>Risks</a:t>
+            </a:r>
+          </a:p>
+          <a:p>
+            <a:pPr lvl="1"/>
+            <a:r>
+              <a:rPr lang="en-US" sz="2000" dirty="0" err="1" smtClean="0"/>
+              <a:t>dfghjk</a:t>
+            </a:r>
+            <a:endParaRPr lang="en-US" sz="2000" dirty="0" smtClean="0"/>
           </a:p>
           <a:p>
             <a:r>
               <a:rPr lang="en-US" sz="2400" dirty="0" smtClean="0"/>
-              <a:t>Libraries for</a:t>
-            </a:r>
+              <a:t>Assumptions</a:t>
+            </a:r>
+          </a:p>
+          <a:p>
+            <a:pPr lvl="1"/>
+            <a:r>
+              <a:rPr lang="en-US" sz="2000" dirty="0"/>
+              <a:t>Find a way to use already implemented  mapping tools (e.g. panning, zooming)</a:t>
+            </a:r>
+          </a:p>
+          <a:p>
             <a:r>
               <a:rPr lang="en-US" sz="2400" dirty="0" smtClean="0"/>
-              <a:t> pulling mapping information from local server (e.g. </a:t>
-            </a:r>
-            <a:r>
-              <a:rPr lang="en-US" sz="2400" dirty="0" err="1" smtClean="0"/>
-              <a:t>Wifi</a:t>
-            </a:r>
-            <a:r>
-              <a:rPr lang="en-US" sz="2400" dirty="0" smtClean="0"/>
-              <a:t>, </a:t>
-            </a:r>
-            <a:r>
-              <a:rPr lang="en-US" sz="2400" smtClean="0"/>
-              <a:t>USB)</a:t>
-            </a:r>
+              <a:t>Opportunities</a:t>
+            </a:r>
+          </a:p>
+          <a:p>
+            <a:pPr lvl="1"/>
+            <a:r>
+              <a:rPr lang="en-US" sz="2000" dirty="0" err="1" smtClean="0"/>
+              <a:t>fjkl</a:t>
+            </a:r>
+            <a:endParaRPr lang="en-US" sz="2000" dirty="0" smtClean="0"/>
           </a:p>
           <a:p>
             <a:endParaRPr lang="en-US" sz="2400" dirty="0"/>
@@ -6140,7 +6174,7 @@
             <a:fld id="{1620389F-DE1D-44C7-B37E-89BCC2F680BE}" type="datetime1">
               <a:rPr lang="en-US" smtClean="0"/>
               <a:pPr/>
-              <a:t>9/10/2012</a:t>
+              <a:t>9/12/2012</a:t>
             </a:fld>
             <a:endParaRPr lang="en-US"/>
           </a:p>
@@ -6289,7 +6323,7 @@
             <a:fld id="{7E42FB2E-ABA8-41CA-9C7C-28F5EB525474}" type="datetime1">
               <a:rPr lang="en-US" smtClean="0"/>
               <a:pPr/>
-              <a:t>9/10/2012</a:t>
+              <a:t>9/12/2012</a:t>
             </a:fld>
             <a:endParaRPr lang="en-US" dirty="0"/>
           </a:p>

</xml_diff>

<commit_message>
Update slides for presentation
</commit_message>
<xml_diff>
--- a/Documents/PowerPoints/Senior Design Project - Gate 5 1.0.pptx
+++ b/Documents/PowerPoints/Senior Design Project - Gate 5 1.0.pptx
@@ -5,23 +5,19 @@
     <p:sldMasterId id="2147483663" r:id="rId1"/>
   </p:sldMasterIdLst>
   <p:notesMasterIdLst>
-    <p:notesMasterId r:id="rId13"/>
+    <p:notesMasterId r:id="rId9"/>
   </p:notesMasterIdLst>
   <p:handoutMasterIdLst>
-    <p:handoutMasterId r:id="rId14"/>
+    <p:handoutMasterId r:id="rId10"/>
   </p:handoutMasterIdLst>
   <p:sldIdLst>
     <p:sldId id="258" r:id="rId2"/>
     <p:sldId id="266" r:id="rId3"/>
-    <p:sldId id="263" r:id="rId4"/>
-    <p:sldId id="272" r:id="rId5"/>
-    <p:sldId id="274" r:id="rId6"/>
-    <p:sldId id="267" r:id="rId7"/>
-    <p:sldId id="268" r:id="rId8"/>
-    <p:sldId id="269" r:id="rId9"/>
-    <p:sldId id="270" r:id="rId10"/>
-    <p:sldId id="271" r:id="rId11"/>
-    <p:sldId id="273" r:id="rId12"/>
+    <p:sldId id="272" r:id="rId4"/>
+    <p:sldId id="274" r:id="rId5"/>
+    <p:sldId id="267" r:id="rId6"/>
+    <p:sldId id="268" r:id="rId7"/>
+    <p:sldId id="269" r:id="rId8"/>
   </p:sldIdLst>
   <p:sldSz cx="9144000" cy="6858000" type="screen4x3"/>
   <p:notesSz cx="6858000" cy="9144000"/>
@@ -216,7 +212,7 @@
                 <a:latin typeface="Arial" pitchFamily="34" charset="0"/>
               </a:rPr>
               <a:pPr/>
-              <a:t>9/12/2012</a:t>
+              <a:t>9/18/2012</a:t>
             </a:fld>
             <a:endParaRPr lang="en-US" dirty="0">
               <a:latin typeface="Arial" pitchFamily="34" charset="0"/>
@@ -399,7 +395,7 @@
             <a:fld id="{FC1312E8-DAE4-4DB4-9959-6EFE043C5908}" type="datetimeFigureOut">
               <a:rPr lang="en-US" smtClean="0"/>
               <a:pPr/>
-              <a:t>9/12/2012</a:t>
+              <a:t>9/18/2012</a:t>
             </a:fld>
             <a:endParaRPr lang="en-US" dirty="0"/>
           </a:p>
@@ -759,91 +755,6 @@
 </p:notes>
 </file>
 
-<file path=ppt/notesSlides/notesSlide2.xml><?xml version="1.0" encoding="utf-8"?>
-<p:notes xmlns:a="http://schemas.openxmlformats.org/drawingml/2006/main" xmlns:r="http://schemas.openxmlformats.org/officeDocument/2006/relationships" xmlns:p="http://schemas.openxmlformats.org/presentationml/2006/main">
-  <p:cSld>
-    <p:spTree>
-      <p:nvGrpSpPr>
-        <p:cNvPr id="1" name=""/>
-        <p:cNvGrpSpPr/>
-        <p:nvPr/>
-      </p:nvGrpSpPr>
-      <p:grpSpPr>
-        <a:xfrm>
-          <a:off x="0" y="0"/>
-          <a:ext cx="0" cy="0"/>
-          <a:chOff x="0" y="0"/>
-          <a:chExt cx="0" cy="0"/>
-        </a:xfrm>
-      </p:grpSpPr>
-      <p:sp>
-        <p:nvSpPr>
-          <p:cNvPr id="2" name="Slide Image Placeholder 1"/>
-          <p:cNvSpPr>
-            <a:spLocks noGrp="1" noRot="1" noChangeAspect="1"/>
-          </p:cNvSpPr>
-          <p:nvPr>
-            <p:ph type="sldImg"/>
-          </p:nvPr>
-        </p:nvSpPr>
-        <p:spPr/>
-      </p:sp>
-      <p:sp>
-        <p:nvSpPr>
-          <p:cNvPr id="3" name="Notes Placeholder 2"/>
-          <p:cNvSpPr>
-            <a:spLocks noGrp="1"/>
-          </p:cNvSpPr>
-          <p:nvPr>
-            <p:ph type="body" idx="1"/>
-          </p:nvPr>
-        </p:nvSpPr>
-        <p:spPr/>
-        <p:txBody>
-          <a:bodyPr/>
-          <a:lstStyle/>
-          <a:p>
-            <a:endParaRPr lang="en-US"/>
-          </a:p>
-        </p:txBody>
-      </p:sp>
-      <p:sp>
-        <p:nvSpPr>
-          <p:cNvPr id="4" name="Slide Number Placeholder 3"/>
-          <p:cNvSpPr>
-            <a:spLocks noGrp="1"/>
-          </p:cNvSpPr>
-          <p:nvPr>
-            <p:ph type="sldNum" sz="quarter" idx="10"/>
-          </p:nvPr>
-        </p:nvSpPr>
-        <p:spPr/>
-        <p:txBody>
-          <a:bodyPr/>
-          <a:lstStyle/>
-          <a:p>
-            <a:fld id="{B0D02AC4-1C81-4AB4-8D73-92191CCF549E}" type="slidenum">
-              <a:rPr lang="en-US" smtClean="0"/>
-              <a:pPr/>
-              <a:t>11</a:t>
-            </a:fld>
-            <a:endParaRPr lang="en-US" dirty="0"/>
-          </a:p>
-        </p:txBody>
-      </p:sp>
-    </p:spTree>
-    <p:extLst>
-      <p:ext uri="{BB962C8B-B14F-4D97-AF65-F5344CB8AC3E}">
-        <p14:creationId xmlns:p14="http://schemas.microsoft.com/office/powerpoint/2010/main" val="2481227216"/>
-      </p:ext>
-    </p:extLst>
-  </p:cSld>
-  <p:clrMapOvr>
-    <a:masterClrMapping/>
-  </p:clrMapOvr>
-</p:notes>
-</file>
-
 <file path=ppt/slideLayouts/slideLayout1.xml><?xml version="1.0" encoding="utf-8"?>
 <p:sldLayout xmlns:a="http://schemas.openxmlformats.org/drawingml/2006/main" xmlns:r="http://schemas.openxmlformats.org/officeDocument/2006/relationships" xmlns:p="http://schemas.openxmlformats.org/presentationml/2006/main" type="obj" preserve="1">
   <p:cSld name="Title and Content">
@@ -959,7 +870,7 @@
             <a:fld id="{373724D0-DD0F-42EF-84DE-838DB5D26951}" type="datetime1">
               <a:rPr lang="en-US" smtClean="0"/>
               <a:pPr/>
-              <a:t>9/12/2012</a:t>
+              <a:t>9/18/2012</a:t>
             </a:fld>
             <a:endParaRPr lang="en-US" dirty="0"/>
           </a:p>
@@ -1203,7 +1114,7 @@
             <a:fld id="{7E42FB2E-ABA8-41CA-9C7C-28F5EB525474}" type="datetime1">
               <a:rPr lang="en-US" smtClean="0"/>
               <a:pPr/>
-              <a:t>9/12/2012</a:t>
+              <a:t>9/18/2012</a:t>
             </a:fld>
             <a:endParaRPr lang="en-US" dirty="0"/>
           </a:p>
@@ -1475,7 +1386,7 @@
             <a:fld id="{7E42FB2E-ABA8-41CA-9C7C-28F5EB525474}" type="datetime1">
               <a:rPr lang="en-US" smtClean="0"/>
               <a:pPr/>
-              <a:t>9/12/2012</a:t>
+              <a:t>9/18/2012</a:t>
             </a:fld>
             <a:endParaRPr lang="en-US" dirty="0"/>
           </a:p>
@@ -1888,7 +1799,7 @@
             <a:fld id="{7E42FB2E-ABA8-41CA-9C7C-28F5EB525474}" type="datetime1">
               <a:rPr lang="en-US" smtClean="0"/>
               <a:pPr/>
-              <a:t>9/12/2012</a:t>
+              <a:t>9/18/2012</a:t>
             </a:fld>
             <a:endParaRPr lang="en-US" dirty="0"/>
           </a:p>
@@ -1933,7 +1844,7 @@
 </file>
 
 <file path=ppt/slideLayouts/slideLayout5.xml><?xml version="1.0" encoding="utf-8"?>
-<p:sldLayout xmlns:a="http://schemas.openxmlformats.org/drawingml/2006/main" xmlns:r="http://schemas.openxmlformats.org/officeDocument/2006/relationships" xmlns:p="http://schemas.openxmlformats.org/presentationml/2006/main" type="titleOnly" preserve="1">
+<p:sldLayout xmlns:a="http://schemas.openxmlformats.org/drawingml/2006/main" xmlns:r="http://schemas.openxmlformats.org/officeDocument/2006/relationships" xmlns:p="http://schemas.openxmlformats.org/presentationml/2006/main" preserve="1" userDrawn="1">
   <p:cSld name="Title Only">
     <p:spTree>
       <p:nvGrpSpPr>
@@ -1951,29 +1862,6 @@
       </p:grpSpPr>
       <p:sp>
         <p:nvSpPr>
-          <p:cNvPr id="2" name="Title 1"/>
-          <p:cNvSpPr>
-            <a:spLocks noGrp="1"/>
-          </p:cNvSpPr>
-          <p:nvPr>
-            <p:ph type="title"/>
-          </p:nvPr>
-        </p:nvSpPr>
-        <p:spPr/>
-        <p:txBody>
-          <a:bodyPr/>
-          <a:lstStyle/>
-          <a:p>
-            <a:r>
-              <a:rPr lang="en-US" smtClean="0"/>
-              <a:t>Click to edit Master title style</a:t>
-            </a:r>
-            <a:endParaRPr lang="en-US"/>
-          </a:p>
-        </p:txBody>
-      </p:sp>
-      <p:sp>
-        <p:nvSpPr>
           <p:cNvPr id="3" name="Date Placeholder 2"/>
           <p:cNvSpPr>
             <a:spLocks noGrp="1"/>
@@ -1990,7 +1878,7 @@
             <a:fld id="{1620389F-DE1D-44C7-B37E-89BCC2F680BE}" type="datetime1">
               <a:rPr lang="en-US" smtClean="0"/>
               <a:pPr/>
-              <a:t>9/12/2012</a:t>
+              <a:t>9/18/2012</a:t>
             </a:fld>
             <a:endParaRPr lang="en-US"/>
           </a:p>
@@ -2016,6 +1904,29 @@
               <a:pPr/>
               <a:t>‹#›</a:t>
             </a:fld>
+            <a:endParaRPr lang="en-US"/>
+          </a:p>
+        </p:txBody>
+      </p:sp>
+      <p:sp>
+        <p:nvSpPr>
+          <p:cNvPr id="4" name="Title 3"/>
+          <p:cNvSpPr>
+            <a:spLocks noGrp="1"/>
+          </p:cNvSpPr>
+          <p:nvPr>
+            <p:ph type="title"/>
+          </p:nvPr>
+        </p:nvSpPr>
+        <p:spPr/>
+        <p:txBody>
+          <a:bodyPr/>
+          <a:lstStyle/>
+          <a:p>
+            <a:r>
+              <a:rPr lang="en-US" smtClean="0"/>
+              <a:t>Click to edit Master title style</a:t>
+            </a:r>
             <a:endParaRPr lang="en-US"/>
           </a:p>
         </p:txBody>
@@ -2078,7 +1989,7 @@
             <a:fld id="{7E42FB2E-ABA8-41CA-9C7C-28F5EB525474}" type="datetime1">
               <a:rPr lang="en-US" smtClean="0"/>
               <a:pPr/>
-              <a:t>9/12/2012</a:t>
+              <a:t>9/18/2012</a:t>
             </a:fld>
             <a:endParaRPr lang="en-US" dirty="0"/>
           </a:p>
@@ -2699,7 +2610,7 @@
             <a:fld id="{7E42FB2E-ABA8-41CA-9C7C-28F5EB525474}" type="datetime1">
               <a:rPr lang="en-US" smtClean="0"/>
               <a:pPr/>
-              <a:t>9/12/2012</a:t>
+              <a:t>9/18/2012</a:t>
             </a:fld>
             <a:endParaRPr lang="en-US" dirty="0"/>
           </a:p>
@@ -2768,6 +2679,26 @@
           <a:p>
             <a:pPr lvl="0"/>
             <a:r>
+              <a:rPr lang="en-US" sz="1000" dirty="0" smtClean="0">
+                <a:solidFill>
+                  <a:schemeClr val="tx1">
+                    <a:tint val="75000"/>
+                  </a:schemeClr>
+                </a:solidFill>
+              </a:rPr>
+              <a:t>Android</a:t>
+            </a:r>
+            <a:r>
+              <a:rPr lang="en-US" sz="1000" baseline="0" dirty="0" smtClean="0">
+                <a:solidFill>
+                  <a:schemeClr val="tx1">
+                    <a:tint val="75000"/>
+                  </a:schemeClr>
+                </a:solidFill>
+              </a:rPr>
+              <a:t> Based Situational Awareness </a:t>
+            </a:r>
+            <a:r>
               <a:rPr lang="en-US" sz="1200" dirty="0" smtClean="0">
                 <a:solidFill>
                   <a:schemeClr val="tx1">
@@ -2775,7 +2706,17 @@
                   </a:schemeClr>
                 </a:solidFill>
               </a:rPr>
-              <a:t>&lt;Project Name&gt; Kickoff/Gate 5</a:t>
+              <a:t>Kickoff/Gate </a:t>
+            </a:r>
+            <a:r>
+              <a:rPr lang="en-US" sz="1200" dirty="0" smtClean="0">
+                <a:solidFill>
+                  <a:schemeClr val="tx1">
+                    <a:tint val="75000"/>
+                  </a:schemeClr>
+                </a:solidFill>
+              </a:rPr>
+              <a:t>5</a:t>
             </a:r>
           </a:p>
         </p:txBody>
@@ -3107,8 +3048,9 @@
             <a:pPr lvl="0"/>
             <a:r>
               <a:rPr lang="en-US" dirty="0" smtClean="0"/>
-              <a:t>Date</a:t>
-            </a:r>
+              <a:t>September 19, 2012</a:t>
+            </a:r>
+            <a:endParaRPr lang="en-US" dirty="0" smtClean="0"/>
           </a:p>
         </p:txBody>
       </p:sp>
@@ -3227,7 +3169,7 @@
         </p:blipFill>
         <p:spPr>
           <a:xfrm>
-            <a:off x="4483199" y="2392431"/>
+            <a:off x="4663199" y="2680431"/>
             <a:ext cx="4387816" cy="3290862"/>
           </a:xfrm>
           <a:prstGeom prst="rect">
@@ -3236,354 +3178,6 @@
         </p:spPr>
       </p:pic>
     </p:spTree>
-  </p:cSld>
-  <p:clrMapOvr>
-    <a:masterClrMapping/>
-  </p:clrMapOvr>
-  <p:transition>
-    <p:fade/>
-  </p:transition>
-  <p:timing>
-    <p:tnLst>
-      <p:par>
-        <p:cTn id="1" dur="indefinite" restart="never" nodeType="tmRoot"/>
-      </p:par>
-    </p:tnLst>
-  </p:timing>
-</p:sld>
-</file>
-
-<file path=ppt/slides/slide10.xml><?xml version="1.0" encoding="utf-8"?>
-<p:sld xmlns:a="http://schemas.openxmlformats.org/drawingml/2006/main" xmlns:r="http://schemas.openxmlformats.org/officeDocument/2006/relationships" xmlns:p="http://schemas.openxmlformats.org/presentationml/2006/main">
-  <p:cSld>
-    <p:spTree>
-      <p:nvGrpSpPr>
-        <p:cNvPr id="1" name=""/>
-        <p:cNvGrpSpPr/>
-        <p:nvPr/>
-      </p:nvGrpSpPr>
-      <p:grpSpPr>
-        <a:xfrm>
-          <a:off x="0" y="0"/>
-          <a:ext cx="0" cy="0"/>
-          <a:chOff x="0" y="0"/>
-          <a:chExt cx="0" cy="0"/>
-        </a:xfrm>
-      </p:grpSpPr>
-      <p:sp>
-        <p:nvSpPr>
-          <p:cNvPr id="6" name="Title 5"/>
-          <p:cNvSpPr>
-            <a:spLocks noGrp="1"/>
-          </p:cNvSpPr>
-          <p:nvPr>
-            <p:ph type="title"/>
-          </p:nvPr>
-        </p:nvSpPr>
-        <p:spPr/>
-        <p:txBody>
-          <a:bodyPr>
-            <a:normAutofit fontScale="90000"/>
-          </a:bodyPr>
-          <a:lstStyle/>
-          <a:p>
-            <a:r>
-              <a:rPr lang="en-US" dirty="0" smtClean="0"/>
-              <a:t>Lessons Learned</a:t>
-            </a:r>
-            <a:endParaRPr lang="en-US" dirty="0"/>
-          </a:p>
-        </p:txBody>
-      </p:sp>
-      <p:sp>
-        <p:nvSpPr>
-          <p:cNvPr id="7" name="Content Placeholder 6"/>
-          <p:cNvSpPr>
-            <a:spLocks noGrp="1"/>
-          </p:cNvSpPr>
-          <p:nvPr>
-            <p:ph sz="half" idx="1"/>
-          </p:nvPr>
-        </p:nvSpPr>
-        <p:spPr/>
-        <p:txBody>
-          <a:bodyPr>
-            <a:normAutofit/>
-          </a:bodyPr>
-          <a:lstStyle/>
-          <a:p>
-            <a:pPr marL="0" indent="0">
-              <a:buNone/>
-            </a:pPr>
-            <a:r>
-              <a:rPr lang="en-US" sz="2400" b="1" dirty="0" smtClean="0"/>
-              <a:t>Positive Items</a:t>
-            </a:r>
-          </a:p>
-          <a:p>
-            <a:r>
-              <a:rPr lang="en-US" sz="1800" dirty="0" smtClean="0"/>
-              <a:t>Color code MS project </a:t>
-            </a:r>
-            <a:r>
-              <a:rPr lang="en-US" sz="1800" dirty="0" err="1"/>
-              <a:t>G</a:t>
-            </a:r>
-            <a:r>
-              <a:rPr lang="en-US" sz="1800" dirty="0" err="1" smtClean="0"/>
-              <a:t>annt</a:t>
-            </a:r>
-            <a:r>
-              <a:rPr lang="en-US" sz="1800" dirty="0" smtClean="0"/>
-              <a:t> to identify each resource</a:t>
-            </a:r>
-          </a:p>
-          <a:p>
-            <a:r>
-              <a:rPr lang="en-US" sz="1800" dirty="0" smtClean="0"/>
-              <a:t>Etc.</a:t>
-            </a:r>
-          </a:p>
-        </p:txBody>
-      </p:sp>
-      <p:sp>
-        <p:nvSpPr>
-          <p:cNvPr id="8" name="Content Placeholder 7"/>
-          <p:cNvSpPr>
-            <a:spLocks noGrp="1"/>
-          </p:cNvSpPr>
-          <p:nvPr>
-            <p:ph sz="half" idx="2"/>
-          </p:nvPr>
-        </p:nvSpPr>
-        <p:spPr/>
-        <p:txBody>
-          <a:bodyPr/>
-          <a:lstStyle/>
-          <a:p>
-            <a:pPr marL="0" indent="0">
-              <a:buNone/>
-            </a:pPr>
-            <a:r>
-              <a:rPr lang="en-US" sz="2400" b="1" dirty="0" smtClean="0"/>
-              <a:t>Improvements or Changes</a:t>
-            </a:r>
-          </a:p>
-          <a:p>
-            <a:r>
-              <a:rPr lang="en-US" sz="1800" dirty="0" smtClean="0"/>
-              <a:t>Example: Do not pull all </a:t>
-            </a:r>
-            <a:r>
-              <a:rPr lang="en-US" sz="1800" dirty="0" err="1" smtClean="0"/>
-              <a:t>nighter</a:t>
-            </a:r>
-            <a:r>
-              <a:rPr lang="en-US" sz="1800" dirty="0" smtClean="0"/>
-              <a:t> before meetings</a:t>
-            </a:r>
-          </a:p>
-          <a:p>
-            <a:r>
-              <a:rPr lang="en-US" sz="1800" dirty="0" smtClean="0"/>
-              <a:t>Etc.</a:t>
-            </a:r>
-          </a:p>
-        </p:txBody>
-      </p:sp>
-      <p:sp>
-        <p:nvSpPr>
-          <p:cNvPr id="4" name="Date Placeholder 3"/>
-          <p:cNvSpPr>
-            <a:spLocks noGrp="1"/>
-          </p:cNvSpPr>
-          <p:nvPr>
-            <p:ph type="dt" sz="half" idx="10"/>
-          </p:nvPr>
-        </p:nvSpPr>
-        <p:spPr/>
-        <p:txBody>
-          <a:bodyPr/>
-          <a:lstStyle/>
-          <a:p>
-            <a:fld id="{7E42FB2E-ABA8-41CA-9C7C-28F5EB525474}" type="datetime1">
-              <a:rPr lang="en-US" smtClean="0"/>
-              <a:pPr/>
-              <a:t>9/12/2012</a:t>
-            </a:fld>
-            <a:endParaRPr lang="en-US" dirty="0"/>
-          </a:p>
-        </p:txBody>
-      </p:sp>
-      <p:sp>
-        <p:nvSpPr>
-          <p:cNvPr id="5" name="Slide Number Placeholder 4"/>
-          <p:cNvSpPr>
-            <a:spLocks noGrp="1"/>
-          </p:cNvSpPr>
-          <p:nvPr>
-            <p:ph type="sldNum" sz="quarter" idx="12"/>
-          </p:nvPr>
-        </p:nvSpPr>
-        <p:spPr/>
-        <p:txBody>
-          <a:bodyPr/>
-          <a:lstStyle/>
-          <a:p>
-            <a:fld id="{8D57DBB9-07C6-49AB-BFD5-E737C7E241F6}" type="slidenum">
-              <a:rPr lang="en-US" smtClean="0"/>
-              <a:pPr/>
-              <a:t>10</a:t>
-            </a:fld>
-            <a:endParaRPr lang="en-US" dirty="0"/>
-          </a:p>
-        </p:txBody>
-      </p:sp>
-    </p:spTree>
-    <p:extLst>
-      <p:ext uri="{BB962C8B-B14F-4D97-AF65-F5344CB8AC3E}">
-        <p14:creationId xmlns:p14="http://schemas.microsoft.com/office/powerpoint/2010/main" val="3481864823"/>
-      </p:ext>
-    </p:extLst>
-  </p:cSld>
-  <p:clrMapOvr>
-    <a:masterClrMapping/>
-  </p:clrMapOvr>
-  <p:timing>
-    <p:tnLst>
-      <p:par>
-        <p:cTn id="1" dur="indefinite" restart="never" nodeType="tmRoot"/>
-      </p:par>
-    </p:tnLst>
-  </p:timing>
-</p:sld>
-</file>
-
-<file path=ppt/slides/slide11.xml><?xml version="1.0" encoding="utf-8"?>
-<p:sld xmlns:a="http://schemas.openxmlformats.org/drawingml/2006/main" xmlns:r="http://schemas.openxmlformats.org/officeDocument/2006/relationships" xmlns:p="http://schemas.openxmlformats.org/presentationml/2006/main">
-  <p:cSld>
-    <p:spTree>
-      <p:nvGrpSpPr>
-        <p:cNvPr id="1" name=""/>
-        <p:cNvGrpSpPr/>
-        <p:nvPr/>
-      </p:nvGrpSpPr>
-      <p:grpSpPr>
-        <a:xfrm>
-          <a:off x="0" y="0"/>
-          <a:ext cx="0" cy="0"/>
-          <a:chOff x="0" y="0"/>
-          <a:chExt cx="0" cy="0"/>
-        </a:xfrm>
-      </p:grpSpPr>
-      <p:sp>
-        <p:nvSpPr>
-          <p:cNvPr id="2" name="Title 1"/>
-          <p:cNvSpPr>
-            <a:spLocks noGrp="1"/>
-          </p:cNvSpPr>
-          <p:nvPr>
-            <p:ph type="title"/>
-          </p:nvPr>
-        </p:nvSpPr>
-        <p:spPr/>
-        <p:txBody>
-          <a:bodyPr>
-            <a:normAutofit fontScale="90000"/>
-          </a:bodyPr>
-          <a:lstStyle/>
-          <a:p>
-            <a:r>
-              <a:rPr lang="en-US" dirty="0" smtClean="0"/>
-              <a:t>Project UML Diagram</a:t>
-            </a:r>
-            <a:endParaRPr lang="en-US" dirty="0"/>
-          </a:p>
-        </p:txBody>
-      </p:sp>
-      <p:pic>
-        <p:nvPicPr>
-          <p:cNvPr id="6" name="Content Placeholder 5"/>
-          <p:cNvPicPr>
-            <a:picLocks noGrp="1" noChangeAspect="1"/>
-          </p:cNvPicPr>
-          <p:nvPr>
-            <p:ph idx="1"/>
-          </p:nvPr>
-        </p:nvPicPr>
-        <p:blipFill>
-          <a:blip r:embed="rId3">
-            <a:extLst>
-              <a:ext uri="{28A0092B-C50C-407E-A947-70E740481C1C}">
-                <a14:useLocalDpi xmlns:a14="http://schemas.microsoft.com/office/drawing/2010/main" val="0"/>
-              </a:ext>
-            </a:extLst>
-          </a:blip>
-          <a:stretch>
-            <a:fillRect/>
-          </a:stretch>
-        </p:blipFill>
-        <p:spPr>
-          <a:xfrm>
-            <a:off x="1100054" y="855663"/>
-            <a:ext cx="6943891" cy="5416550"/>
-          </a:xfrm>
-        </p:spPr>
-      </p:pic>
-      <p:sp>
-        <p:nvSpPr>
-          <p:cNvPr id="4" name="Date Placeholder 3"/>
-          <p:cNvSpPr>
-            <a:spLocks noGrp="1"/>
-          </p:cNvSpPr>
-          <p:nvPr>
-            <p:ph type="dt" sz="half" idx="10"/>
-          </p:nvPr>
-        </p:nvSpPr>
-        <p:spPr/>
-        <p:txBody>
-          <a:bodyPr/>
-          <a:lstStyle/>
-          <a:p>
-            <a:fld id="{373724D0-DD0F-42EF-84DE-838DB5D26951}" type="datetime1">
-              <a:rPr lang="en-US" smtClean="0"/>
-              <a:pPr/>
-              <a:t>9/12/2012</a:t>
-            </a:fld>
-            <a:endParaRPr lang="en-US" dirty="0"/>
-          </a:p>
-        </p:txBody>
-      </p:sp>
-      <p:sp>
-        <p:nvSpPr>
-          <p:cNvPr id="5" name="Slide Number Placeholder 4"/>
-          <p:cNvSpPr>
-            <a:spLocks noGrp="1"/>
-          </p:cNvSpPr>
-          <p:nvPr>
-            <p:ph type="sldNum" sz="quarter" idx="12"/>
-          </p:nvPr>
-        </p:nvSpPr>
-        <p:spPr/>
-        <p:txBody>
-          <a:bodyPr/>
-          <a:lstStyle/>
-          <a:p>
-            <a:fld id="{8D57DBB9-07C6-49AB-BFD5-E737C7E241F6}" type="slidenum">
-              <a:rPr lang="en-US" smtClean="0"/>
-              <a:pPr/>
-              <a:t>11</a:t>
-            </a:fld>
-            <a:endParaRPr lang="en-US"/>
-          </a:p>
-        </p:txBody>
-      </p:sp>
-    </p:spTree>
-    <p:extLst>
-      <p:ext uri="{BB962C8B-B14F-4D97-AF65-F5344CB8AC3E}">
-        <p14:creationId xmlns:p14="http://schemas.microsoft.com/office/powerpoint/2010/main" val="3690794059"/>
-      </p:ext>
-    </p:extLst>
   </p:cSld>
   <p:clrMapOvr>
     <a:masterClrMapping/>
@@ -3734,25 +3328,15 @@
             <a:pPr marL="233363" indent="-177800"/>
             <a:r>
               <a:rPr lang="en-US" sz="1600" dirty="0" smtClean="0"/>
-              <a:t>Selected a map engine by </a:t>
-            </a:r>
+              <a:t>Selected a map engine by 9/26/2012</a:t>
+            </a:r>
+          </a:p>
+          <a:p>
+            <a:pPr marL="233363" indent="-177800"/>
             <a:r>
               <a:rPr lang="en-US" sz="1600" dirty="0" smtClean="0"/>
-              <a:t>9/26/2012</a:t>
-            </a:r>
-            <a:endParaRPr lang="en-US" sz="1600" dirty="0" smtClean="0"/>
-          </a:p>
-          <a:p>
-            <a:pPr marL="233363" indent="-177800"/>
-            <a:r>
-              <a:rPr lang="en-US" sz="1600" dirty="0" smtClean="0"/>
-              <a:t>Screen shots of existing applications by </a:t>
-            </a:r>
-            <a:r>
-              <a:rPr lang="en-US" sz="1600" dirty="0" smtClean="0"/>
-              <a:t>9/26/2012, and ask for screen shots of all required maps layers</a:t>
-            </a:r>
-            <a:endParaRPr lang="en-US" sz="1600" dirty="0" smtClean="0"/>
+              <a:t>Screen shots of existing applications by 9/26/2012, and ask for screen shots of all required maps layers</a:t>
+            </a:r>
           </a:p>
           <a:p>
             <a:pPr marL="55563" indent="0">
@@ -3915,7 +3499,7 @@
             <a:fld id="{373724D0-DD0F-42EF-84DE-838DB5D26951}" type="datetime1">
               <a:rPr lang="en-US" smtClean="0"/>
               <a:pPr/>
-              <a:t>9/12/2012</a:t>
+              <a:t>9/18/2012</a:t>
             </a:fld>
             <a:endParaRPr lang="en-US" dirty="0"/>
           </a:p>
@@ -4034,76 +3618,9 @@
           <a:p>
             <a:r>
               <a:rPr lang="en-US" dirty="0" smtClean="0"/>
-              <a:t>Project Pictorial</a:t>
+              <a:t>High Level Architecture</a:t>
             </a:r>
             <a:endParaRPr lang="en-US" dirty="0"/>
-          </a:p>
-        </p:txBody>
-      </p:sp>
-      <p:sp>
-        <p:nvSpPr>
-          <p:cNvPr id="3" name="Content Placeholder 2"/>
-          <p:cNvSpPr>
-            <a:spLocks noGrp="1"/>
-          </p:cNvSpPr>
-          <p:nvPr>
-            <p:ph idx="1"/>
-          </p:nvPr>
-        </p:nvSpPr>
-        <p:spPr/>
-        <p:txBody>
-          <a:bodyPr>
-            <a:normAutofit/>
-          </a:bodyPr>
-          <a:lstStyle/>
-          <a:p>
-            <a:r>
-              <a:rPr lang="en-US" sz="2400" dirty="0" smtClean="0"/>
-              <a:t>Detailed Visual Project Overview</a:t>
-            </a:r>
-          </a:p>
-          <a:p>
-            <a:pPr lvl="1"/>
-            <a:r>
-              <a:rPr lang="en-US" sz="2000" dirty="0" smtClean="0"/>
-              <a:t>Block Diagram</a:t>
-            </a:r>
-          </a:p>
-          <a:p>
-            <a:pPr lvl="1"/>
-            <a:r>
-              <a:rPr lang="en-US" sz="2000" dirty="0" smtClean="0"/>
-              <a:t>Product Breakdown Structure</a:t>
-            </a:r>
-          </a:p>
-          <a:p>
-            <a:pPr lvl="1"/>
-            <a:r>
-              <a:rPr lang="en-US" sz="2000" dirty="0" smtClean="0"/>
-              <a:t>Graphics</a:t>
-            </a:r>
-          </a:p>
-          <a:p>
-            <a:pPr lvl="1"/>
-            <a:r>
-              <a:rPr lang="en-US" sz="2000" dirty="0" smtClean="0"/>
-              <a:t>Screen Shots</a:t>
-            </a:r>
-          </a:p>
-          <a:p>
-            <a:pPr lvl="1"/>
-            <a:r>
-              <a:rPr lang="en-US" sz="2000" dirty="0" smtClean="0"/>
-              <a:t>Logos</a:t>
-            </a:r>
-          </a:p>
-          <a:p>
-            <a:pPr lvl="1"/>
-            <a:r>
-              <a:rPr lang="en-US" sz="2000" dirty="0" err="1" smtClean="0"/>
-              <a:t>etc</a:t>
-            </a:r>
-            <a:endParaRPr lang="en-US" sz="2000" dirty="0"/>
           </a:p>
         </p:txBody>
       </p:sp>
@@ -4125,7 +3642,7 @@
             <a:fld id="{373724D0-DD0F-42EF-84DE-838DB5D26951}" type="datetime1">
               <a:rPr lang="en-US" smtClean="0"/>
               <a:pPr/>
-              <a:t>9/12/2012</a:t>
+              <a:t>9/18/2012</a:t>
             </a:fld>
             <a:endParaRPr lang="en-US" dirty="0"/>
           </a:p>
@@ -4155,10 +3672,39 @@
           </a:p>
         </p:txBody>
       </p:sp>
+      <p:pic>
+        <p:nvPicPr>
+          <p:cNvPr id="7" name="Content Placeholder 6"/>
+          <p:cNvPicPr>
+            <a:picLocks noGrp="1" noChangeAspect="1"/>
+          </p:cNvPicPr>
+          <p:nvPr>
+            <p:ph idx="1"/>
+          </p:nvPr>
+        </p:nvPicPr>
+        <p:blipFill>
+          <a:blip r:embed="rId2">
+            <a:extLst>
+              <a:ext uri="{28A0092B-C50C-407E-A947-70E740481C1C}">
+                <a14:useLocalDpi xmlns:a14="http://schemas.microsoft.com/office/drawing/2010/main" val="0"/>
+              </a:ext>
+            </a:extLst>
+          </a:blip>
+          <a:stretch>
+            <a:fillRect/>
+          </a:stretch>
+        </p:blipFill>
+        <p:spPr>
+          <a:xfrm>
+            <a:off x="982564" y="855663"/>
+            <a:ext cx="7178872" cy="5416550"/>
+          </a:xfrm>
+        </p:spPr>
+      </p:pic>
     </p:spTree>
     <p:extLst>
       <p:ext uri="{BB962C8B-B14F-4D97-AF65-F5344CB8AC3E}">
-        <p14:creationId xmlns:p14="http://schemas.microsoft.com/office/powerpoint/2010/main" val="2987801429"/>
+        <p14:creationId xmlns:p14="http://schemas.microsoft.com/office/powerpoint/2010/main" val="2184614489"/>
       </p:ext>
     </p:extLst>
   </p:cSld>
@@ -4208,21 +3754,21 @@
         <p:spPr/>
         <p:txBody>
           <a:bodyPr>
-            <a:normAutofit fontScale="90000"/>
+            <a:noAutofit/>
           </a:bodyPr>
           <a:lstStyle/>
           <a:p>
             <a:r>
-              <a:rPr lang="en-US" dirty="0" smtClean="0"/>
-              <a:t>Project Decomposition</a:t>
-            </a:r>
-            <a:endParaRPr lang="en-US" dirty="0"/>
+              <a:rPr lang="en-US" sz="3600" dirty="0" smtClean="0"/>
+              <a:t>Existing Situational Awareness Software</a:t>
+            </a:r>
+            <a:endParaRPr lang="en-US" sz="3600" dirty="0"/>
           </a:p>
         </p:txBody>
       </p:sp>
       <p:pic>
         <p:nvPicPr>
-          <p:cNvPr id="6" name="Content Placeholder 5"/>
+          <p:cNvPr id="7" name="Content Placeholder 6"/>
           <p:cNvPicPr>
             <a:picLocks noGrp="1" noChangeAspect="1"/>
           </p:cNvPicPr>
@@ -4244,8 +3790,8 @@
         </p:blipFill>
         <p:spPr>
           <a:xfrm>
-            <a:off x="457200" y="1777355"/>
-            <a:ext cx="8229600" cy="3573166"/>
+            <a:off x="457200" y="992188"/>
+            <a:ext cx="8229600" cy="5143499"/>
           </a:xfrm>
         </p:spPr>
       </p:pic>
@@ -4267,7 +3813,7 @@
             <a:fld id="{373724D0-DD0F-42EF-84DE-838DB5D26951}" type="datetime1">
               <a:rPr lang="en-US" smtClean="0"/>
               <a:pPr/>
-              <a:t>9/12/2012</a:t>
+              <a:t>9/18/2012</a:t>
             </a:fld>
             <a:endParaRPr lang="en-US" dirty="0"/>
           </a:p>
@@ -4300,7 +3846,7 @@
     </p:spTree>
     <p:extLst>
       <p:ext uri="{BB962C8B-B14F-4D97-AF65-F5344CB8AC3E}">
-        <p14:creationId xmlns:p14="http://schemas.microsoft.com/office/powerpoint/2010/main" val="2184614489"/>
+        <p14:creationId xmlns:p14="http://schemas.microsoft.com/office/powerpoint/2010/main" val="2490581267"/>
       </p:ext>
     </p:extLst>
   </p:cSld>
@@ -4339,7 +3885,7 @@
       </p:grpSpPr>
       <p:sp>
         <p:nvSpPr>
-          <p:cNvPr id="2" name="Title 1"/>
+          <p:cNvPr id="7" name="Title 6"/>
           <p:cNvSpPr>
             <a:spLocks noGrp="1"/>
           </p:cNvSpPr>
@@ -4356,7 +3902,7 @@
           <a:p>
             <a:r>
               <a:rPr lang="en-US" dirty="0" smtClean="0"/>
-              <a:t>Existing Situational Awareness Software</a:t>
+              <a:t>Project Schedule &amp; Milestones</a:t>
             </a:r>
             <a:endParaRPr lang="en-US" dirty="0"/>
           </a:p>
@@ -4364,7 +3910,7 @@
       </p:sp>
       <p:sp>
         <p:nvSpPr>
-          <p:cNvPr id="3" name="Content Placeholder 2"/>
+          <p:cNvPr id="8" name="Content Placeholder 7"/>
           <p:cNvSpPr>
             <a:spLocks noGrp="1"/>
           </p:cNvSpPr>
@@ -4377,9 +3923,96 @@
           <a:bodyPr/>
           <a:lstStyle/>
           <a:p>
-            <a:pPr marL="0" indent="0">
-              <a:buNone/>
-            </a:pPr>
+            <a:r>
+              <a:rPr lang="en-US" dirty="0" smtClean="0"/>
+              <a:t>System Requirements Review:  September 26</a:t>
+            </a:r>
+            <a:r>
+              <a:rPr lang="en-US" baseline="30000" dirty="0" smtClean="0"/>
+              <a:t>th</a:t>
+            </a:r>
+          </a:p>
+          <a:p>
+            <a:r>
+              <a:rPr lang="en-US" dirty="0" smtClean="0"/>
+              <a:t>Preliminary Design Review:            October 31</a:t>
+            </a:r>
+            <a:r>
+              <a:rPr lang="en-US" baseline="30000" dirty="0" smtClean="0"/>
+              <a:t>st</a:t>
+            </a:r>
+            <a:endParaRPr lang="en-US" dirty="0" smtClean="0"/>
+          </a:p>
+          <a:p>
+            <a:r>
+              <a:rPr lang="en-US" dirty="0" smtClean="0"/>
+              <a:t>Alpha Release:                              December 19</a:t>
+            </a:r>
+            <a:r>
+              <a:rPr lang="en-US" baseline="30000" dirty="0" smtClean="0"/>
+              <a:t>th</a:t>
+            </a:r>
+          </a:p>
+          <a:p>
+            <a:r>
+              <a:rPr lang="en-US" dirty="0" smtClean="0"/>
+              <a:t>Beta Release:                                     February 6</a:t>
+            </a:r>
+            <a:r>
+              <a:rPr lang="en-US" baseline="30000" dirty="0" smtClean="0"/>
+              <a:t>th</a:t>
+            </a:r>
+            <a:r>
+              <a:rPr lang="en-US" dirty="0" smtClean="0"/>
+              <a:t> </a:t>
+            </a:r>
+          </a:p>
+          <a:p>
+            <a:r>
+              <a:rPr lang="en-US" dirty="0" smtClean="0"/>
+              <a:t>Critical Design Review:                     February 6</a:t>
+            </a:r>
+            <a:r>
+              <a:rPr lang="en-US" baseline="30000" dirty="0" smtClean="0"/>
+              <a:t>th</a:t>
+            </a:r>
+            <a:endParaRPr lang="en-US" dirty="0" smtClean="0"/>
+          </a:p>
+          <a:p>
+            <a:r>
+              <a:rPr lang="en-US" dirty="0" smtClean="0"/>
+              <a:t>Test Readiness Review:                       March 20</a:t>
+            </a:r>
+            <a:r>
+              <a:rPr lang="en-US" baseline="30000" dirty="0" smtClean="0"/>
+              <a:t>th</a:t>
+            </a:r>
+            <a:endParaRPr lang="en-US" dirty="0" smtClean="0"/>
+          </a:p>
+          <a:p>
+            <a:r>
+              <a:rPr lang="en-US" dirty="0" smtClean="0"/>
+              <a:t>Final Release:                                          April 17</a:t>
+            </a:r>
+            <a:r>
+              <a:rPr lang="en-US" baseline="30000" dirty="0" smtClean="0"/>
+              <a:t>th</a:t>
+            </a:r>
+            <a:endParaRPr lang="en-US" dirty="0" smtClean="0"/>
+          </a:p>
+          <a:p>
+            <a:r>
+              <a:rPr lang="en-US" dirty="0" smtClean="0"/>
+              <a:t>Expo/Out brief:                                       May 22</a:t>
+            </a:r>
+            <a:r>
+              <a:rPr lang="en-US" baseline="30000" dirty="0" smtClean="0"/>
+              <a:t>nd</a:t>
+            </a:r>
+            <a:r>
+              <a:rPr lang="en-US" dirty="0" smtClean="0"/>
+              <a:t> </a:t>
+            </a:r>
             <a:endParaRPr lang="en-US" dirty="0"/>
           </a:p>
         </p:txBody>
@@ -4399,10 +4032,10 @@
           <a:bodyPr/>
           <a:lstStyle/>
           <a:p>
-            <a:fld id="{373724D0-DD0F-42EF-84DE-838DB5D26951}" type="datetime1">
+            <a:fld id="{7E42FB2E-ABA8-41CA-9C7C-28F5EB525474}" type="datetime1">
               <a:rPr lang="en-US" smtClean="0"/>
               <a:pPr/>
-              <a:t>9/12/2012</a:t>
+              <a:t>9/18/2012</a:t>
             </a:fld>
             <a:endParaRPr lang="en-US" dirty="0"/>
           </a:p>
@@ -4428,55 +4061,14 @@
               <a:pPr/>
               <a:t>5</a:t>
             </a:fld>
-            <a:endParaRPr lang="en-US"/>
-          </a:p>
-        </p:txBody>
-      </p:sp>
-      <p:pic>
-        <p:nvPicPr>
-          <p:cNvPr id="1026" name="Picture 2" descr="C:\Users\atniptw\AppData\Local\Microsoft\Windows\Temporary Internet Files\Content.Outlook\DO167TEM\Map Display Screen Shot.png"/>
-          <p:cNvPicPr>
-            <a:picLocks noChangeAspect="1" noChangeArrowheads="1"/>
-          </p:cNvPicPr>
-          <p:nvPr/>
-        </p:nvPicPr>
-        <p:blipFill>
-          <a:blip r:embed="rId2">
-            <a:extLst>
-              <a:ext uri="{28A0092B-C50C-407E-A947-70E740481C1C}">
-                <a14:useLocalDpi xmlns:a14="http://schemas.microsoft.com/office/drawing/2010/main" val="0"/>
-              </a:ext>
-            </a:extLst>
-          </a:blip>
-          <a:srcRect/>
-          <a:stretch>
-            <a:fillRect/>
-          </a:stretch>
-        </p:blipFill>
-        <p:spPr bwMode="auto">
-          <a:xfrm>
-            <a:off x="669700" y="878983"/>
-            <a:ext cx="7972023" cy="5979017"/>
-          </a:xfrm>
-          <a:prstGeom prst="rect">
-            <a:avLst/>
-          </a:prstGeom>
-          <a:noFill/>
-          <a:extLst>
-            <a:ext uri="{909E8E84-426E-40DD-AFC4-6F175D3DCCD1}">
-              <a14:hiddenFill xmlns:a14="http://schemas.microsoft.com/office/drawing/2010/main">
-                <a:solidFill>
-                  <a:srgbClr val="FFFFFF"/>
-                </a:solidFill>
-              </a14:hiddenFill>
-            </a:ext>
-          </a:extLst>
-        </p:spPr>
-      </p:pic>
+            <a:endParaRPr lang="en-US" dirty="0"/>
+          </a:p>
+        </p:txBody>
+      </p:sp>
     </p:spTree>
     <p:extLst>
       <p:ext uri="{BB962C8B-B14F-4D97-AF65-F5344CB8AC3E}">
-        <p14:creationId xmlns:p14="http://schemas.microsoft.com/office/powerpoint/2010/main" val="2490581267"/>
+        <p14:creationId xmlns:p14="http://schemas.microsoft.com/office/powerpoint/2010/main" val="3661795386"/>
       </p:ext>
     </p:extLst>
   </p:cSld>
@@ -4515,7 +4107,7 @@
       </p:grpSpPr>
       <p:sp>
         <p:nvSpPr>
-          <p:cNvPr id="7" name="Title 6"/>
+          <p:cNvPr id="6" name="Title 5"/>
           <p:cNvSpPr>
             <a:spLocks noGrp="1"/>
           </p:cNvSpPr>
@@ -4523,7 +4115,12 @@
             <p:ph type="title"/>
           </p:nvPr>
         </p:nvSpPr>
-        <p:spPr/>
+        <p:spPr>
+          <a:xfrm>
+            <a:off x="457200" y="133005"/>
+            <a:ext cx="8229600" cy="623454"/>
+          </a:xfrm>
+        </p:spPr>
         <p:txBody>
           <a:bodyPr>
             <a:normAutofit fontScale="90000"/>
@@ -4532,41 +4129,7 @@
           <a:p>
             <a:r>
               <a:rPr lang="en-US" dirty="0" smtClean="0"/>
-              <a:t>Project Schedule &amp; Milestones</a:t>
-            </a:r>
-            <a:endParaRPr lang="en-US" dirty="0"/>
-          </a:p>
-        </p:txBody>
-      </p:sp>
-      <p:sp>
-        <p:nvSpPr>
-          <p:cNvPr id="8" name="Content Placeholder 7"/>
-          <p:cNvSpPr>
-            <a:spLocks noGrp="1"/>
-          </p:cNvSpPr>
-          <p:nvPr>
-            <p:ph idx="1"/>
-          </p:nvPr>
-        </p:nvSpPr>
-        <p:spPr/>
-        <p:txBody>
-          <a:bodyPr/>
-          <a:lstStyle/>
-          <a:p>
-            <a:r>
-              <a:rPr lang="en-US" dirty="0" smtClean="0"/>
-              <a:t>Identify key program milestones </a:t>
-            </a:r>
-            <a:r>
-              <a:rPr lang="en-US" b="1" dirty="0" smtClean="0"/>
-              <a:t>with dates</a:t>
-            </a:r>
-            <a:endParaRPr lang="en-US" dirty="0" smtClean="0"/>
-          </a:p>
-          <a:p>
-            <a:r>
-              <a:rPr lang="en-US" dirty="0" smtClean="0"/>
-              <a:t>Screen shot of schedule from Project</a:t>
+              <a:t>Project Team</a:t>
             </a:r>
             <a:endParaRPr lang="en-US" dirty="0"/>
           </a:p>
@@ -4590,7 +4153,7 @@
             <a:fld id="{7E42FB2E-ABA8-41CA-9C7C-28F5EB525474}" type="datetime1">
               <a:rPr lang="en-US" smtClean="0"/>
               <a:pPr/>
-              <a:t>9/12/2012</a:t>
+              <a:t>9/18/2012</a:t>
             </a:fld>
             <a:endParaRPr lang="en-US" dirty="0"/>
           </a:p>
@@ -4615,119 +4178,6 @@
               <a:rPr lang="en-US" smtClean="0"/>
               <a:pPr/>
               <a:t>6</a:t>
-            </a:fld>
-            <a:endParaRPr lang="en-US" dirty="0"/>
-          </a:p>
-        </p:txBody>
-      </p:sp>
-    </p:spTree>
-    <p:extLst>
-      <p:ext uri="{BB962C8B-B14F-4D97-AF65-F5344CB8AC3E}">
-        <p14:creationId xmlns:p14="http://schemas.microsoft.com/office/powerpoint/2010/main" val="3661795386"/>
-      </p:ext>
-    </p:extLst>
-  </p:cSld>
-  <p:clrMapOvr>
-    <a:masterClrMapping/>
-  </p:clrMapOvr>
-  <p:transition>
-    <p:fade/>
-  </p:transition>
-  <p:timing>
-    <p:tnLst>
-      <p:par>
-        <p:cTn id="1" dur="indefinite" restart="never" nodeType="tmRoot"/>
-      </p:par>
-    </p:tnLst>
-  </p:timing>
-</p:sld>
-</file>
-
-<file path=ppt/slides/slide7.xml><?xml version="1.0" encoding="utf-8"?>
-<p:sld xmlns:a="http://schemas.openxmlformats.org/drawingml/2006/main" xmlns:r="http://schemas.openxmlformats.org/officeDocument/2006/relationships" xmlns:p="http://schemas.openxmlformats.org/presentationml/2006/main">
-  <p:cSld>
-    <p:spTree>
-      <p:nvGrpSpPr>
-        <p:cNvPr id="1" name=""/>
-        <p:cNvGrpSpPr/>
-        <p:nvPr/>
-      </p:nvGrpSpPr>
-      <p:grpSpPr>
-        <a:xfrm>
-          <a:off x="0" y="0"/>
-          <a:ext cx="0" cy="0"/>
-          <a:chOff x="0" y="0"/>
-          <a:chExt cx="0" cy="0"/>
-        </a:xfrm>
-      </p:grpSpPr>
-      <p:sp>
-        <p:nvSpPr>
-          <p:cNvPr id="6" name="Title 5"/>
-          <p:cNvSpPr>
-            <a:spLocks noGrp="1"/>
-          </p:cNvSpPr>
-          <p:nvPr>
-            <p:ph type="title"/>
-          </p:nvPr>
-        </p:nvSpPr>
-        <p:spPr/>
-        <p:txBody>
-          <a:bodyPr>
-            <a:normAutofit fontScale="90000"/>
-          </a:bodyPr>
-          <a:lstStyle/>
-          <a:p>
-            <a:r>
-              <a:rPr lang="en-US" dirty="0" smtClean="0"/>
-              <a:t>Project Team</a:t>
-            </a:r>
-            <a:endParaRPr lang="en-US" dirty="0"/>
-          </a:p>
-        </p:txBody>
-      </p:sp>
-      <p:sp>
-        <p:nvSpPr>
-          <p:cNvPr id="4" name="Date Placeholder 3"/>
-          <p:cNvSpPr>
-            <a:spLocks noGrp="1"/>
-          </p:cNvSpPr>
-          <p:nvPr>
-            <p:ph type="dt" sz="half" idx="10"/>
-          </p:nvPr>
-        </p:nvSpPr>
-        <p:spPr/>
-        <p:txBody>
-          <a:bodyPr/>
-          <a:lstStyle/>
-          <a:p>
-            <a:fld id="{7E42FB2E-ABA8-41CA-9C7C-28F5EB525474}" type="datetime1">
-              <a:rPr lang="en-US" smtClean="0"/>
-              <a:pPr/>
-              <a:t>9/12/2012</a:t>
-            </a:fld>
-            <a:endParaRPr lang="en-US" dirty="0"/>
-          </a:p>
-        </p:txBody>
-      </p:sp>
-      <p:sp>
-        <p:nvSpPr>
-          <p:cNvPr id="5" name="Slide Number Placeholder 4"/>
-          <p:cNvSpPr>
-            <a:spLocks noGrp="1"/>
-          </p:cNvSpPr>
-          <p:nvPr>
-            <p:ph type="sldNum" sz="quarter" idx="12"/>
-          </p:nvPr>
-        </p:nvSpPr>
-        <p:spPr/>
-        <p:txBody>
-          <a:bodyPr/>
-          <a:lstStyle/>
-          <a:p>
-            <a:fld id="{8D57DBB9-07C6-49AB-BFD5-E737C7E241F6}" type="slidenum">
-              <a:rPr lang="en-US" smtClean="0"/>
-              <a:pPr/>
-              <a:t>7</a:t>
             </a:fld>
             <a:endParaRPr lang="en-US" dirty="0"/>
           </a:p>
@@ -5898,52 +5348,20 @@
                 <a:effectLst/>
                 <a:latin typeface="+mj-lt"/>
               </a:rPr>
-              <a:t>Project Advisor</a:t>
-            </a:r>
-          </a:p>
-          <a:p>
-            <a:pPr marL="0" marR="0" indent="0" algn="ctr" defTabSz="914400" rtl="0" eaLnBrk="0" fontAlgn="base" latinLnBrk="0" hangingPunct="0">
-              <a:lnSpc>
-                <a:spcPct val="100000"/>
-              </a:lnSpc>
-              <a:spcBef>
-                <a:spcPct val="0"/>
-              </a:spcBef>
-              <a:spcAft>
-                <a:spcPct val="0"/>
-              </a:spcAft>
-              <a:buClrTx/>
-              <a:buSzTx/>
-              <a:buFontTx/>
-              <a:buNone/>
-              <a:tabLst/>
-            </a:pPr>
-            <a:r>
-              <a:rPr lang="en-US" sz="1200" dirty="0" smtClean="0">
+              <a:t>Project </a:t>
+            </a:r>
+            <a:r>
+              <a:rPr kumimoji="0" lang="en-US" sz="1200" b="0" i="0" u="none" strike="noStrike" cap="none" normalizeH="0" baseline="0" dirty="0" smtClean="0">
+                <a:ln>
+                  <a:noFill/>
+                </a:ln>
                 <a:solidFill>
                   <a:sysClr val="windowText" lastClr="000000"/>
                 </a:solidFill>
+                <a:effectLst/>
                 <a:latin typeface="+mj-lt"/>
               </a:rPr>
-              <a:t>1</a:t>
-            </a:r>
-            <a:r>
-              <a:rPr lang="en-US" sz="1200" baseline="30000" dirty="0" smtClean="0">
-                <a:solidFill>
-                  <a:sysClr val="windowText" lastClr="000000"/>
-                </a:solidFill>
-                <a:latin typeface="+mj-lt"/>
-              </a:rPr>
-              <a:t>st</a:t>
-            </a:r>
-            <a:r>
-              <a:rPr lang="en-US" sz="1200" dirty="0" smtClean="0">
-                <a:solidFill>
-                  <a:sysClr val="windowText" lastClr="000000"/>
-                </a:solidFill>
-                <a:latin typeface="+mj-lt"/>
-              </a:rPr>
-              <a:t> Quarter</a:t>
+              <a:t>Advisor</a:t>
             </a:r>
             <a:endParaRPr kumimoji="0" lang="en-US" sz="1200" b="0" i="0" u="none" strike="noStrike" cap="none" normalizeH="0" baseline="0" dirty="0" smtClean="0">
               <a:ln>
@@ -6019,7 +5437,7 @@
 </p:sld>
 </file>
 
-<file path=ppt/slides/slide8.xml><?xml version="1.0" encoding="utf-8"?>
+<file path=ppt/slides/slide7.xml><?xml version="1.0" encoding="utf-8"?>
 <p:sld xmlns:a="http://schemas.openxmlformats.org/drawingml/2006/main" xmlns:r="http://schemas.openxmlformats.org/officeDocument/2006/relationships" xmlns:p="http://schemas.openxmlformats.org/presentationml/2006/main">
   <p:cSld>
     <p:spTree>
@@ -6080,47 +5498,23 @@
           <a:p>
             <a:r>
               <a:rPr lang="en-US" sz="2400" dirty="0" smtClean="0"/>
-              <a:t>Find </a:t>
-            </a:r>
-            <a:r>
-              <a:rPr lang="en-US" sz="2400" dirty="0" smtClean="0"/>
-              <a:t>a mapping engine that supports the correct mapping </a:t>
-            </a:r>
-            <a:r>
-              <a:rPr lang="en-US" sz="2400" dirty="0" smtClean="0"/>
-              <a:t>format (Engine supports xyz format)</a:t>
+              <a:t>Risks</a:t>
             </a:r>
             <a:endParaRPr lang="en-US" sz="2400" dirty="0" smtClean="0"/>
           </a:p>
           <a:p>
-            <a:r>
-              <a:rPr lang="en-US" sz="2400" dirty="0" smtClean="0"/>
-              <a:t>Libraries for pulling mapping information from local server (e.g. </a:t>
-            </a:r>
-            <a:r>
-              <a:rPr lang="en-US" sz="2400" dirty="0" err="1" smtClean="0"/>
-              <a:t>Wifi</a:t>
-            </a:r>
-            <a:r>
-              <a:rPr lang="en-US" sz="2400" dirty="0" smtClean="0"/>
-              <a:t>, USB</a:t>
-            </a:r>
-            <a:r>
-              <a:rPr lang="en-US" sz="2400" dirty="0" smtClean="0"/>
-              <a:t>)</a:t>
-            </a:r>
-          </a:p>
-          <a:p>
-            <a:r>
-              <a:rPr lang="en-US" sz="2400" dirty="0" smtClean="0"/>
-              <a:t>Risks</a:t>
-            </a:r>
-          </a:p>
-          <a:p>
             <a:pPr lvl="1"/>
             <a:r>
-              <a:rPr lang="en-US" sz="2000" dirty="0" err="1" smtClean="0"/>
-              <a:t>dfghjk</a:t>
+              <a:rPr lang="en-US" sz="2000" dirty="0" smtClean="0"/>
+              <a:t>Find a </a:t>
+            </a:r>
+            <a:r>
+              <a:rPr lang="en-US" sz="2000" dirty="0"/>
+              <a:t>mapping engine that </a:t>
+            </a:r>
+            <a:r>
+              <a:rPr lang="en-US" sz="2000" dirty="0" smtClean="0"/>
+              <a:t>supports Raytheon’s map format</a:t>
             </a:r>
             <a:endParaRPr lang="en-US" sz="2000" dirty="0" smtClean="0"/>
           </a:p>
@@ -6133,21 +5527,50 @@
           <a:p>
             <a:pPr lvl="1"/>
             <a:r>
+              <a:rPr lang="en-US" sz="2000" dirty="0" smtClean="0"/>
+              <a:t>There exists a mapping tool that provides the ability to perform basic functionality </a:t>
+            </a:r>
+            <a:r>
               <a:rPr lang="en-US" sz="2000" dirty="0"/>
-              <a:t>Find a way to use already implemented  mapping tools (e.g. panning, zooming)</a:t>
-            </a:r>
+              <a:t>(e.g. panning, zooming</a:t>
+            </a:r>
+            <a:r>
+              <a:rPr lang="en-US" sz="2000" dirty="0" smtClean="0"/>
+              <a:t>)</a:t>
+            </a:r>
+          </a:p>
+          <a:p>
+            <a:pPr lvl="1"/>
+            <a:r>
+              <a:rPr lang="en-US" sz="2000" dirty="0"/>
+              <a:t>Libraries for pulling mapping information from local server (e.g. </a:t>
+            </a:r>
+            <a:r>
+              <a:rPr lang="en-US" sz="2000" dirty="0" err="1"/>
+              <a:t>Wifi</a:t>
+            </a:r>
+            <a:r>
+              <a:rPr lang="en-US" sz="2000" dirty="0"/>
+              <a:t>, USB</a:t>
+            </a:r>
+            <a:r>
+              <a:rPr lang="en-US" sz="2000" dirty="0" smtClean="0"/>
+              <a:t>)</a:t>
+            </a:r>
+            <a:endParaRPr lang="en-US" sz="2000" dirty="0" smtClean="0"/>
           </a:p>
           <a:p>
             <a:r>
               <a:rPr lang="en-US" sz="2400" dirty="0" smtClean="0"/>
               <a:t>Opportunities</a:t>
             </a:r>
+            <a:endParaRPr lang="en-US" sz="2400" dirty="0" smtClean="0"/>
           </a:p>
           <a:p>
             <a:pPr lvl="1"/>
             <a:r>
-              <a:rPr lang="en-US" sz="2000" dirty="0" err="1" smtClean="0"/>
-              <a:t>fjkl</a:t>
+              <a:rPr lang="en-US" sz="2000" dirty="0" smtClean="0"/>
+              <a:t>Google’s mapping engine may provide many required features</a:t>
             </a:r>
             <a:endParaRPr lang="en-US" sz="2000" dirty="0" smtClean="0"/>
           </a:p>
@@ -6174,7 +5597,7 @@
             <a:fld id="{1620389F-DE1D-44C7-B37E-89BCC2F680BE}" type="datetime1">
               <a:rPr lang="en-US" smtClean="0"/>
               <a:pPr/>
-              <a:t>9/12/2012</a:t>
+              <a:t>9/18/2012</a:t>
             </a:fld>
             <a:endParaRPr lang="en-US"/>
           </a:p>
@@ -6198,7 +5621,7 @@
             <a:fld id="{8D57DBB9-07C6-49AB-BFD5-E737C7E241F6}" type="slidenum">
               <a:rPr lang="en-US" smtClean="0"/>
               <a:pPr/>
-              <a:t>8</a:t>
+              <a:t>7</a:t>
             </a:fld>
             <a:endParaRPr lang="en-US"/>
           </a:p>
@@ -6217,152 +5640,6 @@
   <p:transition>
     <p:fade/>
   </p:transition>
-  <p:timing>
-    <p:tnLst>
-      <p:par>
-        <p:cTn id="1" dur="indefinite" restart="never" nodeType="tmRoot"/>
-      </p:par>
-    </p:tnLst>
-  </p:timing>
-</p:sld>
-</file>
-
-<file path=ppt/slides/slide9.xml><?xml version="1.0" encoding="utf-8"?>
-<p:sld xmlns:a="http://schemas.openxmlformats.org/drawingml/2006/main" xmlns:r="http://schemas.openxmlformats.org/officeDocument/2006/relationships" xmlns:p="http://schemas.openxmlformats.org/presentationml/2006/main">
-  <p:cSld>
-    <p:spTree>
-      <p:nvGrpSpPr>
-        <p:cNvPr id="1" name=""/>
-        <p:cNvGrpSpPr/>
-        <p:nvPr/>
-      </p:nvGrpSpPr>
-      <p:grpSpPr>
-        <a:xfrm>
-          <a:off x="0" y="0"/>
-          <a:ext cx="0" cy="0"/>
-          <a:chOff x="0" y="0"/>
-          <a:chExt cx="0" cy="0"/>
-        </a:xfrm>
-      </p:grpSpPr>
-      <p:sp>
-        <p:nvSpPr>
-          <p:cNvPr id="2" name="Title 1"/>
-          <p:cNvSpPr>
-            <a:spLocks noGrp="1"/>
-          </p:cNvSpPr>
-          <p:nvPr>
-            <p:ph type="title"/>
-          </p:nvPr>
-        </p:nvSpPr>
-        <p:spPr>
-          <a:xfrm>
-            <a:off x="749745" y="2751836"/>
-            <a:ext cx="7772400" cy="1362075"/>
-          </a:xfrm>
-        </p:spPr>
-        <p:txBody>
-          <a:bodyPr/>
-          <a:lstStyle/>
-          <a:p>
-            <a:r>
-              <a:rPr lang="en-US" dirty="0" smtClean="0"/>
-              <a:t>Backup Slides</a:t>
-            </a:r>
-            <a:endParaRPr lang="en-US" dirty="0"/>
-          </a:p>
-        </p:txBody>
-      </p:sp>
-      <p:sp>
-        <p:nvSpPr>
-          <p:cNvPr id="3" name="Text Placeholder 2"/>
-          <p:cNvSpPr>
-            <a:spLocks noGrp="1"/>
-          </p:cNvSpPr>
-          <p:nvPr>
-            <p:ph type="body" idx="1"/>
-          </p:nvPr>
-        </p:nvSpPr>
-        <p:spPr/>
-        <p:txBody>
-          <a:bodyPr>
-            <a:normAutofit/>
-          </a:bodyPr>
-          <a:lstStyle/>
-          <a:p>
-            <a:r>
-              <a:rPr lang="en-US" sz="1800" dirty="0" smtClean="0"/>
-              <a:t>Include extra slides if discussion goes ‘deeper</a:t>
-            </a:r>
-            <a:r>
-              <a:rPr lang="en-US" sz="1800" dirty="0"/>
-              <a:t>’ and all slides from after </a:t>
-            </a:r>
-            <a:r>
-              <a:rPr lang="en-US" sz="1800" dirty="0" smtClean="0"/>
-              <a:t>meeting</a:t>
-            </a:r>
-            <a:endParaRPr lang="en-US" sz="1800" dirty="0"/>
-          </a:p>
-        </p:txBody>
-      </p:sp>
-      <p:sp>
-        <p:nvSpPr>
-          <p:cNvPr id="4" name="Date Placeholder 3"/>
-          <p:cNvSpPr>
-            <a:spLocks noGrp="1"/>
-          </p:cNvSpPr>
-          <p:nvPr>
-            <p:ph type="dt" sz="half" idx="10"/>
-          </p:nvPr>
-        </p:nvSpPr>
-        <p:spPr/>
-        <p:txBody>
-          <a:bodyPr/>
-          <a:lstStyle/>
-          <a:p>
-            <a:fld id="{7E42FB2E-ABA8-41CA-9C7C-28F5EB525474}" type="datetime1">
-              <a:rPr lang="en-US" smtClean="0"/>
-              <a:pPr/>
-              <a:t>9/12/2012</a:t>
-            </a:fld>
-            <a:endParaRPr lang="en-US" dirty="0"/>
-          </a:p>
-        </p:txBody>
-      </p:sp>
-      <p:sp>
-        <p:nvSpPr>
-          <p:cNvPr id="5" name="Slide Number Placeholder 4"/>
-          <p:cNvSpPr>
-            <a:spLocks noGrp="1"/>
-          </p:cNvSpPr>
-          <p:nvPr>
-            <p:ph type="sldNum" sz="quarter" idx="12"/>
-          </p:nvPr>
-        </p:nvSpPr>
-        <p:spPr/>
-        <p:txBody>
-          <a:bodyPr/>
-          <a:lstStyle/>
-          <a:p>
-            <a:fld id="{8D57DBB9-07C6-49AB-BFD5-E737C7E241F6}" type="slidenum">
-              <a:rPr lang="en-US" smtClean="0"/>
-              <a:pPr/>
-              <a:t>9</a:t>
-            </a:fld>
-            <a:endParaRPr lang="en-US" dirty="0"/>
-          </a:p>
-        </p:txBody>
-      </p:sp>
-    </p:spTree>
-    <p:extLst>
-      <p:ext uri="{BB962C8B-B14F-4D97-AF65-F5344CB8AC3E}">
-        <p14:creationId xmlns:p14="http://schemas.microsoft.com/office/powerpoint/2010/main" val="2713489721"/>
-      </p:ext>
-    </p:extLst>
-  </p:cSld>
-  <p:clrMapOvr>
-    <a:masterClrMapping/>
-  </p:clrMapOvr>
   <p:timing>
     <p:tnLst>
       <p:par>

</xml_diff>